<commit_message>
updated the histo_GUI documentation
</commit_message>
<xml_diff>
--- a/histo_GUI_guide.pptx
+++ b/histo_GUI_guide.pptx
@@ -5,7 +5,7 @@
     <p:sldMasterId id="2147483648" r:id="rId1"/>
   </p:sldMasterIdLst>
   <p:notesMasterIdLst>
-    <p:notesMasterId r:id="rId46"/>
+    <p:notesMasterId r:id="rId47"/>
   </p:notesMasterIdLst>
   <p:sldIdLst>
     <p:sldId id="256" r:id="rId2"/>
@@ -20,38 +20,39 @@
     <p:sldId id="284" r:id="rId11"/>
     <p:sldId id="265" r:id="rId12"/>
     <p:sldId id="279" r:id="rId13"/>
-    <p:sldId id="280" r:id="rId14"/>
-    <p:sldId id="281" r:id="rId15"/>
-    <p:sldId id="282" r:id="rId16"/>
-    <p:sldId id="283" r:id="rId17"/>
-    <p:sldId id="292" r:id="rId18"/>
-    <p:sldId id="293" r:id="rId19"/>
-    <p:sldId id="294" r:id="rId20"/>
-    <p:sldId id="295" r:id="rId21"/>
-    <p:sldId id="296" r:id="rId22"/>
-    <p:sldId id="297" r:id="rId23"/>
-    <p:sldId id="298" r:id="rId24"/>
-    <p:sldId id="299" r:id="rId25"/>
-    <p:sldId id="300" r:id="rId26"/>
-    <p:sldId id="301" r:id="rId27"/>
-    <p:sldId id="302" r:id="rId28"/>
-    <p:sldId id="303" r:id="rId29"/>
-    <p:sldId id="304" r:id="rId30"/>
-    <p:sldId id="305" r:id="rId31"/>
-    <p:sldId id="306" r:id="rId32"/>
-    <p:sldId id="307" r:id="rId33"/>
-    <p:sldId id="308" r:id="rId34"/>
-    <p:sldId id="309" r:id="rId35"/>
-    <p:sldId id="310" r:id="rId36"/>
-    <p:sldId id="311" r:id="rId37"/>
-    <p:sldId id="312" r:id="rId38"/>
-    <p:sldId id="313" r:id="rId39"/>
-    <p:sldId id="315" r:id="rId40"/>
-    <p:sldId id="274" r:id="rId41"/>
-    <p:sldId id="275" r:id="rId42"/>
-    <p:sldId id="276" r:id="rId43"/>
-    <p:sldId id="277" r:id="rId44"/>
-    <p:sldId id="278" r:id="rId45"/>
+    <p:sldId id="316" r:id="rId14"/>
+    <p:sldId id="280" r:id="rId15"/>
+    <p:sldId id="281" r:id="rId16"/>
+    <p:sldId id="282" r:id="rId17"/>
+    <p:sldId id="283" r:id="rId18"/>
+    <p:sldId id="292" r:id="rId19"/>
+    <p:sldId id="293" r:id="rId20"/>
+    <p:sldId id="294" r:id="rId21"/>
+    <p:sldId id="295" r:id="rId22"/>
+    <p:sldId id="296" r:id="rId23"/>
+    <p:sldId id="297" r:id="rId24"/>
+    <p:sldId id="298" r:id="rId25"/>
+    <p:sldId id="299" r:id="rId26"/>
+    <p:sldId id="300" r:id="rId27"/>
+    <p:sldId id="301" r:id="rId28"/>
+    <p:sldId id="302" r:id="rId29"/>
+    <p:sldId id="303" r:id="rId30"/>
+    <p:sldId id="304" r:id="rId31"/>
+    <p:sldId id="305" r:id="rId32"/>
+    <p:sldId id="306" r:id="rId33"/>
+    <p:sldId id="307" r:id="rId34"/>
+    <p:sldId id="308" r:id="rId35"/>
+    <p:sldId id="309" r:id="rId36"/>
+    <p:sldId id="310" r:id="rId37"/>
+    <p:sldId id="311" r:id="rId38"/>
+    <p:sldId id="312" r:id="rId39"/>
+    <p:sldId id="313" r:id="rId40"/>
+    <p:sldId id="315" r:id="rId41"/>
+    <p:sldId id="274" r:id="rId42"/>
+    <p:sldId id="275" r:id="rId43"/>
+    <p:sldId id="276" r:id="rId44"/>
+    <p:sldId id="277" r:id="rId45"/>
+    <p:sldId id="278" r:id="rId46"/>
   </p:sldIdLst>
   <p:sldSz cx="12192000" cy="6858000"/>
   <p:notesSz cx="6858000" cy="9144000"/>
@@ -240,7 +241,7 @@
           <a:p>
             <a:fld id="{8AD15CF2-CB00-7A4A-B592-2E3848FB25DB}" type="datetimeFigureOut">
               <a:rPr lang="en-US" smtClean="0"/>
-              <a:t>1/16/19</a:t>
+              <a:t>1/18/19</a:t>
             </a:fld>
             <a:endParaRPr lang="en-US"/>
           </a:p>
@@ -832,17 +833,13 @@
           <a:p>
             <a:r>
               <a:rPr lang="en-US" dirty="0"/>
-              <a:t>The general idea is to have the two dotted lines encompass the delta mass peak(s), but not include much of the region where the blue histogram is at the red baseline (noise) level. The y-scale can be expanded by double left-clicking in the plot of interest. The scale can be changed in the other direction by double right-clicking of the mouse. There are 5 steps to adjust threshold positions (where the dotted lines are located). First, left mouse click in the plot where you want to change the thresholds. This will set the table contents to the values for that plot. Second, click in the table to get the application to set focus on the keyboard. Third, the left and right cursor arrow keys are used to pick which threshold you want to adjust. Fourth, the up and down cursor arrow keys are used to move the highlighted table row up or down. As the row changes, a green line will appear and move in the plot. It shows you where the table row is located in the plot. You can also click on rows using the mouse. Fifth, when the green line is where you want the new threshold to be positioned, press the return key to update the position of the threshold. You will see the dotted line move to lie on top of the green line. Use the appropriate other left/right arrow key to adjust the other side of the window if it needs adjustment. When you are satisfied with the window positions, click on the next charge-state tab.</a:t>
-            </a:r>
-          </a:p>
-          <a:p>
+              <a:t>The general idea is to have the two dotted lines encompass the delta mass peak(s), but not include much of the region where the blue histogram is at the red baseline (noise) level. The y-scale can be expanded by double left-clicking in the plot of interest. The scale can be changed in the other direction by double right-clicking of the mouse. There are 5 steps to adjust threshold positions (where the dotted lines are located). First, left mouse click in the plot where you want to change the thresholds. This will set the table contents to the values for that plot. Second, click in the table to get the application to set focus on the keyboard. Third, the left and right cursor arrow keys are used to pick which threshold you want to adjust. Fourth, the up and down cursor arrow keys are used to move the highlighted table row up or down. As the row changes, a green line will appear and move in the plot. It shows you where the table row is located in the plot. You can also click on rows using the mouse. Fifth, when the green line is where you want the new threshold to be positioned, press the return key to update the position of the threshold. You will see the dotted line move to lie on top of the green line. Use the appropriate other left/right arrow key to adjust the other side of the window if it needs adjustment. When you are satisfied with the window positions, click on the next charge-state </a:t>
+            </a:r>
+            <a:r>
+              <a:rPr lang="en-US"/>
+              <a:t>tab.</a:t>
+            </a:r>
             <a:endParaRPr lang="en-US" dirty="0"/>
-          </a:p>
-          <a:p>
-            <a:r>
-              <a:rPr lang="en-US" dirty="0"/>
-              <a:t>The 2+ 0-Da plot has been expanded. The left threshold has been moved to the left to capture the leading edge of the peak. We are in the process of moving the right threshold to capture more of the trailing edge.</a:t>
-            </a:r>
           </a:p>
         </p:txBody>
       </p:sp>
@@ -928,7 +925,7 @@
           <a:p>
             <a:r>
               <a:rPr lang="en-US" dirty="0"/>
-              <a:t>We have expanded the scale for the 2+ 0-Da plot and widened the window. The window now captures all of the peak. The 1-Da region looks pretty good. On Orbitraps at standard settings, these peaks are typically just baseline resolved. The software is designed to capture BOTH peaks in one window.</a:t>
+              <a:t>The 2+ 0-Da plot has been expanded. The left threshold has been moved to the left to capture the leading edge of the peak. We are in the process of moving the right threshold to capture more of the trailing edge.</a:t>
             </a:r>
           </a:p>
         </p:txBody>
@@ -959,7 +956,7 @@
     </p:spTree>
     <p:extLst>
       <p:ext uri="{BB962C8B-B14F-4D97-AF65-F5344CB8AC3E}">
-        <p14:creationId xmlns:p14="http://schemas.microsoft.com/office/powerpoint/2010/main" val="893613356"/>
+        <p14:creationId xmlns:p14="http://schemas.microsoft.com/office/powerpoint/2010/main" val="2869694508"/>
       </p:ext>
     </p:extLst>
   </p:cSld>
@@ -1015,7 +1012,7 @@
           <a:p>
             <a:r>
               <a:rPr lang="en-US" dirty="0"/>
-              <a:t>This is the 3+ peptide tab. We have somewhat broader peaks that we did for 2+ peptides. We need to widen the 0-Da window. We have expanded the y-scale to see the base of the peak better.</a:t>
+              <a:t>We have expanded the scale for the 2+ 0-Da plot and widened the window. The window now captures all of the peak. The 1-Da region looks pretty good. On Orbitraps at standard settings, these peaks are typically just baseline resolved. The software is designed to capture BOTH peaks in one window.</a:t>
             </a:r>
           </a:p>
         </p:txBody>
@@ -1046,7 +1043,7 @@
     </p:spTree>
     <p:extLst>
       <p:ext uri="{BB962C8B-B14F-4D97-AF65-F5344CB8AC3E}">
-        <p14:creationId xmlns:p14="http://schemas.microsoft.com/office/powerpoint/2010/main" val="3275976176"/>
+        <p14:creationId xmlns:p14="http://schemas.microsoft.com/office/powerpoint/2010/main" val="893613356"/>
       </p:ext>
     </p:extLst>
   </p:cSld>
@@ -1102,7 +1099,7 @@
           <a:p>
             <a:r>
               <a:rPr lang="en-US" dirty="0"/>
-              <a:t>We have set the new thresholds to just capture the full peak. Remember the steps: click the plot, click the table, pick a left or right threshold, move the table row up or down, and hit return to update the threshold.</a:t>
+              <a:t>This is the 3+ peptide tab. We have somewhat broader peaks that we did for 2+ peptides. We need to widen the 0-Da window. We have expanded the y-scale to see the base of the peak better.</a:t>
             </a:r>
           </a:p>
         </p:txBody>
@@ -1133,7 +1130,7 @@
     </p:spTree>
     <p:extLst>
       <p:ext uri="{BB962C8B-B14F-4D97-AF65-F5344CB8AC3E}">
-        <p14:creationId xmlns:p14="http://schemas.microsoft.com/office/powerpoint/2010/main" val="3177124220"/>
+        <p14:creationId xmlns:p14="http://schemas.microsoft.com/office/powerpoint/2010/main" val="3275976176"/>
       </p:ext>
     </p:extLst>
   </p:cSld>
@@ -1189,7 +1186,7 @@
           <a:p>
             <a:r>
               <a:rPr lang="en-US" dirty="0"/>
-              <a:t>This is the 4+ peptide tab. We have far fewer 4+ peptides than 2+ (usually about 2/3 of the data) or 3+ (usually about 1/3 of the data), so the plots have more fluctuations. We have widened the 0-Da window and adjusted the left side of the 1-Da region window. We have worked through all of the tabs from left-to-right.</a:t>
+              <a:t>We have set the new thresholds to just capture the full peak. Remember the steps: click the plot, click the table, pick a left or right threshold, move the table row up or down, and hit return to update the threshold.</a:t>
             </a:r>
           </a:p>
         </p:txBody>
@@ -1220,7 +1217,7 @@
     </p:spTree>
     <p:extLst>
       <p:ext uri="{BB962C8B-B14F-4D97-AF65-F5344CB8AC3E}">
-        <p14:creationId xmlns:p14="http://schemas.microsoft.com/office/powerpoint/2010/main" val="2232575821"/>
+        <p14:creationId xmlns:p14="http://schemas.microsoft.com/office/powerpoint/2010/main" val="3177124220"/>
       </p:ext>
     </p:extLst>
   </p:cSld>
@@ -1276,25 +1273,7 @@
           <a:p>
             <a:r>
               <a:rPr lang="en-US" dirty="0"/>
-              <a:t>Once we have the delta mass windows all checked and adjusted (if needed), we can compute conditional score histograms. Accurate mass can be used (or is that misused?) in several ways. It can be used after the PSM FDR analysis to validate results. That will hurt sensitivity. It can be used as one or more terms in a classifier function determined by an expert or by a computer algorithm. This can be tricky because delta mass is more discrete (sharp features) than search scores. This can work in theory, but the implementation details are pretty critical (one of those “your mileage may vary situations”). </a:t>
-            </a:r>
-          </a:p>
-          <a:p>
-            <a:endParaRPr lang="en-US" dirty="0"/>
-          </a:p>
-          <a:p>
-            <a:r>
-              <a:rPr lang="en-US" dirty="0"/>
-              <a:t>Another poor way to use accurate mass is by setting a very narrow parent ion search tolerance window in the search engine. The incorrect assumption is that by doing that, you will be rejecting the noise (the failed assumption is that all noise does not have an accurate mass). There are red data points inside the narrow windows above. There are not many of them because we used a 1.25 Da search setting. The noise is distributed over the whole plus/minus 1.25 region. When we do a narrower setting, the noise does not go away, it gets replaced by different noise that has narrower delta mass differences to match the search setting. We end up piling much more noise under the blue peaks and decreasing our signal to noise. Narrow parent ion mass tolerances select (rather than reject) noise. In essence, narrow tolerance searches invalidate accurate mass as something that distinguishes correct from incorrect.</a:t>
-            </a:r>
-          </a:p>
-          <a:p>
-            <a:endParaRPr lang="en-US" dirty="0"/>
-          </a:p>
-          <a:p>
-            <a:r>
-              <a:rPr lang="en-US" dirty="0"/>
-              <a:t>The accurate mass measurement and the search engine score are completely independent. We can set an accurate mass condition up front, and then make conditional score histograms. This will reduce the noise matches and allow lower score thresholds (which improves sensitivity).</a:t>
+              <a:t>This is the 4+ peptide tab. We have far fewer 4+ peptides than 2+ (usually about 2/3 of the data) or 3+ (usually about 1/3 of the data), so the plots have more fluctuations. We have widened the 0-Da window and adjusted the left side of the 1-Da region window. We have worked through all of the tabs from left-to-right.</a:t>
             </a:r>
           </a:p>
         </p:txBody>
@@ -1325,7 +1304,7 @@
     </p:spTree>
     <p:extLst>
       <p:ext uri="{BB962C8B-B14F-4D97-AF65-F5344CB8AC3E}">
-        <p14:creationId xmlns:p14="http://schemas.microsoft.com/office/powerpoint/2010/main" val="3112224324"/>
+        <p14:creationId xmlns:p14="http://schemas.microsoft.com/office/powerpoint/2010/main" val="2232575821"/>
       </p:ext>
     </p:extLst>
   </p:cSld>
@@ -1381,7 +1360,7 @@
           <a:p>
             <a:r>
               <a:rPr lang="en-US" dirty="0"/>
-              <a:t>It has been know for many years that search scores can vary depending on peptide charge. We will make different score histograms for each of the three change states. Other factors can also complicate score distribution, such as, number of tryptic termini and modification state. Those affect FDR analysis differently than charge state. For these factors, the issue is that the noise (decoys) partitions differently than the signal (target matches) across these classes. The separation between the red and blue distributions is important. However, so it the relative magnitudes of the two distributions. FDR analysis is mostly the right hand tail integration of the red distribution divided by the area of the blue distribution (excluding its left hand tail). If the red distribution is large and the blue distribution is small, the threshold has to be moved to the right to get the same FDR.</a:t>
+              <a:t>Once we have the delta mass windows all checked and adjusted (if needed), we can compute conditional score histograms. Accurate mass can be used (or is that misused?) in several ways. It can be used after the PSM FDR analysis to validate results. That will hurt sensitivity. It can be used as one or more terms in a classifier function determined by an expert or by a computer algorithm. This can be tricky because delta mass is more discrete (sharp features) than search scores. This can work in theory, but the implementation details are pretty critical (one of those “your mileage may vary situations”). </a:t>
             </a:r>
           </a:p>
           <a:p>
@@ -1390,7 +1369,7 @@
           <a:p>
             <a:r>
               <a:rPr lang="en-US" dirty="0"/>
-              <a:t>We have some control buttons at the top of the window. We again have tabbed windows, but we have two rows of tabs. The outer tabs (the top row) are the different delta mass windows for each charge state (9 total tabs). The inner tabs are for the different variable modification states. We have just unmodified peptides and peptides with oxidized met for this data. We have two score histogram plots. Matches in Comet have been restricted to fully tryptic peptides. We only determine the C-terminal tryptic terminus directly. The N-terminal status depends on the protein sequence and is inferred. Peptides that match multiple proteins can be fully tryptic in some and semi-tryptic in others. </a:t>
+              <a:t>Another poor way to use accurate mass is by setting a very narrow parent ion search tolerance window in the search engine. The incorrect assumption is that by doing that, you will be rejecting the noise (the failed assumption is that all noise does not have an accurate mass). There are red data points inside the narrow windows above. There are not many of them because we used a 1.25 Da search setting. The noise is distributed over the whole plus/minus 1.25 region. When we do a narrower setting, the noise does not go away, it gets replaced by different noise that has narrower delta mass differences to match the search setting. We end up piling much more noise under the blue peaks and decreasing our signal to noise. Narrow parent ion mass tolerances select (rather than reject) noise. In essence, narrow tolerance searches invalidate accurate mass as something that distinguishes correct from incorrect.</a:t>
             </a:r>
           </a:p>
           <a:p>
@@ -1399,7 +1378,7 @@
           <a:p>
             <a:r>
               <a:rPr lang="en-US" dirty="0"/>
-              <a:t>Here, we have the 2+ peptides associated with the 0-Da delta mass window. We remember that that was a very large blue peak on top of a very small red background. We see a large blue (target) distribution well separated from a small red (decoy) distribution. The default threshold is set to 1% FDR is shown as the dotted line. The default is fine.</a:t>
+              <a:t>The accurate mass measurement and the search engine score are completely independent. We can set an accurate mass condition up front, and then make conditional score histograms. This will reduce the noise matches and allow lower score thresholds (which improves sensitivity).</a:t>
             </a:r>
           </a:p>
         </p:txBody>
@@ -1430,7 +1409,7 @@
     </p:spTree>
     <p:extLst>
       <p:ext uri="{BB962C8B-B14F-4D97-AF65-F5344CB8AC3E}">
-        <p14:creationId xmlns:p14="http://schemas.microsoft.com/office/powerpoint/2010/main" val="93415284"/>
+        <p14:creationId xmlns:p14="http://schemas.microsoft.com/office/powerpoint/2010/main" val="3112224324"/>
       </p:ext>
     </p:extLst>
   </p:cSld>
@@ -1486,7 +1465,25 @@
           <a:p>
             <a:r>
               <a:rPr lang="en-US" dirty="0"/>
-              <a:t>These are the 2+ peptides with an oxidized Met. We have fewer matches. The relative fraction of the red distribution to the blue distribution is different. The 1% cutoff is a little higher (2.9 versus 2.7). The default threshold position looks fine.</a:t>
+              <a:t>It has been know for many years that search scores can vary depending on peptide charge. We will make different score histograms for each of the three change states. Other factors can also complicate score distribution, such as, number of tryptic termini and modification state. Those affect FDR analysis differently than charge state. For these factors, the issue is that the noise (decoys) partitions differently than the signal (target matches) across these classes. The separation between the red and blue distributions is important. However, so it the relative magnitudes of the two distributions. FDR analysis is mostly the right hand tail integration of the red distribution divided by the area of the blue distribution (excluding its left hand tail). If the red distribution is large and the blue distribution is small, the threshold has to be moved to the right to get the same FDR.</a:t>
+            </a:r>
+          </a:p>
+          <a:p>
+            <a:endParaRPr lang="en-US" dirty="0"/>
+          </a:p>
+          <a:p>
+            <a:r>
+              <a:rPr lang="en-US" dirty="0"/>
+              <a:t>We have some control buttons at the top of the window. We again have tabbed windows, but we have two rows of tabs. The outer tabs (the top row) are the different delta mass windows for each charge state (9 total tabs). The inner tabs are for the different variable modification states. We have just unmodified peptides and peptides with oxidized met for this data. We have two score histogram plots. Matches in Comet have been restricted to fully tryptic peptides. We only determine the C-terminal tryptic terminus directly. The N-terminal status depends on the protein sequence and is inferred. Peptides that match multiple proteins can be fully tryptic in some and semi-tryptic in others. </a:t>
+            </a:r>
+          </a:p>
+          <a:p>
+            <a:endParaRPr lang="en-US" dirty="0"/>
+          </a:p>
+          <a:p>
+            <a:r>
+              <a:rPr lang="en-US" dirty="0"/>
+              <a:t>Here, we have the 2+ peptides associated with the 0-Da delta mass window. We remember that that was a very large blue peak on top of a very small red background. We see a large blue (target) distribution well separated from a small red (decoy) distribution. The default threshold is set to 1% FDR is shown as the dotted line. The default is fine.</a:t>
             </a:r>
           </a:p>
         </p:txBody>
@@ -1517,7 +1514,7 @@
     </p:spTree>
     <p:extLst>
       <p:ext uri="{BB962C8B-B14F-4D97-AF65-F5344CB8AC3E}">
-        <p14:creationId xmlns:p14="http://schemas.microsoft.com/office/powerpoint/2010/main" val="511847046"/>
+        <p14:creationId xmlns:p14="http://schemas.microsoft.com/office/powerpoint/2010/main" val="93415284"/>
       </p:ext>
     </p:extLst>
   </p:cSld>
@@ -1668,7 +1665,7 @@
           <a:p>
             <a:r>
               <a:rPr lang="en-US" dirty="0"/>
-              <a:t>These are the 0-Da delta mass, unmodified 3+ peptides. Like the 2+ peptides, we have a large blue distribution and very small red bump. The threshold location is fine.</a:t>
+              <a:t>These are the 2+ peptides with an oxidized Met. We have fewer matches. The relative fraction of the red distribution to the blue distribution is different. The 1% cutoff is a little higher (2.9 versus 2.7). The default threshold position looks fine.</a:t>
             </a:r>
           </a:p>
         </p:txBody>
@@ -1699,7 +1696,7 @@
     </p:spTree>
     <p:extLst>
       <p:ext uri="{BB962C8B-B14F-4D97-AF65-F5344CB8AC3E}">
-        <p14:creationId xmlns:p14="http://schemas.microsoft.com/office/powerpoint/2010/main" val="300641340"/>
+        <p14:creationId xmlns:p14="http://schemas.microsoft.com/office/powerpoint/2010/main" val="511847046"/>
       </p:ext>
     </p:extLst>
   </p:cSld>
@@ -1755,7 +1752,7 @@
           <a:p>
             <a:r>
               <a:rPr lang="en-US" dirty="0"/>
-              <a:t>These are the 0-Da, 3+ oxidized Met peptides. We have a greater chance of having a Met residue in the longer 3+ peptides, so the magnitude of the score distribution is larger. The default threshold is fine.</a:t>
+              <a:t>These are the 0-Da delta mass, unmodified 3+ peptides. Like the 2+ peptides, we have a large blue distribution and very small red bump. The threshold location is fine.</a:t>
             </a:r>
           </a:p>
         </p:txBody>
@@ -1786,7 +1783,7 @@
     </p:spTree>
     <p:extLst>
       <p:ext uri="{BB962C8B-B14F-4D97-AF65-F5344CB8AC3E}">
-        <p14:creationId xmlns:p14="http://schemas.microsoft.com/office/powerpoint/2010/main" val="2287469121"/>
+        <p14:creationId xmlns:p14="http://schemas.microsoft.com/office/powerpoint/2010/main" val="300641340"/>
       </p:ext>
     </p:extLst>
   </p:cSld>
@@ -1842,7 +1839,7 @@
           <a:p>
             <a:r>
               <a:rPr lang="en-US" dirty="0"/>
-              <a:t>These are the last of the 0-Da delta-mass peptides. These are unmodified 4+ peptides. We have far fewer of these. The threshold position is fine.</a:t>
+              <a:t>These are the 0-Da, 3+ oxidized Met peptides. We have a greater chance of having a Met residue in the longer 3+ peptides, so the magnitude of the score distribution is larger. The default threshold is fine.</a:t>
             </a:r>
           </a:p>
         </p:txBody>
@@ -1873,7 +1870,7 @@
     </p:spTree>
     <p:extLst>
       <p:ext uri="{BB962C8B-B14F-4D97-AF65-F5344CB8AC3E}">
-        <p14:creationId xmlns:p14="http://schemas.microsoft.com/office/powerpoint/2010/main" val="3492371728"/>
+        <p14:creationId xmlns:p14="http://schemas.microsoft.com/office/powerpoint/2010/main" val="2287469121"/>
       </p:ext>
     </p:extLst>
   </p:cSld>
@@ -1929,7 +1926,7 @@
           <a:p>
             <a:r>
               <a:rPr lang="en-US" dirty="0"/>
-              <a:t>The oxidized Met, 4+, 0-Da peptides are pretty sparse. The 1% FDR cutoff location looks fine. If we have fewer that 50 counts in the blue distribution above the threshold, the software will exclude that data by default. That shows as a plot without any dotted line. You can always add thresholds to sparse data classes if you want to squeeze all of the PSMs out of the data. </a:t>
+              <a:t>These are the last of the 0-Da delta-mass peptides. These are unmodified 4+ peptides. We have far fewer of these. The threshold position is fine.</a:t>
             </a:r>
           </a:p>
         </p:txBody>
@@ -1960,7 +1957,7 @@
     </p:spTree>
     <p:extLst>
       <p:ext uri="{BB962C8B-B14F-4D97-AF65-F5344CB8AC3E}">
-        <p14:creationId xmlns:p14="http://schemas.microsoft.com/office/powerpoint/2010/main" val="4233183098"/>
+        <p14:creationId xmlns:p14="http://schemas.microsoft.com/office/powerpoint/2010/main" val="3492371728"/>
       </p:ext>
     </p:extLst>
   </p:cSld>
@@ -2016,7 +2013,7 @@
           <a:p>
             <a:r>
               <a:rPr lang="en-US" dirty="0"/>
-              <a:t>The next three tabs will be the 1-Da regions. These are 2+ unmodified peptides. We see that the relative sizes of the red and blue distributions are more comparable. The dotted line looks fine.</a:t>
+              <a:t>The oxidized Met, 4+, 0-Da peptides are pretty sparse. The 1% FDR cutoff location looks fine. If we have fewer that 50 counts in the blue distribution above the threshold, the software will exclude that data by default. That shows as a plot without any dotted line. You can always add thresholds to sparse data classes if you want to squeeze all of the PSMs out of the data. </a:t>
             </a:r>
           </a:p>
         </p:txBody>
@@ -2047,7 +2044,7 @@
     </p:spTree>
     <p:extLst>
       <p:ext uri="{BB962C8B-B14F-4D97-AF65-F5344CB8AC3E}">
-        <p14:creationId xmlns:p14="http://schemas.microsoft.com/office/powerpoint/2010/main" val="723338582"/>
+        <p14:creationId xmlns:p14="http://schemas.microsoft.com/office/powerpoint/2010/main" val="4233183098"/>
       </p:ext>
     </p:extLst>
   </p:cSld>
@@ -2103,7 +2100,7 @@
           <a:p>
             <a:r>
               <a:rPr lang="en-US" dirty="0"/>
-              <a:t>The modified 2+ peptides are more sparse and the default threshold is okay.</a:t>
+              <a:t>The next three tabs will be the 1-Da regions. These are 2+ unmodified peptides. We see that the relative sizes of the red and blue distributions are more comparable. The dotted line looks fine.</a:t>
             </a:r>
           </a:p>
         </p:txBody>
@@ -2134,7 +2131,7 @@
     </p:spTree>
     <p:extLst>
       <p:ext uri="{BB962C8B-B14F-4D97-AF65-F5344CB8AC3E}">
-        <p14:creationId xmlns:p14="http://schemas.microsoft.com/office/powerpoint/2010/main" val="2699069505"/>
+        <p14:creationId xmlns:p14="http://schemas.microsoft.com/office/powerpoint/2010/main" val="723338582"/>
       </p:ext>
     </p:extLst>
   </p:cSld>
@@ -2190,7 +2187,7 @@
           <a:p>
             <a:r>
               <a:rPr lang="en-US" dirty="0"/>
-              <a:t>1-Da region, 3+ unmodified peptides also have a good default threshold location.</a:t>
+              <a:t>The modified 2+ peptides are more sparse and the default threshold is okay.</a:t>
             </a:r>
           </a:p>
         </p:txBody>
@@ -2221,7 +2218,7 @@
     </p:spTree>
     <p:extLst>
       <p:ext uri="{BB962C8B-B14F-4D97-AF65-F5344CB8AC3E}">
-        <p14:creationId xmlns:p14="http://schemas.microsoft.com/office/powerpoint/2010/main" val="3313795177"/>
+        <p14:creationId xmlns:p14="http://schemas.microsoft.com/office/powerpoint/2010/main" val="2699069505"/>
       </p:ext>
     </p:extLst>
   </p:cSld>
@@ -2277,7 +2274,7 @@
           <a:p>
             <a:r>
               <a:rPr lang="en-US" dirty="0"/>
-              <a:t>The modified, 3+, 1-Da peptides also look fine.</a:t>
+              <a:t>1-Da region, 3+ unmodified peptides also have a good default threshold location.</a:t>
             </a:r>
           </a:p>
         </p:txBody>
@@ -2308,7 +2305,7 @@
     </p:spTree>
     <p:extLst>
       <p:ext uri="{BB962C8B-B14F-4D97-AF65-F5344CB8AC3E}">
-        <p14:creationId xmlns:p14="http://schemas.microsoft.com/office/powerpoint/2010/main" val="3801122561"/>
+        <p14:creationId xmlns:p14="http://schemas.microsoft.com/office/powerpoint/2010/main" val="3313795177"/>
       </p:ext>
     </p:extLst>
   </p:cSld>
@@ -2364,7 +2361,7 @@
           <a:p>
             <a:r>
               <a:rPr lang="en-US" dirty="0"/>
-              <a:t>The 1-Da delta-mass window, 4+, unmodified peptide scores are shown here. The histograms and threshold look good.</a:t>
+              <a:t>The modified, 3+, 1-Da peptides also look fine.</a:t>
             </a:r>
           </a:p>
         </p:txBody>
@@ -2395,7 +2392,7 @@
     </p:spTree>
     <p:extLst>
       <p:ext uri="{BB962C8B-B14F-4D97-AF65-F5344CB8AC3E}">
-        <p14:creationId xmlns:p14="http://schemas.microsoft.com/office/powerpoint/2010/main" val="1968537666"/>
+        <p14:creationId xmlns:p14="http://schemas.microsoft.com/office/powerpoint/2010/main" val="3801122561"/>
       </p:ext>
     </p:extLst>
   </p:cSld>
@@ -2451,7 +2448,7 @@
           <a:p>
             <a:r>
               <a:rPr lang="en-US" dirty="0"/>
-              <a:t>The threshold for the oxidized met peptides (1-Da delta-mass window, 4+ change state) does not need any tweaking.</a:t>
+              <a:t>The 1-Da delta-mass window, 4+, unmodified peptide scores are shown here. The histograms and threshold look good.</a:t>
             </a:r>
           </a:p>
         </p:txBody>
@@ -2482,7 +2479,7 @@
     </p:spTree>
     <p:extLst>
       <p:ext uri="{BB962C8B-B14F-4D97-AF65-F5344CB8AC3E}">
-        <p14:creationId xmlns:p14="http://schemas.microsoft.com/office/powerpoint/2010/main" val="3127400714"/>
+        <p14:creationId xmlns:p14="http://schemas.microsoft.com/office/powerpoint/2010/main" val="1968537666"/>
       </p:ext>
     </p:extLst>
   </p:cSld>
@@ -2633,16 +2630,7 @@
           <a:p>
             <a:r>
               <a:rPr lang="en-US" dirty="0"/>
-              <a:t>The last set of three outer tabs are something you might not have expected. These are the score histograms for peptides that did not have an accurate mass (all delta masses not inside either the 0-Da or 1-Da windows). Not all peptides are abundant and the instruments are not perfect. Dynamic exclusion can impact the instrument in unexpected ways. Acquisition modes have options that can create mixed mode data. Some scans that may not have an accurate mass or defined charge state are to be expected.</a:t>
-            </a:r>
-          </a:p>
-          <a:p>
-            <a:endParaRPr lang="en-US" dirty="0"/>
-          </a:p>
-          <a:p>
-            <a:r>
-              <a:rPr lang="en-US" dirty="0"/>
-              <a:t> This is the score distribution of 2+, unmodified peptides without an accurate mass. The PSMs are mostly incorrect (nearly identical red and blue distributions centered at 0), but there are some net blue counts at higher scores. We have to set correspondingly higher score thresholds to control FDR. Here, we can get 3000 more IDs.</a:t>
+              <a:t>The threshold for the oxidized met peptides (1-Da delta-mass window, 4+ change state) does not need any tweaking.</a:t>
             </a:r>
           </a:p>
         </p:txBody>
@@ -2673,7 +2661,7 @@
     </p:spTree>
     <p:extLst>
       <p:ext uri="{BB962C8B-B14F-4D97-AF65-F5344CB8AC3E}">
-        <p14:creationId xmlns:p14="http://schemas.microsoft.com/office/powerpoint/2010/main" val="8903792"/>
+        <p14:creationId xmlns:p14="http://schemas.microsoft.com/office/powerpoint/2010/main" val="3127400714"/>
       </p:ext>
     </p:extLst>
   </p:cSld>
@@ -2729,7 +2717,16 @@
           <a:p>
             <a:r>
               <a:rPr lang="en-US" dirty="0"/>
-              <a:t>The modified 2+ peptides in this delta-mass class that are beyond the decoys are getting pretty sparse. The default threshold location is just past the last decoy count. If we lowered the threshold to 5.467, we could gain 32 target matches at the expense of only a single decoy match. That might be reasonable. You can always over-ride the default threshold positions; however, please look at the table and the plot to see if it is justified. </a:t>
+              <a:t>The last set of three outer tabs are something you might not have expected. These are the score histograms for peptides that did not have an accurate mass (all delta masses not inside either the 0-Da or 1-Da windows). Not all peptides are abundant and the instruments are not perfect. Dynamic exclusion can impact the instrument in unexpected ways. Acquisition modes have options that can create mixed mode data. Some scans that may not have an accurate mass or defined charge state are to be expected.</a:t>
+            </a:r>
+          </a:p>
+          <a:p>
+            <a:endParaRPr lang="en-US" dirty="0"/>
+          </a:p>
+          <a:p>
+            <a:r>
+              <a:rPr lang="en-US" dirty="0"/>
+              <a:t> This is the score distribution of 2+, unmodified peptides without an accurate mass. The PSMs are mostly incorrect (nearly identical red and blue distributions centered at 0), but there are some net blue counts at higher scores. We have to set correspondingly higher score thresholds to control FDR. Here, we can get 3000 more IDs.</a:t>
             </a:r>
           </a:p>
         </p:txBody>
@@ -2760,7 +2757,7 @@
     </p:spTree>
     <p:extLst>
       <p:ext uri="{BB962C8B-B14F-4D97-AF65-F5344CB8AC3E}">
-        <p14:creationId xmlns:p14="http://schemas.microsoft.com/office/powerpoint/2010/main" val="3520551947"/>
+        <p14:creationId xmlns:p14="http://schemas.microsoft.com/office/powerpoint/2010/main" val="8903792"/>
       </p:ext>
     </p:extLst>
   </p:cSld>
@@ -2816,7 +2813,7 @@
           <a:p>
             <a:r>
               <a:rPr lang="en-US" dirty="0"/>
-              <a:t>We are in the middle of changing the threshold. We need to press the return key to update the threshold to the green line location.</a:t>
+              <a:t>The modified 2+ peptides in this delta-mass class that are beyond the decoys are getting pretty sparse. The default threshold location is just past the last decoy count. If we lowered the threshold to 5.467, we could gain 32 target matches at the expense of only a single decoy match. That might be reasonable. You can always over-ride the default threshold positions; however, please look at the table and the plot to see if it is justified. </a:t>
             </a:r>
           </a:p>
         </p:txBody>
@@ -2847,7 +2844,7 @@
     </p:spTree>
     <p:extLst>
       <p:ext uri="{BB962C8B-B14F-4D97-AF65-F5344CB8AC3E}">
-        <p14:creationId xmlns:p14="http://schemas.microsoft.com/office/powerpoint/2010/main" val="2919265059"/>
+        <p14:creationId xmlns:p14="http://schemas.microsoft.com/office/powerpoint/2010/main" val="3520551947"/>
       </p:ext>
     </p:extLst>
   </p:cSld>
@@ -2903,7 +2900,7 @@
           <a:p>
             <a:r>
               <a:rPr lang="en-US" dirty="0"/>
-              <a:t>We have successfully changed the threshold.</a:t>
+              <a:t>We are in the middle of changing the threshold. We need to press the return key to update the threshold to the green line location.</a:t>
             </a:r>
           </a:p>
         </p:txBody>
@@ -2934,7 +2931,7 @@
     </p:spTree>
     <p:extLst>
       <p:ext uri="{BB962C8B-B14F-4D97-AF65-F5344CB8AC3E}">
-        <p14:creationId xmlns:p14="http://schemas.microsoft.com/office/powerpoint/2010/main" val="4136434034"/>
+        <p14:creationId xmlns:p14="http://schemas.microsoft.com/office/powerpoint/2010/main" val="2919265059"/>
       </p:ext>
     </p:extLst>
   </p:cSld>
@@ -2990,7 +2987,7 @@
           <a:p>
             <a:r>
               <a:rPr lang="en-US" dirty="0"/>
-              <a:t>These are the 3+ peptides (unmodified) without an accurate mass. Threshold is fine.</a:t>
+              <a:t>We have successfully changed the threshold.</a:t>
             </a:r>
           </a:p>
         </p:txBody>
@@ -3021,7 +3018,7 @@
     </p:spTree>
     <p:extLst>
       <p:ext uri="{BB962C8B-B14F-4D97-AF65-F5344CB8AC3E}">
-        <p14:creationId xmlns:p14="http://schemas.microsoft.com/office/powerpoint/2010/main" val="4101145082"/>
+        <p14:creationId xmlns:p14="http://schemas.microsoft.com/office/powerpoint/2010/main" val="4136434034"/>
       </p:ext>
     </p:extLst>
   </p:cSld>
@@ -3077,7 +3074,7 @@
           <a:p>
             <a:r>
               <a:rPr lang="en-US" dirty="0"/>
-              <a:t>These are the modified 3+ peptides (no accurate mass) and the default looks fine.</a:t>
+              <a:t>These are the 3+ peptides (unmodified) without an accurate mass. Threshold is fine.</a:t>
             </a:r>
           </a:p>
         </p:txBody>
@@ -3108,7 +3105,7 @@
     </p:spTree>
     <p:extLst>
       <p:ext uri="{BB962C8B-B14F-4D97-AF65-F5344CB8AC3E}">
-        <p14:creationId xmlns:p14="http://schemas.microsoft.com/office/powerpoint/2010/main" val="3830926816"/>
+        <p14:creationId xmlns:p14="http://schemas.microsoft.com/office/powerpoint/2010/main" val="4101145082"/>
       </p:ext>
     </p:extLst>
   </p:cSld>
@@ -3164,7 +3161,7 @@
           <a:p>
             <a:r>
               <a:rPr lang="en-US" dirty="0"/>
-              <a:t>Here are the 4+ peptides (no accurate mass, unmodified). No changes are needed.</a:t>
+              <a:t>These are the modified 3+ peptides (no accurate mass) and the default looks fine.</a:t>
             </a:r>
           </a:p>
         </p:txBody>
@@ -3195,7 +3192,7 @@
     </p:spTree>
     <p:extLst>
       <p:ext uri="{BB962C8B-B14F-4D97-AF65-F5344CB8AC3E}">
-        <p14:creationId xmlns:p14="http://schemas.microsoft.com/office/powerpoint/2010/main" val="1774066785"/>
+        <p14:creationId xmlns:p14="http://schemas.microsoft.com/office/powerpoint/2010/main" val="3830926816"/>
       </p:ext>
     </p:extLst>
   </p:cSld>
@@ -3251,7 +3248,7 @@
           <a:p>
             <a:r>
               <a:rPr lang="en-US" dirty="0"/>
-              <a:t>Finally, we have the modified (oxidized Met), 4+ peptides that have no accurate mass. We could tweak the threshold a little here if we want.</a:t>
+              <a:t>Here are the 4+ peptides (no accurate mass, unmodified). No changes are needed.</a:t>
             </a:r>
           </a:p>
         </p:txBody>
@@ -3282,7 +3279,7 @@
     </p:spTree>
     <p:extLst>
       <p:ext uri="{BB962C8B-B14F-4D97-AF65-F5344CB8AC3E}">
-        <p14:creationId xmlns:p14="http://schemas.microsoft.com/office/powerpoint/2010/main" val="356176854"/>
+        <p14:creationId xmlns:p14="http://schemas.microsoft.com/office/powerpoint/2010/main" val="1774066785"/>
       </p:ext>
     </p:extLst>
   </p:cSld>
@@ -3338,7 +3335,7 @@
           <a:p>
             <a:r>
               <a:rPr lang="en-US" dirty="0"/>
-              <a:t>We have lowered the threshold following the basic steps: click in the score plot first, then click in the table, then click on the new row (or use the up/down arrow keys), then press return.</a:t>
+              <a:t>Finally, we have the modified (oxidized Met), 4+ peptides that have no accurate mass. We could tweak the threshold a little here if we want.</a:t>
             </a:r>
           </a:p>
         </p:txBody>
@@ -3369,7 +3366,7 @@
     </p:spTree>
     <p:extLst>
       <p:ext uri="{BB962C8B-B14F-4D97-AF65-F5344CB8AC3E}">
-        <p14:creationId xmlns:p14="http://schemas.microsoft.com/office/powerpoint/2010/main" val="3709799647"/>
+        <p14:creationId xmlns:p14="http://schemas.microsoft.com/office/powerpoint/2010/main" val="356176854"/>
       </p:ext>
     </p:extLst>
   </p:cSld>
@@ -3425,7 +3422,7 @@
           <a:p>
             <a:r>
               <a:rPr lang="en-US" dirty="0"/>
-              <a:t>Once we have worked left-to-right across all of the outer tabs and all of the inner tabs and inspected/set the score thresholds, we can filter the data (press the “Filter Data” button). The data where the scores exceed the score thresholds in each of the peptide classes will get written to new peak lists (MS2 format), new Comet result files (SQT format), and new top hit summaries (tab delimited text files).</a:t>
+              <a:t>We have lowered the threshold following the basic steps: click in the score plot first, then click in the table, then click on the new row (or use the up/down arrow keys), then press return.</a:t>
             </a:r>
           </a:p>
         </p:txBody>
@@ -3456,7 +3453,7 @@
     </p:spTree>
     <p:extLst>
       <p:ext uri="{BB962C8B-B14F-4D97-AF65-F5344CB8AC3E}">
-        <p14:creationId xmlns:p14="http://schemas.microsoft.com/office/powerpoint/2010/main" val="3254848543"/>
+        <p14:creationId xmlns:p14="http://schemas.microsoft.com/office/powerpoint/2010/main" val="3709799647"/>
       </p:ext>
     </p:extLst>
   </p:cSld>
@@ -3599,7 +3596,7 @@
           <a:p>
             <a:r>
               <a:rPr lang="en-US" dirty="0"/>
-              <a:t>The console (and log file) will have useful information. We see that there were 466,732 total top hits to start with (subject to a minimum peptide length). 49% of those matches were to the decoy database.</a:t>
+              <a:t>Once we have worked left-to-right across all of the outer tabs and all of the inner tabs and inspected/set the score thresholds, we can filter the data (press the “Filter Data” button). The data where the scores exceed the score thresholds in each of the peptide classes will get written to new peak lists (MS2 format), new Comet result files (SQT format), and new top hit summaries (tab delimited text files).</a:t>
             </a:r>
           </a:p>
         </p:txBody>
@@ -3630,7 +3627,7 @@
     </p:spTree>
     <p:extLst>
       <p:ext uri="{BB962C8B-B14F-4D97-AF65-F5344CB8AC3E}">
-        <p14:creationId xmlns:p14="http://schemas.microsoft.com/office/powerpoint/2010/main" val="2795536037"/>
+        <p14:creationId xmlns:p14="http://schemas.microsoft.com/office/powerpoint/2010/main" val="3254848543"/>
       </p:ext>
     </p:extLst>
   </p:cSld>
@@ -3686,7 +3683,7 @@
           <a:p>
             <a:r>
               <a:rPr lang="en-US" dirty="0"/>
-              <a:t>After filtering, there were 209,648 matches passing the thresholds. There were about 2000 decoy matches for a 1% FDR.</a:t>
+              <a:t>The console (and log file) will have useful information. We see that there were 466,732 total top hits to start with (subject to a minimum peptide length). 49% of those matches were to the decoy database.</a:t>
             </a:r>
           </a:p>
         </p:txBody>
@@ -3717,7 +3714,7 @@
     </p:spTree>
     <p:extLst>
       <p:ext uri="{BB962C8B-B14F-4D97-AF65-F5344CB8AC3E}">
-        <p14:creationId xmlns:p14="http://schemas.microsoft.com/office/powerpoint/2010/main" val="3481211205"/>
+        <p14:creationId xmlns:p14="http://schemas.microsoft.com/office/powerpoint/2010/main" val="2795536037"/>
       </p:ext>
     </p:extLst>
   </p:cSld>
@@ -3773,7 +3770,7 @@
           <a:p>
             <a:r>
               <a:rPr lang="en-US" dirty="0"/>
-              <a:t>You will get a “…finished” line when the filtering has completed. Click on the close window button on the GUI window (it does not have a quit button).</a:t>
+              <a:t>After filtering, there were 209,648 matches passing the thresholds. There were about 2000 decoy matches for a 1% FDR.</a:t>
             </a:r>
           </a:p>
         </p:txBody>
@@ -3804,7 +3801,7 @@
     </p:spTree>
     <p:extLst>
       <p:ext uri="{BB962C8B-B14F-4D97-AF65-F5344CB8AC3E}">
-        <p14:creationId xmlns:p14="http://schemas.microsoft.com/office/powerpoint/2010/main" val="988178780"/>
+        <p14:creationId xmlns:p14="http://schemas.microsoft.com/office/powerpoint/2010/main" val="3481211205"/>
       </p:ext>
     </p:extLst>
   </p:cSld>
@@ -3860,15 +3857,7 @@
           <a:p>
             <a:r>
               <a:rPr lang="en-US" dirty="0"/>
-              <a:t>We have a new folder called “</a:t>
-            </a:r>
-            <a:r>
-              <a:rPr lang="en-US" dirty="0" err="1"/>
-              <a:t>filtered_files</a:t>
-            </a:r>
-            <a:r>
-              <a:rPr lang="en-US" dirty="0"/>
-              <a:t>”.</a:t>
+              <a:t>You will get a “…finished” line when the filtering has completed. Click on the close window button on the GUI window (it does not have a quit button).</a:t>
             </a:r>
           </a:p>
         </p:txBody>
@@ -3899,7 +3888,7 @@
     </p:spTree>
     <p:extLst>
       <p:ext uri="{BB962C8B-B14F-4D97-AF65-F5344CB8AC3E}">
-        <p14:creationId xmlns:p14="http://schemas.microsoft.com/office/powerpoint/2010/main" val="1561503008"/>
+        <p14:creationId xmlns:p14="http://schemas.microsoft.com/office/powerpoint/2010/main" val="988178780"/>
       </p:ext>
     </p:extLst>
   </p:cSld>
@@ -3955,15 +3944,15 @@
           <a:p>
             <a:r>
               <a:rPr lang="en-US" dirty="0"/>
-              <a:t>There are new (smaller) MS2, SQT, and TXT files for just the PSMs that passed the thresholds. There are also PDF pictures of the score histograms and the threshold locations in the “</a:t>
+              <a:t>We have a new folder called “</a:t>
             </a:r>
             <a:r>
               <a:rPr lang="en-US" dirty="0" err="1"/>
-              <a:t>ThresholdFigures</a:t>
+              <a:t>filtered_files</a:t>
             </a:r>
             <a:r>
               <a:rPr lang="en-US" dirty="0"/>
-              <a:t>” folder.</a:t>
+              <a:t>”.</a:t>
             </a:r>
           </a:p>
         </p:txBody>
@@ -3986,6 +3975,101 @@
             <a:fld id="{A4DD43C4-7783-D04D-B052-0FD88E2F6FA2}" type="slidenum">
               <a:rPr lang="en-US" smtClean="0"/>
               <a:t>44</a:t>
+            </a:fld>
+            <a:endParaRPr lang="en-US"/>
+          </a:p>
+        </p:txBody>
+      </p:sp>
+    </p:spTree>
+    <p:extLst>
+      <p:ext uri="{BB962C8B-B14F-4D97-AF65-F5344CB8AC3E}">
+        <p14:creationId xmlns:p14="http://schemas.microsoft.com/office/powerpoint/2010/main" val="1561503008"/>
+      </p:ext>
+    </p:extLst>
+  </p:cSld>
+  <p:clrMapOvr>
+    <a:masterClrMapping/>
+  </p:clrMapOvr>
+</p:notes>
+</file>
+
+<file path=ppt/notesSlides/notesSlide45.xml><?xml version="1.0" encoding="utf-8"?>
+<p:notes xmlns:a="http://schemas.openxmlformats.org/drawingml/2006/main" xmlns:r="http://schemas.openxmlformats.org/officeDocument/2006/relationships" xmlns:p="http://schemas.openxmlformats.org/presentationml/2006/main">
+  <p:cSld>
+    <p:spTree>
+      <p:nvGrpSpPr>
+        <p:cNvPr id="1" name=""/>
+        <p:cNvGrpSpPr/>
+        <p:nvPr/>
+      </p:nvGrpSpPr>
+      <p:grpSpPr>
+        <a:xfrm>
+          <a:off x="0" y="0"/>
+          <a:ext cx="0" cy="0"/>
+          <a:chOff x="0" y="0"/>
+          <a:chExt cx="0" cy="0"/>
+        </a:xfrm>
+      </p:grpSpPr>
+      <p:sp>
+        <p:nvSpPr>
+          <p:cNvPr id="2" name="Slide Image Placeholder 1"/>
+          <p:cNvSpPr>
+            <a:spLocks noGrp="1" noRot="1" noChangeAspect="1"/>
+          </p:cNvSpPr>
+          <p:nvPr>
+            <p:ph type="sldImg"/>
+          </p:nvPr>
+        </p:nvSpPr>
+        <p:spPr/>
+      </p:sp>
+      <p:sp>
+        <p:nvSpPr>
+          <p:cNvPr id="3" name="Notes Placeholder 2"/>
+          <p:cNvSpPr>
+            <a:spLocks noGrp="1"/>
+          </p:cNvSpPr>
+          <p:nvPr>
+            <p:ph type="body" idx="1"/>
+          </p:nvPr>
+        </p:nvSpPr>
+        <p:spPr/>
+        <p:txBody>
+          <a:bodyPr/>
+          <a:lstStyle/>
+          <a:p>
+            <a:r>
+              <a:rPr lang="en-US" dirty="0"/>
+              <a:t>There are new (smaller) MS2, SQT, and TXT files for just the PSMs that passed the thresholds. There are also PDF pictures of the score histograms and the threshold locations in the “</a:t>
+            </a:r>
+            <a:r>
+              <a:rPr lang="en-US" dirty="0" err="1"/>
+              <a:t>ThresholdFigures</a:t>
+            </a:r>
+            <a:r>
+              <a:rPr lang="en-US" dirty="0"/>
+              <a:t>” folder.</a:t>
+            </a:r>
+          </a:p>
+        </p:txBody>
+      </p:sp>
+      <p:sp>
+        <p:nvSpPr>
+          <p:cNvPr id="4" name="Slide Number Placeholder 3"/>
+          <p:cNvSpPr>
+            <a:spLocks noGrp="1"/>
+          </p:cNvSpPr>
+          <p:nvPr>
+            <p:ph type="sldNum" sz="quarter" idx="5"/>
+          </p:nvPr>
+        </p:nvSpPr>
+        <p:spPr/>
+        <p:txBody>
+          <a:bodyPr/>
+          <a:lstStyle/>
+          <a:p>
+            <a:fld id="{A4DD43C4-7783-D04D-B052-0FD88E2F6FA2}" type="slidenum">
+              <a:rPr lang="en-US" smtClean="0"/>
+              <a:t>45</a:t>
             </a:fld>
             <a:endParaRPr lang="en-US"/>
           </a:p>
@@ -4618,7 +4702,7 @@
           <a:p>
             <a:fld id="{86553D30-0880-8043-8038-369D3614B350}" type="datetimeFigureOut">
               <a:rPr lang="en-US" smtClean="0"/>
-              <a:t>1/16/19</a:t>
+              <a:t>1/18/19</a:t>
             </a:fld>
             <a:endParaRPr lang="en-US"/>
           </a:p>
@@ -4816,7 +4900,7 @@
           <a:p>
             <a:fld id="{86553D30-0880-8043-8038-369D3614B350}" type="datetimeFigureOut">
               <a:rPr lang="en-US" smtClean="0"/>
-              <a:t>1/16/19</a:t>
+              <a:t>1/18/19</a:t>
             </a:fld>
             <a:endParaRPr lang="en-US"/>
           </a:p>
@@ -5024,7 +5108,7 @@
           <a:p>
             <a:fld id="{86553D30-0880-8043-8038-369D3614B350}" type="datetimeFigureOut">
               <a:rPr lang="en-US" smtClean="0"/>
-              <a:t>1/16/19</a:t>
+              <a:t>1/18/19</a:t>
             </a:fld>
             <a:endParaRPr lang="en-US"/>
           </a:p>
@@ -5222,7 +5306,7 @@
           <a:p>
             <a:fld id="{86553D30-0880-8043-8038-369D3614B350}" type="datetimeFigureOut">
               <a:rPr lang="en-US" smtClean="0"/>
-              <a:t>1/16/19</a:t>
+              <a:t>1/18/19</a:t>
             </a:fld>
             <a:endParaRPr lang="en-US"/>
           </a:p>
@@ -5497,7 +5581,7 @@
           <a:p>
             <a:fld id="{86553D30-0880-8043-8038-369D3614B350}" type="datetimeFigureOut">
               <a:rPr lang="en-US" smtClean="0"/>
-              <a:t>1/16/19</a:t>
+              <a:t>1/18/19</a:t>
             </a:fld>
             <a:endParaRPr lang="en-US"/>
           </a:p>
@@ -5762,7 +5846,7 @@
           <a:p>
             <a:fld id="{86553D30-0880-8043-8038-369D3614B350}" type="datetimeFigureOut">
               <a:rPr lang="en-US" smtClean="0"/>
-              <a:t>1/16/19</a:t>
+              <a:t>1/18/19</a:t>
             </a:fld>
             <a:endParaRPr lang="en-US"/>
           </a:p>
@@ -6174,7 +6258,7 @@
           <a:p>
             <a:fld id="{86553D30-0880-8043-8038-369D3614B350}" type="datetimeFigureOut">
               <a:rPr lang="en-US" smtClean="0"/>
-              <a:t>1/16/19</a:t>
+              <a:t>1/18/19</a:t>
             </a:fld>
             <a:endParaRPr lang="en-US"/>
           </a:p>
@@ -6315,7 +6399,7 @@
           <a:p>
             <a:fld id="{86553D30-0880-8043-8038-369D3614B350}" type="datetimeFigureOut">
               <a:rPr lang="en-US" smtClean="0"/>
-              <a:t>1/16/19</a:t>
+              <a:t>1/18/19</a:t>
             </a:fld>
             <a:endParaRPr lang="en-US"/>
           </a:p>
@@ -6428,7 +6512,7 @@
           <a:p>
             <a:fld id="{86553D30-0880-8043-8038-369D3614B350}" type="datetimeFigureOut">
               <a:rPr lang="en-US" smtClean="0"/>
-              <a:t>1/16/19</a:t>
+              <a:t>1/18/19</a:t>
             </a:fld>
             <a:endParaRPr lang="en-US"/>
           </a:p>
@@ -6739,7 +6823,7 @@
           <a:p>
             <a:fld id="{86553D30-0880-8043-8038-369D3614B350}" type="datetimeFigureOut">
               <a:rPr lang="en-US" smtClean="0"/>
-              <a:t>1/16/19</a:t>
+              <a:t>1/18/19</a:t>
             </a:fld>
             <a:endParaRPr lang="en-US"/>
           </a:p>
@@ -7027,7 +7111,7 @@
           <a:p>
             <a:fld id="{86553D30-0880-8043-8038-369D3614B350}" type="datetimeFigureOut">
               <a:rPr lang="en-US" smtClean="0"/>
-              <a:t>1/16/19</a:t>
+              <a:t>1/18/19</a:t>
             </a:fld>
             <a:endParaRPr lang="en-US"/>
           </a:p>
@@ -7268,7 +7352,7 @@
           <a:p>
             <a:fld id="{86553D30-0880-8043-8038-369D3614B350}" type="datetimeFigureOut">
               <a:rPr lang="en-US" smtClean="0"/>
-              <a:t>1/16/19</a:t>
+              <a:t>1/18/19</a:t>
             </a:fld>
             <a:endParaRPr lang="en-US"/>
           </a:p>
@@ -8107,6 +8191,84 @@
           </a:p>
         </p:txBody>
       </p:sp>
+      <p:sp>
+        <p:nvSpPr>
+          <p:cNvPr id="7" name="TextBox 6">
+            <a:extLst>
+              <a:ext uri="{FF2B5EF4-FFF2-40B4-BE49-F238E27FC236}">
+                <a16:creationId xmlns:a16="http://schemas.microsoft.com/office/drawing/2014/main" id="{3220C466-8F5E-A14D-BD9E-B758D97BD465}"/>
+              </a:ext>
+            </a:extLst>
+          </p:cNvPr>
+          <p:cNvSpPr txBox="1"/>
+          <p:nvPr/>
+        </p:nvSpPr>
+        <p:spPr>
+          <a:xfrm>
+            <a:off x="4778825" y="87082"/>
+            <a:ext cx="1922065" cy="369332"/>
+          </a:xfrm>
+          <a:prstGeom prst="rect">
+            <a:avLst/>
+          </a:prstGeom>
+          <a:noFill/>
+        </p:spPr>
+        <p:txBody>
+          <a:bodyPr wrap="none" rtlCol="0">
+            <a:spAutoFit/>
+          </a:bodyPr>
+          <a:lstStyle/>
+          <a:p>
+            <a:r>
+              <a:rPr lang="en-US" b="1" dirty="0">
+                <a:solidFill>
+                  <a:srgbClr val="FF0000"/>
+                </a:solidFill>
+              </a:rPr>
+              <a:t>&lt;- Control buttons</a:t>
+            </a:r>
+          </a:p>
+        </p:txBody>
+      </p:sp>
+      <p:sp>
+        <p:nvSpPr>
+          <p:cNvPr id="8" name="TextBox 7">
+            <a:extLst>
+              <a:ext uri="{FF2B5EF4-FFF2-40B4-BE49-F238E27FC236}">
+                <a16:creationId xmlns:a16="http://schemas.microsoft.com/office/drawing/2014/main" id="{1AF8E251-3C19-EC45-A201-E4EEA6B7691F}"/>
+              </a:ext>
+            </a:extLst>
+          </p:cNvPr>
+          <p:cNvSpPr txBox="1"/>
+          <p:nvPr/>
+        </p:nvSpPr>
+        <p:spPr>
+          <a:xfrm>
+            <a:off x="3881852" y="260862"/>
+            <a:ext cx="847348" cy="369332"/>
+          </a:xfrm>
+          <a:prstGeom prst="rect">
+            <a:avLst/>
+          </a:prstGeom>
+          <a:noFill/>
+        </p:spPr>
+        <p:txBody>
+          <a:bodyPr wrap="none" rtlCol="0">
+            <a:spAutoFit/>
+          </a:bodyPr>
+          <a:lstStyle/>
+          <a:p>
+            <a:r>
+              <a:rPr lang="en-US" b="1" dirty="0">
+                <a:solidFill>
+                  <a:srgbClr val="FF0000"/>
+                </a:solidFill>
+              </a:rPr>
+              <a:t>&lt;- Tabs</a:t>
+            </a:r>
+          </a:p>
+        </p:txBody>
+      </p:sp>
     </p:spTree>
     <p:extLst>
       <p:ext uri="{BB962C8B-B14F-4D97-AF65-F5344CB8AC3E}">
@@ -8599,7 +8761,7 @@
           <p:cNvPr id="3" name="Picture 2">
             <a:extLst>
               <a:ext uri="{FF2B5EF4-FFF2-40B4-BE49-F238E27FC236}">
-                <a16:creationId xmlns:a16="http://schemas.microsoft.com/office/drawing/2014/main" id="{F64D5F37-CE68-DE46-95A1-B8A48AB988AF}"/>
+                <a16:creationId xmlns:a16="http://schemas.microsoft.com/office/drawing/2014/main" id="{75D4EDCF-0F05-F546-815C-9F1253512F9A}"/>
               </a:ext>
             </a:extLst>
           </p:cNvPr>
@@ -8626,10 +8788,10 @@
       </p:pic>
       <p:sp>
         <p:nvSpPr>
-          <p:cNvPr id="4" name="Oval 3">
-            <a:extLst>
-              <a:ext uri="{FF2B5EF4-FFF2-40B4-BE49-F238E27FC236}">
-                <a16:creationId xmlns:a16="http://schemas.microsoft.com/office/drawing/2014/main" id="{FBC1E506-B5E9-0B4E-B7EC-F903E0F00816}"/>
+          <p:cNvPr id="15" name="Oval 14">
+            <a:extLst>
+              <a:ext uri="{FF2B5EF4-FFF2-40B4-BE49-F238E27FC236}">
+                <a16:creationId xmlns:a16="http://schemas.microsoft.com/office/drawing/2014/main" id="{5B5BB33C-7C69-8143-A316-3CFDDFE479B0}"/>
               </a:ext>
             </a:extLst>
           </p:cNvPr>
@@ -8679,7 +8841,7 @@
     </p:spTree>
     <p:extLst>
       <p:ext uri="{BB962C8B-B14F-4D97-AF65-F5344CB8AC3E}">
-        <p14:creationId xmlns:p14="http://schemas.microsoft.com/office/powerpoint/2010/main" val="3578584266"/>
+        <p14:creationId xmlns:p14="http://schemas.microsoft.com/office/powerpoint/2010/main" val="4167532608"/>
       </p:ext>
     </p:extLst>
   </p:cSld>
@@ -8711,7 +8873,7 @@
           <p:cNvPr id="3" name="Picture 2">
             <a:extLst>
               <a:ext uri="{FF2B5EF4-FFF2-40B4-BE49-F238E27FC236}">
-                <a16:creationId xmlns:a16="http://schemas.microsoft.com/office/drawing/2014/main" id="{D9A7DAA5-4BF5-FB4D-B661-9F3D761BD4E3}"/>
+                <a16:creationId xmlns:a16="http://schemas.microsoft.com/office/drawing/2014/main" id="{F64D5F37-CE68-DE46-95A1-B8A48AB988AF}"/>
               </a:ext>
             </a:extLst>
           </p:cNvPr>
@@ -8738,10 +8900,10 @@
       </p:pic>
       <p:sp>
         <p:nvSpPr>
-          <p:cNvPr id="5" name="Oval 4">
-            <a:extLst>
-              <a:ext uri="{FF2B5EF4-FFF2-40B4-BE49-F238E27FC236}">
-                <a16:creationId xmlns:a16="http://schemas.microsoft.com/office/drawing/2014/main" id="{09475913-A43F-404E-8249-68A3E5909B12}"/>
+          <p:cNvPr id="4" name="Oval 3">
+            <a:extLst>
+              <a:ext uri="{FF2B5EF4-FFF2-40B4-BE49-F238E27FC236}">
+                <a16:creationId xmlns:a16="http://schemas.microsoft.com/office/drawing/2014/main" id="{FBC1E506-B5E9-0B4E-B7EC-F903E0F00816}"/>
               </a:ext>
             </a:extLst>
           </p:cNvPr>
@@ -8750,8 +8912,8 @@
         </p:nvSpPr>
         <p:spPr>
           <a:xfrm>
-            <a:off x="3680848" y="2316997"/>
-            <a:ext cx="1921790" cy="1921790"/>
+            <a:off x="3541363" y="2185261"/>
+            <a:ext cx="2231756" cy="2224007"/>
           </a:xfrm>
           <a:prstGeom prst="ellipse">
             <a:avLst/>
@@ -8791,7 +8953,7 @@
     </p:spTree>
     <p:extLst>
       <p:ext uri="{BB962C8B-B14F-4D97-AF65-F5344CB8AC3E}">
-        <p14:creationId xmlns:p14="http://schemas.microsoft.com/office/powerpoint/2010/main" val="1330810077"/>
+        <p14:creationId xmlns:p14="http://schemas.microsoft.com/office/powerpoint/2010/main" val="3578584266"/>
       </p:ext>
     </p:extLst>
   </p:cSld>
@@ -8823,7 +8985,7 @@
           <p:cNvPr id="3" name="Picture 2">
             <a:extLst>
               <a:ext uri="{FF2B5EF4-FFF2-40B4-BE49-F238E27FC236}">
-                <a16:creationId xmlns:a16="http://schemas.microsoft.com/office/drawing/2014/main" id="{1E7CE3E7-9033-D349-A410-B5AEBE2760E1}"/>
+                <a16:creationId xmlns:a16="http://schemas.microsoft.com/office/drawing/2014/main" id="{D9A7DAA5-4BF5-FB4D-B661-9F3D761BD4E3}"/>
               </a:ext>
             </a:extLst>
           </p:cNvPr>
@@ -8850,10 +9012,10 @@
       </p:pic>
       <p:sp>
         <p:nvSpPr>
-          <p:cNvPr id="4" name="Oval 3">
-            <a:extLst>
-              <a:ext uri="{FF2B5EF4-FFF2-40B4-BE49-F238E27FC236}">
-                <a16:creationId xmlns:a16="http://schemas.microsoft.com/office/drawing/2014/main" id="{2C56CA15-0B41-F341-A2EA-128D90EA703F}"/>
+          <p:cNvPr id="5" name="Oval 4">
+            <a:extLst>
+              <a:ext uri="{FF2B5EF4-FFF2-40B4-BE49-F238E27FC236}">
+                <a16:creationId xmlns:a16="http://schemas.microsoft.com/office/drawing/2014/main" id="{09475913-A43F-404E-8249-68A3E5909B12}"/>
               </a:ext>
             </a:extLst>
           </p:cNvPr>
@@ -8900,10 +9062,52 @@
           </a:p>
         </p:txBody>
       </p:sp>
+      <p:cxnSp>
+        <p:nvCxnSpPr>
+          <p:cNvPr id="4" name="Straight Arrow Connector 3">
+            <a:extLst>
+              <a:ext uri="{FF2B5EF4-FFF2-40B4-BE49-F238E27FC236}">
+                <a16:creationId xmlns:a16="http://schemas.microsoft.com/office/drawing/2014/main" id="{19E0F792-0551-A14D-9EBF-93FCE4FB204C}"/>
+              </a:ext>
+            </a:extLst>
+          </p:cNvPr>
+          <p:cNvCxnSpPr/>
+          <p:nvPr/>
+        </p:nvCxnSpPr>
+        <p:spPr>
+          <a:xfrm flipV="1">
+            <a:off x="3233057" y="555171"/>
+            <a:ext cx="163286" cy="293915"/>
+          </a:xfrm>
+          <a:prstGeom prst="straightConnector1">
+            <a:avLst/>
+          </a:prstGeom>
+          <a:ln w="38100">
+            <a:solidFill>
+              <a:srgbClr val="FF0000"/>
+            </a:solidFill>
+            <a:tailEnd type="triangle"/>
+          </a:ln>
+        </p:spPr>
+        <p:style>
+          <a:lnRef idx="1">
+            <a:schemeClr val="accent1"/>
+          </a:lnRef>
+          <a:fillRef idx="0">
+            <a:schemeClr val="accent1"/>
+          </a:fillRef>
+          <a:effectRef idx="0">
+            <a:schemeClr val="accent1"/>
+          </a:effectRef>
+          <a:fontRef idx="minor">
+            <a:schemeClr val="tx1"/>
+          </a:fontRef>
+        </p:style>
+      </p:cxnSp>
     </p:spTree>
     <p:extLst>
       <p:ext uri="{BB962C8B-B14F-4D97-AF65-F5344CB8AC3E}">
-        <p14:creationId xmlns:p14="http://schemas.microsoft.com/office/powerpoint/2010/main" val="1568529349"/>
+        <p14:creationId xmlns:p14="http://schemas.microsoft.com/office/powerpoint/2010/main" val="1330810077"/>
       </p:ext>
     </p:extLst>
   </p:cSld>
@@ -8935,7 +9139,7 @@
           <p:cNvPr id="3" name="Picture 2">
             <a:extLst>
               <a:ext uri="{FF2B5EF4-FFF2-40B4-BE49-F238E27FC236}">
-                <a16:creationId xmlns:a16="http://schemas.microsoft.com/office/drawing/2014/main" id="{A4D8D4CE-9F17-5C44-8D9D-0ADF2082D9D0}"/>
+                <a16:creationId xmlns:a16="http://schemas.microsoft.com/office/drawing/2014/main" id="{1E7CE3E7-9033-D349-A410-B5AEBE2760E1}"/>
               </a:ext>
             </a:extLst>
           </p:cNvPr>
@@ -8965,7 +9169,7 @@
           <p:cNvPr id="4" name="Oval 3">
             <a:extLst>
               <a:ext uri="{FF2B5EF4-FFF2-40B4-BE49-F238E27FC236}">
-                <a16:creationId xmlns:a16="http://schemas.microsoft.com/office/drawing/2014/main" id="{5CE94A8A-F7A7-A74E-8328-8EDFBC797409}"/>
+                <a16:creationId xmlns:a16="http://schemas.microsoft.com/office/drawing/2014/main" id="{2C56CA15-0B41-F341-A2EA-128D90EA703F}"/>
               </a:ext>
             </a:extLst>
           </p:cNvPr>
@@ -9012,104 +9216,10 @@
           </a:p>
         </p:txBody>
       </p:sp>
-      <p:sp>
-        <p:nvSpPr>
-          <p:cNvPr id="5" name="Oval 4">
-            <a:extLst>
-              <a:ext uri="{FF2B5EF4-FFF2-40B4-BE49-F238E27FC236}">
-                <a16:creationId xmlns:a16="http://schemas.microsoft.com/office/drawing/2014/main" id="{1E9FE5B6-E6B0-DF47-8414-3E9CEBBFF0F1}"/>
-              </a:ext>
-            </a:extLst>
-          </p:cNvPr>
-          <p:cNvSpPr/>
-          <p:nvPr/>
-        </p:nvSpPr>
-        <p:spPr>
-          <a:xfrm>
-            <a:off x="6646192" y="2407403"/>
-            <a:ext cx="1921790" cy="1921790"/>
-          </a:xfrm>
-          <a:prstGeom prst="ellipse">
-            <a:avLst/>
-          </a:prstGeom>
-          <a:noFill/>
-          <a:ln w="38100">
-            <a:solidFill>
-              <a:srgbClr val="FF0000"/>
-            </a:solidFill>
-          </a:ln>
-        </p:spPr>
-        <p:style>
-          <a:lnRef idx="2">
-            <a:schemeClr val="accent1">
-              <a:shade val="50000"/>
-            </a:schemeClr>
-          </a:lnRef>
-          <a:fillRef idx="1">
-            <a:schemeClr val="accent1"/>
-          </a:fillRef>
-          <a:effectRef idx="0">
-            <a:schemeClr val="accent1"/>
-          </a:effectRef>
-          <a:fontRef idx="minor">
-            <a:schemeClr val="lt1"/>
-          </a:fontRef>
-        </p:style>
-        <p:txBody>
-          <a:bodyPr rtlCol="0" anchor="ctr"/>
-          <a:lstStyle/>
-          <a:p>
-            <a:pPr algn="ctr"/>
-            <a:endParaRPr lang="en-US"/>
-          </a:p>
-        </p:txBody>
-      </p:sp>
-      <p:cxnSp>
-        <p:nvCxnSpPr>
-          <p:cNvPr id="7" name="Straight Arrow Connector 6">
-            <a:extLst>
-              <a:ext uri="{FF2B5EF4-FFF2-40B4-BE49-F238E27FC236}">
-                <a16:creationId xmlns:a16="http://schemas.microsoft.com/office/drawing/2014/main" id="{D4351326-DBD8-C84A-8D6C-4C3912BD20EC}"/>
-              </a:ext>
-            </a:extLst>
-          </p:cNvPr>
-          <p:cNvCxnSpPr/>
-          <p:nvPr/>
-        </p:nvCxnSpPr>
-        <p:spPr>
-          <a:xfrm>
-            <a:off x="6989736" y="3161654"/>
-            <a:ext cx="294467" cy="333214"/>
-          </a:xfrm>
-          <a:prstGeom prst="straightConnector1">
-            <a:avLst/>
-          </a:prstGeom>
-          <a:ln w="38100">
-            <a:solidFill>
-              <a:srgbClr val="FF0000"/>
-            </a:solidFill>
-            <a:tailEnd type="triangle"/>
-          </a:ln>
-        </p:spPr>
-        <p:style>
-          <a:lnRef idx="1">
-            <a:schemeClr val="accent1"/>
-          </a:lnRef>
-          <a:fillRef idx="0">
-            <a:schemeClr val="accent1"/>
-          </a:fillRef>
-          <a:effectRef idx="0">
-            <a:schemeClr val="accent1"/>
-          </a:effectRef>
-          <a:fontRef idx="minor">
-            <a:schemeClr val="tx1"/>
-          </a:fontRef>
-        </p:style>
-      </p:cxnSp>
     </p:spTree>
     <p:extLst>
       <p:ext uri="{BB962C8B-B14F-4D97-AF65-F5344CB8AC3E}">
-        <p14:creationId xmlns:p14="http://schemas.microsoft.com/office/powerpoint/2010/main" val="3162353538"/>
+        <p14:creationId xmlns:p14="http://schemas.microsoft.com/office/powerpoint/2010/main" val="1568529349"/>
       </p:ext>
     </p:extLst>
   </p:cSld>
@@ -9141,7 +9251,7 @@
           <p:cNvPr id="3" name="Picture 2">
             <a:extLst>
               <a:ext uri="{FF2B5EF4-FFF2-40B4-BE49-F238E27FC236}">
-                <a16:creationId xmlns:a16="http://schemas.microsoft.com/office/drawing/2014/main" id="{DA6A4FF8-6404-DC4F-9F0A-12CACD627EFA}"/>
+                <a16:creationId xmlns:a16="http://schemas.microsoft.com/office/drawing/2014/main" id="{A4D8D4CE-9F17-5C44-8D9D-0ADF2082D9D0}"/>
               </a:ext>
             </a:extLst>
           </p:cNvPr>
@@ -9168,10 +9278,10 @@
       </p:pic>
       <p:sp>
         <p:nvSpPr>
-          <p:cNvPr id="4" name="Rounded Rectangle 3">
-            <a:extLst>
-              <a:ext uri="{FF2B5EF4-FFF2-40B4-BE49-F238E27FC236}">
-                <a16:creationId xmlns:a16="http://schemas.microsoft.com/office/drawing/2014/main" id="{89C3A116-855F-6544-9CD6-2DC0BA6D9975}"/>
+          <p:cNvPr id="4" name="Oval 3">
+            <a:extLst>
+              <a:ext uri="{FF2B5EF4-FFF2-40B4-BE49-F238E27FC236}">
+                <a16:creationId xmlns:a16="http://schemas.microsoft.com/office/drawing/2014/main" id="{5CE94A8A-F7A7-A74E-8328-8EDFBC797409}"/>
               </a:ext>
             </a:extLst>
           </p:cNvPr>
@@ -9180,14 +9290,14 @@
         </p:nvSpPr>
         <p:spPr>
           <a:xfrm>
-            <a:off x="2758698" y="108488"/>
-            <a:ext cx="1340604" cy="356461"/>
-          </a:xfrm>
-          <a:prstGeom prst="roundRect">
+            <a:off x="3680848" y="2316997"/>
+            <a:ext cx="1921790" cy="1921790"/>
+          </a:xfrm>
+          <a:prstGeom prst="ellipse">
             <a:avLst/>
           </a:prstGeom>
           <a:noFill/>
-          <a:ln w="57150">
+          <a:ln w="38100">
             <a:solidFill>
               <a:srgbClr val="FF0000"/>
             </a:solidFill>
@@ -9220,47 +9330,102 @@
       </p:sp>
       <p:sp>
         <p:nvSpPr>
-          <p:cNvPr id="5" name="TextBox 4">
-            <a:extLst>
-              <a:ext uri="{FF2B5EF4-FFF2-40B4-BE49-F238E27FC236}">
-                <a16:creationId xmlns:a16="http://schemas.microsoft.com/office/drawing/2014/main" id="{D8BE5727-C5D7-3746-B2B6-8E523691C9F6}"/>
-              </a:ext>
-            </a:extLst>
-          </p:cNvPr>
-          <p:cNvSpPr txBox="1"/>
+          <p:cNvPr id="5" name="Oval 4">
+            <a:extLst>
+              <a:ext uri="{FF2B5EF4-FFF2-40B4-BE49-F238E27FC236}">
+                <a16:creationId xmlns:a16="http://schemas.microsoft.com/office/drawing/2014/main" id="{1E9FE5B6-E6B0-DF47-8414-3E9CEBBFF0F1}"/>
+              </a:ext>
+            </a:extLst>
+          </p:cNvPr>
+          <p:cNvSpPr/>
           <p:nvPr/>
         </p:nvSpPr>
         <p:spPr>
           <a:xfrm>
-            <a:off x="4099302" y="294467"/>
-            <a:ext cx="4563942" cy="369332"/>
-          </a:xfrm>
-          <a:prstGeom prst="rect">
+            <a:off x="6646192" y="2407403"/>
+            <a:ext cx="1921790" cy="1921790"/>
+          </a:xfrm>
+          <a:prstGeom prst="ellipse">
             <a:avLst/>
           </a:prstGeom>
           <a:noFill/>
-        </p:spPr>
-        <p:txBody>
-          <a:bodyPr wrap="none" rtlCol="0">
-            <a:spAutoFit/>
-          </a:bodyPr>
-          <a:lstStyle/>
-          <a:p>
-            <a:r>
-              <a:rPr lang="en-US" b="1" dirty="0">
-                <a:solidFill>
-                  <a:srgbClr val="FF0000"/>
-                </a:solidFill>
-              </a:rPr>
-              <a:t>Click to compute conditional score histograms</a:t>
-            </a:r>
-          </a:p>
-        </p:txBody>
-      </p:sp>
+          <a:ln w="38100">
+            <a:solidFill>
+              <a:srgbClr val="FF0000"/>
+            </a:solidFill>
+          </a:ln>
+        </p:spPr>
+        <p:style>
+          <a:lnRef idx="2">
+            <a:schemeClr val="accent1">
+              <a:shade val="50000"/>
+            </a:schemeClr>
+          </a:lnRef>
+          <a:fillRef idx="1">
+            <a:schemeClr val="accent1"/>
+          </a:fillRef>
+          <a:effectRef idx="0">
+            <a:schemeClr val="accent1"/>
+          </a:effectRef>
+          <a:fontRef idx="minor">
+            <a:schemeClr val="lt1"/>
+          </a:fontRef>
+        </p:style>
+        <p:txBody>
+          <a:bodyPr rtlCol="0" anchor="ctr"/>
+          <a:lstStyle/>
+          <a:p>
+            <a:pPr algn="ctr"/>
+            <a:endParaRPr lang="en-US"/>
+          </a:p>
+        </p:txBody>
+      </p:sp>
+      <p:cxnSp>
+        <p:nvCxnSpPr>
+          <p:cNvPr id="7" name="Straight Arrow Connector 6">
+            <a:extLst>
+              <a:ext uri="{FF2B5EF4-FFF2-40B4-BE49-F238E27FC236}">
+                <a16:creationId xmlns:a16="http://schemas.microsoft.com/office/drawing/2014/main" id="{D4351326-DBD8-C84A-8D6C-4C3912BD20EC}"/>
+              </a:ext>
+            </a:extLst>
+          </p:cNvPr>
+          <p:cNvCxnSpPr/>
+          <p:nvPr/>
+        </p:nvCxnSpPr>
+        <p:spPr>
+          <a:xfrm>
+            <a:off x="6989736" y="3161654"/>
+            <a:ext cx="294467" cy="333214"/>
+          </a:xfrm>
+          <a:prstGeom prst="straightConnector1">
+            <a:avLst/>
+          </a:prstGeom>
+          <a:ln w="38100">
+            <a:solidFill>
+              <a:srgbClr val="FF0000"/>
+            </a:solidFill>
+            <a:tailEnd type="triangle"/>
+          </a:ln>
+        </p:spPr>
+        <p:style>
+          <a:lnRef idx="1">
+            <a:schemeClr val="accent1"/>
+          </a:lnRef>
+          <a:fillRef idx="0">
+            <a:schemeClr val="accent1"/>
+          </a:fillRef>
+          <a:effectRef idx="0">
+            <a:schemeClr val="accent1"/>
+          </a:effectRef>
+          <a:fontRef idx="minor">
+            <a:schemeClr val="tx1"/>
+          </a:fontRef>
+        </p:style>
+      </p:cxnSp>
     </p:spTree>
     <p:extLst>
       <p:ext uri="{BB962C8B-B14F-4D97-AF65-F5344CB8AC3E}">
-        <p14:creationId xmlns:p14="http://schemas.microsoft.com/office/powerpoint/2010/main" val="2119918531"/>
+        <p14:creationId xmlns:p14="http://schemas.microsoft.com/office/powerpoint/2010/main" val="3162353538"/>
       </p:ext>
     </p:extLst>
   </p:cSld>
@@ -9292,7 +9457,7 @@
           <p:cNvPr id="3" name="Picture 2">
             <a:extLst>
               <a:ext uri="{FF2B5EF4-FFF2-40B4-BE49-F238E27FC236}">
-                <a16:creationId xmlns:a16="http://schemas.microsoft.com/office/drawing/2014/main" id="{83B0DE7B-E656-BC47-B7A8-E3942DE55434}"/>
+                <a16:creationId xmlns:a16="http://schemas.microsoft.com/office/drawing/2014/main" id="{DA6A4FF8-6404-DC4F-9F0A-12CACD627EFA}"/>
               </a:ext>
             </a:extLst>
           </p:cNvPr>
@@ -9309,8 +9474,8 @@
         </p:blipFill>
         <p:spPr>
           <a:xfrm>
-            <a:off x="1875263" y="0"/>
-            <a:ext cx="8441473" cy="6858000"/>
+            <a:off x="2946833" y="0"/>
+            <a:ext cx="6298334" cy="6858000"/>
           </a:xfrm>
           <a:prstGeom prst="rect">
             <a:avLst/>
@@ -9319,413 +9484,26 @@
       </p:pic>
       <p:sp>
         <p:nvSpPr>
-          <p:cNvPr id="2" name="TextBox 1">
-            <a:extLst>
-              <a:ext uri="{FF2B5EF4-FFF2-40B4-BE49-F238E27FC236}">
-                <a16:creationId xmlns:a16="http://schemas.microsoft.com/office/drawing/2014/main" id="{EEDDC34C-1D79-734F-8A71-80900FF49FAE}"/>
-              </a:ext>
-            </a:extLst>
-          </p:cNvPr>
-          <p:cNvSpPr txBox="1"/>
+          <p:cNvPr id="4" name="Rounded Rectangle 3">
+            <a:extLst>
+              <a:ext uri="{FF2B5EF4-FFF2-40B4-BE49-F238E27FC236}">
+                <a16:creationId xmlns:a16="http://schemas.microsoft.com/office/drawing/2014/main" id="{89C3A116-855F-6544-9CD6-2DC0BA6D9975}"/>
+              </a:ext>
+            </a:extLst>
+          </p:cNvPr>
+          <p:cNvSpPr/>
           <p:nvPr/>
         </p:nvSpPr>
         <p:spPr>
           <a:xfrm>
-            <a:off x="6180462" y="187286"/>
-            <a:ext cx="1733936" cy="338554"/>
-          </a:xfrm>
-          <a:prstGeom prst="rect">
+            <a:off x="2758698" y="108488"/>
+            <a:ext cx="1340604" cy="356461"/>
+          </a:xfrm>
+          <a:prstGeom prst="roundRect">
             <a:avLst/>
           </a:prstGeom>
           <a:noFill/>
-        </p:spPr>
-        <p:txBody>
-          <a:bodyPr wrap="none" rtlCol="0">
-            <a:spAutoFit/>
-          </a:bodyPr>
-          <a:lstStyle/>
-          <a:p>
-            <a:r>
-              <a:rPr lang="en-US" sz="1600" b="1" dirty="0">
-                <a:solidFill>
-                  <a:srgbClr val="FF0000"/>
-                </a:solidFill>
-              </a:rPr>
-              <a:t>&lt;- Control buttons</a:t>
-            </a:r>
-          </a:p>
-        </p:txBody>
-      </p:sp>
-      <p:sp>
-        <p:nvSpPr>
-          <p:cNvPr id="4" name="TextBox 3">
-            <a:extLst>
-              <a:ext uri="{FF2B5EF4-FFF2-40B4-BE49-F238E27FC236}">
-                <a16:creationId xmlns:a16="http://schemas.microsoft.com/office/drawing/2014/main" id="{A70E5A2F-E891-754F-923B-E0B4810EC2E6}"/>
-              </a:ext>
-            </a:extLst>
-          </p:cNvPr>
-          <p:cNvSpPr txBox="1"/>
-          <p:nvPr/>
-        </p:nvSpPr>
-        <p:spPr>
-          <a:xfrm>
-            <a:off x="6564219" y="427822"/>
-            <a:ext cx="1298048" cy="338554"/>
-          </a:xfrm>
-          <a:prstGeom prst="rect">
-            <a:avLst/>
-          </a:prstGeom>
-          <a:noFill/>
-        </p:spPr>
-        <p:txBody>
-          <a:bodyPr wrap="none" rtlCol="0">
-            <a:spAutoFit/>
-          </a:bodyPr>
-          <a:lstStyle/>
-          <a:p>
-            <a:r>
-              <a:rPr lang="en-US" sz="1600" b="1" dirty="0">
-                <a:solidFill>
-                  <a:srgbClr val="FF0000"/>
-                </a:solidFill>
-              </a:rPr>
-              <a:t>&lt;- Outer tabs</a:t>
-            </a:r>
-          </a:p>
-        </p:txBody>
-      </p:sp>
-      <p:sp>
-        <p:nvSpPr>
-          <p:cNvPr id="5" name="TextBox 4">
-            <a:extLst>
-              <a:ext uri="{FF2B5EF4-FFF2-40B4-BE49-F238E27FC236}">
-                <a16:creationId xmlns:a16="http://schemas.microsoft.com/office/drawing/2014/main" id="{3FCDE4EE-096E-EE44-8D8B-426EF093C35D}"/>
-              </a:ext>
-            </a:extLst>
-          </p:cNvPr>
-          <p:cNvSpPr txBox="1"/>
-          <p:nvPr/>
-        </p:nvSpPr>
-        <p:spPr>
-          <a:xfrm>
-            <a:off x="3009777" y="630150"/>
-            <a:ext cx="1255665" cy="338554"/>
-          </a:xfrm>
-          <a:prstGeom prst="rect">
-            <a:avLst/>
-          </a:prstGeom>
-          <a:noFill/>
-        </p:spPr>
-        <p:txBody>
-          <a:bodyPr wrap="none" rtlCol="0">
-            <a:spAutoFit/>
-          </a:bodyPr>
-          <a:lstStyle/>
-          <a:p>
-            <a:r>
-              <a:rPr lang="en-US" sz="1600" b="1" dirty="0">
-                <a:solidFill>
-                  <a:srgbClr val="FF0000"/>
-                </a:solidFill>
-              </a:rPr>
-              <a:t>&lt;- Inner tabs</a:t>
-            </a:r>
-          </a:p>
-        </p:txBody>
-      </p:sp>
-      <p:sp>
-        <p:nvSpPr>
-          <p:cNvPr id="6" name="TextBox 5">
-            <a:extLst>
-              <a:ext uri="{FF2B5EF4-FFF2-40B4-BE49-F238E27FC236}">
-                <a16:creationId xmlns:a16="http://schemas.microsoft.com/office/drawing/2014/main" id="{F5B8143A-215B-394C-B023-279297520CC1}"/>
-              </a:ext>
-            </a:extLst>
-          </p:cNvPr>
-          <p:cNvSpPr txBox="1"/>
-          <p:nvPr/>
-        </p:nvSpPr>
-        <p:spPr>
-          <a:xfrm>
-            <a:off x="3283026" y="1275688"/>
-            <a:ext cx="1824346" cy="646331"/>
-          </a:xfrm>
-          <a:prstGeom prst="rect">
-            <a:avLst/>
-          </a:prstGeom>
-          <a:noFill/>
-        </p:spPr>
-        <p:txBody>
-          <a:bodyPr wrap="none" rtlCol="0">
-            <a:spAutoFit/>
-          </a:bodyPr>
-          <a:lstStyle/>
-          <a:p>
-            <a:r>
-              <a:rPr lang="en-US" b="1" dirty="0">
-                <a:solidFill>
-                  <a:srgbClr val="FF0000"/>
-                </a:solidFill>
-              </a:rPr>
-              <a:t>Semi-tryptic</a:t>
-            </a:r>
-            <a:br>
-              <a:rPr lang="en-US" b="1" dirty="0">
-                <a:solidFill>
-                  <a:srgbClr val="FF0000"/>
-                </a:solidFill>
-              </a:rPr>
-            </a:br>
-            <a:r>
-              <a:rPr lang="en-US" b="1" dirty="0">
-                <a:solidFill>
-                  <a:srgbClr val="FF0000"/>
-                </a:solidFill>
-              </a:rPr>
-              <a:t>peptides (empty)</a:t>
-            </a:r>
-          </a:p>
-        </p:txBody>
-      </p:sp>
-      <p:sp>
-        <p:nvSpPr>
-          <p:cNvPr id="7" name="TextBox 6">
-            <a:extLst>
-              <a:ext uri="{FF2B5EF4-FFF2-40B4-BE49-F238E27FC236}">
-                <a16:creationId xmlns:a16="http://schemas.microsoft.com/office/drawing/2014/main" id="{7E9E4328-FB7C-5A44-AE32-48A91B87789C}"/>
-              </a:ext>
-            </a:extLst>
-          </p:cNvPr>
-          <p:cNvSpPr txBox="1"/>
-          <p:nvPr/>
-        </p:nvSpPr>
-        <p:spPr>
-          <a:xfrm>
-            <a:off x="6915228" y="1275688"/>
-            <a:ext cx="1328569" cy="646331"/>
-          </a:xfrm>
-          <a:prstGeom prst="rect">
-            <a:avLst/>
-          </a:prstGeom>
-          <a:noFill/>
-        </p:spPr>
-        <p:txBody>
-          <a:bodyPr wrap="none" rtlCol="0">
-            <a:spAutoFit/>
-          </a:bodyPr>
-          <a:lstStyle/>
-          <a:p>
-            <a:r>
-              <a:rPr lang="en-US" b="1" dirty="0">
-                <a:solidFill>
-                  <a:srgbClr val="FF0000"/>
-                </a:solidFill>
-              </a:rPr>
-              <a:t>Fully-tryptic</a:t>
-            </a:r>
-            <a:br>
-              <a:rPr lang="en-US" b="1" dirty="0">
-                <a:solidFill>
-                  <a:srgbClr val="FF0000"/>
-                </a:solidFill>
-              </a:rPr>
-            </a:br>
-            <a:r>
-              <a:rPr lang="en-US" b="1" dirty="0">
-                <a:solidFill>
-                  <a:srgbClr val="FF0000"/>
-                </a:solidFill>
-              </a:rPr>
-              <a:t>peptides</a:t>
-            </a:r>
-          </a:p>
-        </p:txBody>
-      </p:sp>
-      <p:sp>
-        <p:nvSpPr>
-          <p:cNvPr id="8" name="TextBox 7">
-            <a:extLst>
-              <a:ext uri="{FF2B5EF4-FFF2-40B4-BE49-F238E27FC236}">
-                <a16:creationId xmlns:a16="http://schemas.microsoft.com/office/drawing/2014/main" id="{590AFEA3-0205-D841-824E-46EB4E6C6BD1}"/>
-              </a:ext>
-            </a:extLst>
-          </p:cNvPr>
-          <p:cNvSpPr txBox="1"/>
-          <p:nvPr/>
-        </p:nvSpPr>
-        <p:spPr>
-          <a:xfrm>
-            <a:off x="6964327" y="2302535"/>
-            <a:ext cx="861967" cy="369332"/>
-          </a:xfrm>
-          <a:prstGeom prst="rect">
-            <a:avLst/>
-          </a:prstGeom>
-          <a:noFill/>
-        </p:spPr>
-        <p:txBody>
-          <a:bodyPr wrap="none" rtlCol="0">
-            <a:spAutoFit/>
-          </a:bodyPr>
-          <a:lstStyle/>
-          <a:p>
-            <a:r>
-              <a:rPr lang="en-US" b="1" dirty="0">
-                <a:solidFill>
-                  <a:srgbClr val="FF0000"/>
-                </a:solidFill>
-              </a:rPr>
-              <a:t>Decoys</a:t>
-            </a:r>
-          </a:p>
-        </p:txBody>
-      </p:sp>
-      <p:sp>
-        <p:nvSpPr>
-          <p:cNvPr id="9" name="TextBox 8">
-            <a:extLst>
-              <a:ext uri="{FF2B5EF4-FFF2-40B4-BE49-F238E27FC236}">
-                <a16:creationId xmlns:a16="http://schemas.microsoft.com/office/drawing/2014/main" id="{C1ACFC55-D1E9-F14B-AD15-29714315A543}"/>
-              </a:ext>
-            </a:extLst>
-          </p:cNvPr>
-          <p:cNvSpPr txBox="1"/>
-          <p:nvPr/>
-        </p:nvSpPr>
-        <p:spPr>
-          <a:xfrm>
-            <a:off x="9197188" y="1552687"/>
-            <a:ext cx="865750" cy="369332"/>
-          </a:xfrm>
-          <a:prstGeom prst="rect">
-            <a:avLst/>
-          </a:prstGeom>
-          <a:noFill/>
-        </p:spPr>
-        <p:txBody>
-          <a:bodyPr wrap="none" rtlCol="0">
-            <a:spAutoFit/>
-          </a:bodyPr>
-          <a:lstStyle/>
-          <a:p>
-            <a:r>
-              <a:rPr lang="en-US" b="1" dirty="0">
-                <a:solidFill>
-                  <a:srgbClr val="0070C0"/>
-                </a:solidFill>
-              </a:rPr>
-              <a:t>Targets</a:t>
-            </a:r>
-          </a:p>
-        </p:txBody>
-      </p:sp>
-      <p:cxnSp>
-        <p:nvCxnSpPr>
-          <p:cNvPr id="11" name="Straight Arrow Connector 10">
-            <a:extLst>
-              <a:ext uri="{FF2B5EF4-FFF2-40B4-BE49-F238E27FC236}">
-                <a16:creationId xmlns:a16="http://schemas.microsoft.com/office/drawing/2014/main" id="{67A21DD1-7CCD-1D47-9599-CAA69F726475}"/>
-              </a:ext>
-            </a:extLst>
-          </p:cNvPr>
-          <p:cNvCxnSpPr/>
-          <p:nvPr/>
-        </p:nvCxnSpPr>
-        <p:spPr>
-          <a:xfrm>
-            <a:off x="1509311" y="449856"/>
-            <a:ext cx="275422" cy="98018"/>
-          </a:xfrm>
-          <a:prstGeom prst="straightConnector1">
-            <a:avLst/>
-          </a:prstGeom>
-          <a:ln w="38100">
-            <a:solidFill>
-              <a:srgbClr val="FF0000"/>
-            </a:solidFill>
-            <a:tailEnd type="triangle"/>
-          </a:ln>
-        </p:spPr>
-        <p:style>
-          <a:lnRef idx="1">
-            <a:schemeClr val="accent1"/>
-          </a:lnRef>
-          <a:fillRef idx="0">
-            <a:schemeClr val="accent1"/>
-          </a:fillRef>
-          <a:effectRef idx="0">
-            <a:schemeClr val="accent1"/>
-          </a:effectRef>
-          <a:fontRef idx="minor">
-            <a:schemeClr val="tx1"/>
-          </a:fontRef>
-        </p:style>
-      </p:cxnSp>
-      <p:cxnSp>
-        <p:nvCxnSpPr>
-          <p:cNvPr id="12" name="Straight Arrow Connector 11">
-            <a:extLst>
-              <a:ext uri="{FF2B5EF4-FFF2-40B4-BE49-F238E27FC236}">
-                <a16:creationId xmlns:a16="http://schemas.microsoft.com/office/drawing/2014/main" id="{4CC31265-A2BE-5E43-B755-9F1D7CB51486}"/>
-              </a:ext>
-            </a:extLst>
-          </p:cNvPr>
-          <p:cNvCxnSpPr/>
-          <p:nvPr/>
-        </p:nvCxnSpPr>
-        <p:spPr>
-          <a:xfrm>
-            <a:off x="1545674" y="681563"/>
-            <a:ext cx="275422" cy="98018"/>
-          </a:xfrm>
-          <a:prstGeom prst="straightConnector1">
-            <a:avLst/>
-          </a:prstGeom>
-          <a:ln w="38100">
-            <a:solidFill>
-              <a:srgbClr val="FF0000"/>
-            </a:solidFill>
-            <a:tailEnd type="triangle"/>
-          </a:ln>
-        </p:spPr>
-        <p:style>
-          <a:lnRef idx="1">
-            <a:schemeClr val="accent1"/>
-          </a:lnRef>
-          <a:fillRef idx="0">
-            <a:schemeClr val="accent1"/>
-          </a:fillRef>
-          <a:effectRef idx="0">
-            <a:schemeClr val="accent1"/>
-          </a:effectRef>
-          <a:fontRef idx="minor">
-            <a:schemeClr val="tx1"/>
-          </a:fontRef>
-        </p:style>
-      </p:cxnSp>
-      <p:sp>
-        <p:nvSpPr>
-          <p:cNvPr id="13" name="Oval 12">
-            <a:extLst>
-              <a:ext uri="{FF2B5EF4-FFF2-40B4-BE49-F238E27FC236}">
-                <a16:creationId xmlns:a16="http://schemas.microsoft.com/office/drawing/2014/main" id="{7B1AD742-0ED2-9045-84B2-F3D7D4F4185D}"/>
-              </a:ext>
-            </a:extLst>
-          </p:cNvPr>
-          <p:cNvSpPr/>
-          <p:nvPr/>
-        </p:nvSpPr>
-        <p:spPr>
-          <a:xfrm>
-            <a:off x="4358752" y="3275045"/>
-            <a:ext cx="1902089" cy="466531"/>
-          </a:xfrm>
-          <a:prstGeom prst="ellipse">
-            <a:avLst/>
-          </a:prstGeom>
-          <a:noFill/>
-          <a:ln w="38100">
+          <a:ln w="57150">
             <a:solidFill>
               <a:srgbClr val="FF0000"/>
             </a:solidFill>
@@ -9758,10 +9536,10 @@
       </p:sp>
       <p:sp>
         <p:nvSpPr>
-          <p:cNvPr id="14" name="TextBox 13">
-            <a:extLst>
-              <a:ext uri="{FF2B5EF4-FFF2-40B4-BE49-F238E27FC236}">
-                <a16:creationId xmlns:a16="http://schemas.microsoft.com/office/drawing/2014/main" id="{1198D430-B240-1A45-8C9F-D92EAB99B6A0}"/>
+          <p:cNvPr id="5" name="TextBox 4">
+            <a:extLst>
+              <a:ext uri="{FF2B5EF4-FFF2-40B4-BE49-F238E27FC236}">
+                <a16:creationId xmlns:a16="http://schemas.microsoft.com/office/drawing/2014/main" id="{D8BE5727-C5D7-3746-B2B6-8E523691C9F6}"/>
               </a:ext>
             </a:extLst>
           </p:cNvPr>
@@ -9770,15 +9548,13 @@
         </p:nvSpPr>
         <p:spPr>
           <a:xfrm>
-            <a:off x="4021491" y="4002833"/>
-            <a:ext cx="2897460" cy="923330"/>
+            <a:off x="4099302" y="294467"/>
+            <a:ext cx="4563942" cy="369332"/>
           </a:xfrm>
           <a:prstGeom prst="rect">
             <a:avLst/>
           </a:prstGeom>
-          <a:solidFill>
-            <a:schemeClr val="bg1"/>
-          </a:solidFill>
+          <a:noFill/>
         </p:spPr>
         <p:txBody>
           <a:bodyPr wrap="none" rtlCol="0">
@@ -9792,37 +9568,7 @@
                   <a:srgbClr val="FF0000"/>
                 </a:solidFill>
               </a:rPr>
-              <a:t>Running remainders are the </a:t>
-            </a:r>
-            <a:br>
-              <a:rPr lang="en-US" b="1" dirty="0">
-                <a:solidFill>
-                  <a:srgbClr val="FF0000"/>
-                </a:solidFill>
-              </a:rPr>
-            </a:br>
-            <a:r>
-              <a:rPr lang="en-US" b="1" dirty="0">
-                <a:solidFill>
-                  <a:srgbClr val="FF0000"/>
-                </a:solidFill>
-              </a:rPr>
-              <a:t>integrals of all counts to the </a:t>
-            </a:r>
-            <a:br>
-              <a:rPr lang="en-US" b="1" dirty="0">
-                <a:solidFill>
-                  <a:srgbClr val="FF0000"/>
-                </a:solidFill>
-              </a:rPr>
-            </a:br>
-            <a:r>
-              <a:rPr lang="en-US" b="1" dirty="0">
-                <a:solidFill>
-                  <a:srgbClr val="FF0000"/>
-                </a:solidFill>
-              </a:rPr>
-              <a:t>right of the score value</a:t>
+              <a:t>Click to compute conditional score histograms</a:t>
             </a:r>
           </a:p>
         </p:txBody>
@@ -9830,7 +9576,7 @@
     </p:spTree>
     <p:extLst>
       <p:ext uri="{BB962C8B-B14F-4D97-AF65-F5344CB8AC3E}">
-        <p14:creationId xmlns:p14="http://schemas.microsoft.com/office/powerpoint/2010/main" val="3044698368"/>
+        <p14:creationId xmlns:p14="http://schemas.microsoft.com/office/powerpoint/2010/main" val="2119918531"/>
       </p:ext>
     </p:extLst>
   </p:cSld>
@@ -9862,7 +9608,7 @@
           <p:cNvPr id="3" name="Picture 2">
             <a:extLst>
               <a:ext uri="{FF2B5EF4-FFF2-40B4-BE49-F238E27FC236}">
-                <a16:creationId xmlns:a16="http://schemas.microsoft.com/office/drawing/2014/main" id="{A511E5A2-6D92-2447-A52B-396661725502}"/>
+                <a16:creationId xmlns:a16="http://schemas.microsoft.com/office/drawing/2014/main" id="{83B0DE7B-E656-BC47-B7A8-E3942DE55434}"/>
               </a:ext>
             </a:extLst>
           </p:cNvPr>
@@ -9887,23 +9633,324 @@
           </a:prstGeom>
         </p:spPr>
       </p:pic>
+      <p:sp>
+        <p:nvSpPr>
+          <p:cNvPr id="2" name="TextBox 1">
+            <a:extLst>
+              <a:ext uri="{FF2B5EF4-FFF2-40B4-BE49-F238E27FC236}">
+                <a16:creationId xmlns:a16="http://schemas.microsoft.com/office/drawing/2014/main" id="{EEDDC34C-1D79-734F-8A71-80900FF49FAE}"/>
+              </a:ext>
+            </a:extLst>
+          </p:cNvPr>
+          <p:cNvSpPr txBox="1"/>
+          <p:nvPr/>
+        </p:nvSpPr>
+        <p:spPr>
+          <a:xfrm>
+            <a:off x="6180462" y="187286"/>
+            <a:ext cx="1733936" cy="338554"/>
+          </a:xfrm>
+          <a:prstGeom prst="rect">
+            <a:avLst/>
+          </a:prstGeom>
+          <a:noFill/>
+        </p:spPr>
+        <p:txBody>
+          <a:bodyPr wrap="none" rtlCol="0">
+            <a:spAutoFit/>
+          </a:bodyPr>
+          <a:lstStyle/>
+          <a:p>
+            <a:r>
+              <a:rPr lang="en-US" sz="1600" b="1" dirty="0">
+                <a:solidFill>
+                  <a:srgbClr val="FF0000"/>
+                </a:solidFill>
+              </a:rPr>
+              <a:t>&lt;- Control buttons</a:t>
+            </a:r>
+          </a:p>
+        </p:txBody>
+      </p:sp>
+      <p:sp>
+        <p:nvSpPr>
+          <p:cNvPr id="4" name="TextBox 3">
+            <a:extLst>
+              <a:ext uri="{FF2B5EF4-FFF2-40B4-BE49-F238E27FC236}">
+                <a16:creationId xmlns:a16="http://schemas.microsoft.com/office/drawing/2014/main" id="{A70E5A2F-E891-754F-923B-E0B4810EC2E6}"/>
+              </a:ext>
+            </a:extLst>
+          </p:cNvPr>
+          <p:cNvSpPr txBox="1"/>
+          <p:nvPr/>
+        </p:nvSpPr>
+        <p:spPr>
+          <a:xfrm>
+            <a:off x="6564219" y="427822"/>
+            <a:ext cx="1298048" cy="338554"/>
+          </a:xfrm>
+          <a:prstGeom prst="rect">
+            <a:avLst/>
+          </a:prstGeom>
+          <a:noFill/>
+        </p:spPr>
+        <p:txBody>
+          <a:bodyPr wrap="none" rtlCol="0">
+            <a:spAutoFit/>
+          </a:bodyPr>
+          <a:lstStyle/>
+          <a:p>
+            <a:r>
+              <a:rPr lang="en-US" sz="1600" b="1" dirty="0">
+                <a:solidFill>
+                  <a:srgbClr val="FF0000"/>
+                </a:solidFill>
+              </a:rPr>
+              <a:t>&lt;- Outer tabs</a:t>
+            </a:r>
+          </a:p>
+        </p:txBody>
+      </p:sp>
+      <p:sp>
+        <p:nvSpPr>
+          <p:cNvPr id="5" name="TextBox 4">
+            <a:extLst>
+              <a:ext uri="{FF2B5EF4-FFF2-40B4-BE49-F238E27FC236}">
+                <a16:creationId xmlns:a16="http://schemas.microsoft.com/office/drawing/2014/main" id="{3FCDE4EE-096E-EE44-8D8B-426EF093C35D}"/>
+              </a:ext>
+            </a:extLst>
+          </p:cNvPr>
+          <p:cNvSpPr txBox="1"/>
+          <p:nvPr/>
+        </p:nvSpPr>
+        <p:spPr>
+          <a:xfrm>
+            <a:off x="3009777" y="630150"/>
+            <a:ext cx="1255665" cy="338554"/>
+          </a:xfrm>
+          <a:prstGeom prst="rect">
+            <a:avLst/>
+          </a:prstGeom>
+          <a:noFill/>
+        </p:spPr>
+        <p:txBody>
+          <a:bodyPr wrap="none" rtlCol="0">
+            <a:spAutoFit/>
+          </a:bodyPr>
+          <a:lstStyle/>
+          <a:p>
+            <a:r>
+              <a:rPr lang="en-US" sz="1600" b="1" dirty="0">
+                <a:solidFill>
+                  <a:srgbClr val="FF0000"/>
+                </a:solidFill>
+              </a:rPr>
+              <a:t>&lt;- Inner tabs</a:t>
+            </a:r>
+          </a:p>
+        </p:txBody>
+      </p:sp>
+      <p:sp>
+        <p:nvSpPr>
+          <p:cNvPr id="6" name="TextBox 5">
+            <a:extLst>
+              <a:ext uri="{FF2B5EF4-FFF2-40B4-BE49-F238E27FC236}">
+                <a16:creationId xmlns:a16="http://schemas.microsoft.com/office/drawing/2014/main" id="{F5B8143A-215B-394C-B023-279297520CC1}"/>
+              </a:ext>
+            </a:extLst>
+          </p:cNvPr>
+          <p:cNvSpPr txBox="1"/>
+          <p:nvPr/>
+        </p:nvSpPr>
+        <p:spPr>
+          <a:xfrm>
+            <a:off x="3283026" y="1275688"/>
+            <a:ext cx="1824346" cy="646331"/>
+          </a:xfrm>
+          <a:prstGeom prst="rect">
+            <a:avLst/>
+          </a:prstGeom>
+          <a:noFill/>
+        </p:spPr>
+        <p:txBody>
+          <a:bodyPr wrap="none" rtlCol="0">
+            <a:spAutoFit/>
+          </a:bodyPr>
+          <a:lstStyle/>
+          <a:p>
+            <a:r>
+              <a:rPr lang="en-US" b="1" dirty="0">
+                <a:solidFill>
+                  <a:srgbClr val="FF0000"/>
+                </a:solidFill>
+              </a:rPr>
+              <a:t>Semi-tryptic</a:t>
+            </a:r>
+            <a:br>
+              <a:rPr lang="en-US" b="1" dirty="0">
+                <a:solidFill>
+                  <a:srgbClr val="FF0000"/>
+                </a:solidFill>
+              </a:rPr>
+            </a:br>
+            <a:r>
+              <a:rPr lang="en-US" b="1" dirty="0">
+                <a:solidFill>
+                  <a:srgbClr val="FF0000"/>
+                </a:solidFill>
+              </a:rPr>
+              <a:t>peptides (empty)</a:t>
+            </a:r>
+          </a:p>
+        </p:txBody>
+      </p:sp>
+      <p:sp>
+        <p:nvSpPr>
+          <p:cNvPr id="7" name="TextBox 6">
+            <a:extLst>
+              <a:ext uri="{FF2B5EF4-FFF2-40B4-BE49-F238E27FC236}">
+                <a16:creationId xmlns:a16="http://schemas.microsoft.com/office/drawing/2014/main" id="{7E9E4328-FB7C-5A44-AE32-48A91B87789C}"/>
+              </a:ext>
+            </a:extLst>
+          </p:cNvPr>
+          <p:cNvSpPr txBox="1"/>
+          <p:nvPr/>
+        </p:nvSpPr>
+        <p:spPr>
+          <a:xfrm>
+            <a:off x="6915228" y="1275688"/>
+            <a:ext cx="1328569" cy="646331"/>
+          </a:xfrm>
+          <a:prstGeom prst="rect">
+            <a:avLst/>
+          </a:prstGeom>
+          <a:noFill/>
+        </p:spPr>
+        <p:txBody>
+          <a:bodyPr wrap="none" rtlCol="0">
+            <a:spAutoFit/>
+          </a:bodyPr>
+          <a:lstStyle/>
+          <a:p>
+            <a:r>
+              <a:rPr lang="en-US" b="1" dirty="0">
+                <a:solidFill>
+                  <a:srgbClr val="FF0000"/>
+                </a:solidFill>
+              </a:rPr>
+              <a:t>Fully-tryptic</a:t>
+            </a:r>
+            <a:br>
+              <a:rPr lang="en-US" b="1" dirty="0">
+                <a:solidFill>
+                  <a:srgbClr val="FF0000"/>
+                </a:solidFill>
+              </a:rPr>
+            </a:br>
+            <a:r>
+              <a:rPr lang="en-US" b="1" dirty="0">
+                <a:solidFill>
+                  <a:srgbClr val="FF0000"/>
+                </a:solidFill>
+              </a:rPr>
+              <a:t>peptides</a:t>
+            </a:r>
+          </a:p>
+        </p:txBody>
+      </p:sp>
+      <p:sp>
+        <p:nvSpPr>
+          <p:cNvPr id="8" name="TextBox 7">
+            <a:extLst>
+              <a:ext uri="{FF2B5EF4-FFF2-40B4-BE49-F238E27FC236}">
+                <a16:creationId xmlns:a16="http://schemas.microsoft.com/office/drawing/2014/main" id="{590AFEA3-0205-D841-824E-46EB4E6C6BD1}"/>
+              </a:ext>
+            </a:extLst>
+          </p:cNvPr>
+          <p:cNvSpPr txBox="1"/>
+          <p:nvPr/>
+        </p:nvSpPr>
+        <p:spPr>
+          <a:xfrm>
+            <a:off x="6964327" y="2302535"/>
+            <a:ext cx="861967" cy="369332"/>
+          </a:xfrm>
+          <a:prstGeom prst="rect">
+            <a:avLst/>
+          </a:prstGeom>
+          <a:noFill/>
+        </p:spPr>
+        <p:txBody>
+          <a:bodyPr wrap="none" rtlCol="0">
+            <a:spAutoFit/>
+          </a:bodyPr>
+          <a:lstStyle/>
+          <a:p>
+            <a:r>
+              <a:rPr lang="en-US" b="1" dirty="0">
+                <a:solidFill>
+                  <a:srgbClr val="FF0000"/>
+                </a:solidFill>
+              </a:rPr>
+              <a:t>Decoys</a:t>
+            </a:r>
+          </a:p>
+        </p:txBody>
+      </p:sp>
+      <p:sp>
+        <p:nvSpPr>
+          <p:cNvPr id="9" name="TextBox 8">
+            <a:extLst>
+              <a:ext uri="{FF2B5EF4-FFF2-40B4-BE49-F238E27FC236}">
+                <a16:creationId xmlns:a16="http://schemas.microsoft.com/office/drawing/2014/main" id="{C1ACFC55-D1E9-F14B-AD15-29714315A543}"/>
+              </a:ext>
+            </a:extLst>
+          </p:cNvPr>
+          <p:cNvSpPr txBox="1"/>
+          <p:nvPr/>
+        </p:nvSpPr>
+        <p:spPr>
+          <a:xfrm>
+            <a:off x="9197188" y="1552687"/>
+            <a:ext cx="865750" cy="369332"/>
+          </a:xfrm>
+          <a:prstGeom prst="rect">
+            <a:avLst/>
+          </a:prstGeom>
+          <a:noFill/>
+        </p:spPr>
+        <p:txBody>
+          <a:bodyPr wrap="none" rtlCol="0">
+            <a:spAutoFit/>
+          </a:bodyPr>
+          <a:lstStyle/>
+          <a:p>
+            <a:r>
+              <a:rPr lang="en-US" b="1" dirty="0">
+                <a:solidFill>
+                  <a:srgbClr val="0070C0"/>
+                </a:solidFill>
+              </a:rPr>
+              <a:t>Targets</a:t>
+            </a:r>
+          </a:p>
+        </p:txBody>
+      </p:sp>
       <p:cxnSp>
         <p:nvCxnSpPr>
-          <p:cNvPr id="4" name="Straight Arrow Connector 3">
-            <a:extLst>
-              <a:ext uri="{FF2B5EF4-FFF2-40B4-BE49-F238E27FC236}">
-                <a16:creationId xmlns:a16="http://schemas.microsoft.com/office/drawing/2014/main" id="{2B08E86E-D0FC-434C-8EC0-8B5C8569D34D}"/>
-              </a:ext>
-            </a:extLst>
-          </p:cNvPr>
-          <p:cNvCxnSpPr>
-            <a:cxnSpLocks/>
-          </p:cNvCxnSpPr>
+          <p:cNvPr id="11" name="Straight Arrow Connector 10">
+            <a:extLst>
+              <a:ext uri="{FF2B5EF4-FFF2-40B4-BE49-F238E27FC236}">
+                <a16:creationId xmlns:a16="http://schemas.microsoft.com/office/drawing/2014/main" id="{67A21DD1-7CCD-1D47-9599-CAA69F726475}"/>
+              </a:ext>
+            </a:extLst>
+          </p:cNvPr>
+          <p:cNvCxnSpPr/>
           <p:nvPr/>
         </p:nvCxnSpPr>
         <p:spPr>
           <a:xfrm>
-            <a:off x="1563478" y="471890"/>
+            <a:off x="1509311" y="449856"/>
             <a:ext cx="275422" cy="98018"/>
           </a:xfrm>
           <a:prstGeom prst="straightConnector1">
@@ -9933,22 +9980,20 @@
       </p:cxnSp>
       <p:cxnSp>
         <p:nvCxnSpPr>
-          <p:cNvPr id="5" name="Straight Arrow Connector 4">
-            <a:extLst>
-              <a:ext uri="{FF2B5EF4-FFF2-40B4-BE49-F238E27FC236}">
-                <a16:creationId xmlns:a16="http://schemas.microsoft.com/office/drawing/2014/main" id="{A4D7A23F-5717-4141-A73A-0D83E08C3C9F}"/>
-              </a:ext>
-            </a:extLst>
-          </p:cNvPr>
-          <p:cNvCxnSpPr>
-            <a:cxnSpLocks/>
-          </p:cNvCxnSpPr>
+          <p:cNvPr id="12" name="Straight Arrow Connector 11">
+            <a:extLst>
+              <a:ext uri="{FF2B5EF4-FFF2-40B4-BE49-F238E27FC236}">
+                <a16:creationId xmlns:a16="http://schemas.microsoft.com/office/drawing/2014/main" id="{4CC31265-A2BE-5E43-B755-9F1D7CB51486}"/>
+              </a:ext>
+            </a:extLst>
+          </p:cNvPr>
+          <p:cNvCxnSpPr/>
           <p:nvPr/>
         </p:nvCxnSpPr>
         <p:spPr>
-          <a:xfrm flipV="1">
-            <a:off x="2456761" y="925418"/>
-            <a:ext cx="187287" cy="176269"/>
+          <a:xfrm>
+            <a:off x="1545674" y="681563"/>
+            <a:ext cx="275422" cy="98018"/>
           </a:xfrm>
           <a:prstGeom prst="straightConnector1">
             <a:avLst/>
@@ -9975,10 +10020,133 @@
           </a:fontRef>
         </p:style>
       </p:cxnSp>
+      <p:sp>
+        <p:nvSpPr>
+          <p:cNvPr id="13" name="Oval 12">
+            <a:extLst>
+              <a:ext uri="{FF2B5EF4-FFF2-40B4-BE49-F238E27FC236}">
+                <a16:creationId xmlns:a16="http://schemas.microsoft.com/office/drawing/2014/main" id="{7B1AD742-0ED2-9045-84B2-F3D7D4F4185D}"/>
+              </a:ext>
+            </a:extLst>
+          </p:cNvPr>
+          <p:cNvSpPr/>
+          <p:nvPr/>
+        </p:nvSpPr>
+        <p:spPr>
+          <a:xfrm>
+            <a:off x="4358752" y="3275045"/>
+            <a:ext cx="1902089" cy="466531"/>
+          </a:xfrm>
+          <a:prstGeom prst="ellipse">
+            <a:avLst/>
+          </a:prstGeom>
+          <a:noFill/>
+          <a:ln w="38100">
+            <a:solidFill>
+              <a:srgbClr val="FF0000"/>
+            </a:solidFill>
+          </a:ln>
+        </p:spPr>
+        <p:style>
+          <a:lnRef idx="2">
+            <a:schemeClr val="accent1">
+              <a:shade val="50000"/>
+            </a:schemeClr>
+          </a:lnRef>
+          <a:fillRef idx="1">
+            <a:schemeClr val="accent1"/>
+          </a:fillRef>
+          <a:effectRef idx="0">
+            <a:schemeClr val="accent1"/>
+          </a:effectRef>
+          <a:fontRef idx="minor">
+            <a:schemeClr val="lt1"/>
+          </a:fontRef>
+        </p:style>
+        <p:txBody>
+          <a:bodyPr rtlCol="0" anchor="ctr"/>
+          <a:lstStyle/>
+          <a:p>
+            <a:pPr algn="ctr"/>
+            <a:endParaRPr lang="en-US"/>
+          </a:p>
+        </p:txBody>
+      </p:sp>
+      <p:sp>
+        <p:nvSpPr>
+          <p:cNvPr id="14" name="TextBox 13">
+            <a:extLst>
+              <a:ext uri="{FF2B5EF4-FFF2-40B4-BE49-F238E27FC236}">
+                <a16:creationId xmlns:a16="http://schemas.microsoft.com/office/drawing/2014/main" id="{1198D430-B240-1A45-8C9F-D92EAB99B6A0}"/>
+              </a:ext>
+            </a:extLst>
+          </p:cNvPr>
+          <p:cNvSpPr txBox="1"/>
+          <p:nvPr/>
+        </p:nvSpPr>
+        <p:spPr>
+          <a:xfrm>
+            <a:off x="4021491" y="4002833"/>
+            <a:ext cx="2897460" cy="923330"/>
+          </a:xfrm>
+          <a:prstGeom prst="rect">
+            <a:avLst/>
+          </a:prstGeom>
+          <a:solidFill>
+            <a:schemeClr val="bg1"/>
+          </a:solidFill>
+        </p:spPr>
+        <p:txBody>
+          <a:bodyPr wrap="none" rtlCol="0">
+            <a:spAutoFit/>
+          </a:bodyPr>
+          <a:lstStyle/>
+          <a:p>
+            <a:r>
+              <a:rPr lang="en-US" b="1" dirty="0">
+                <a:solidFill>
+                  <a:srgbClr val="FF0000"/>
+                </a:solidFill>
+              </a:rPr>
+              <a:t>Running remainders are the </a:t>
+            </a:r>
+            <a:br>
+              <a:rPr lang="en-US" b="1" dirty="0">
+                <a:solidFill>
+                  <a:srgbClr val="FF0000"/>
+                </a:solidFill>
+              </a:rPr>
+            </a:br>
+            <a:r>
+              <a:rPr lang="en-US" b="1" dirty="0">
+                <a:solidFill>
+                  <a:srgbClr val="FF0000"/>
+                </a:solidFill>
+              </a:rPr>
+              <a:t>integrals of all counts to the </a:t>
+            </a:r>
+            <a:br>
+              <a:rPr lang="en-US" b="1" dirty="0">
+                <a:solidFill>
+                  <a:srgbClr val="FF0000"/>
+                </a:solidFill>
+              </a:rPr>
+            </a:br>
+            <a:r>
+              <a:rPr lang="en-US" b="1" dirty="0">
+                <a:solidFill>
+                  <a:srgbClr val="FF0000"/>
+                </a:solidFill>
+              </a:rPr>
+              <a:t>right of the score value</a:t>
+            </a:r>
+          </a:p>
+        </p:txBody>
+      </p:sp>
     </p:spTree>
     <p:extLst>
       <p:ext uri="{BB962C8B-B14F-4D97-AF65-F5344CB8AC3E}">
-        <p14:creationId xmlns:p14="http://schemas.microsoft.com/office/powerpoint/2010/main" val="2591234008"/>
+        <p14:creationId xmlns:p14="http://schemas.microsoft.com/office/powerpoint/2010/main" val="3044698368"/>
       </p:ext>
     </p:extLst>
   </p:cSld>
@@ -10122,7 +10290,7 @@
           <p:cNvPr id="3" name="Picture 2">
             <a:extLst>
               <a:ext uri="{FF2B5EF4-FFF2-40B4-BE49-F238E27FC236}">
-                <a16:creationId xmlns:a16="http://schemas.microsoft.com/office/drawing/2014/main" id="{89FC43FD-29C1-B54C-A944-7FF3EFC926C2}"/>
+                <a16:creationId xmlns:a16="http://schemas.microsoft.com/office/drawing/2014/main" id="{A511E5A2-6D92-2447-A52B-396661725502}"/>
               </a:ext>
             </a:extLst>
           </p:cNvPr>
@@ -10147,74 +10315,24 @@
           </a:prstGeom>
         </p:spPr>
       </p:pic>
-      <p:sp>
-        <p:nvSpPr>
-          <p:cNvPr id="2" name="Rounded Rectangle 1">
-            <a:extLst>
-              <a:ext uri="{FF2B5EF4-FFF2-40B4-BE49-F238E27FC236}">
-                <a16:creationId xmlns:a16="http://schemas.microsoft.com/office/drawing/2014/main" id="{C9D0B04E-B7AF-9A4F-98B7-AB15C1AA519B}"/>
-              </a:ext>
-            </a:extLst>
-          </p:cNvPr>
-          <p:cNvSpPr/>
-          <p:nvPr/>
-        </p:nvSpPr>
-        <p:spPr>
-          <a:xfrm>
-            <a:off x="2379643" y="407624"/>
-            <a:ext cx="738130" cy="330506"/>
-          </a:xfrm>
-          <a:prstGeom prst="roundRect">
-            <a:avLst/>
-          </a:prstGeom>
-          <a:noFill/>
-          <a:ln w="38100">
-            <a:solidFill>
-              <a:srgbClr val="FF0000"/>
-            </a:solidFill>
-          </a:ln>
-        </p:spPr>
-        <p:style>
-          <a:lnRef idx="2">
-            <a:schemeClr val="accent1">
-              <a:shade val="50000"/>
-            </a:schemeClr>
-          </a:lnRef>
-          <a:fillRef idx="1">
-            <a:schemeClr val="accent1"/>
-          </a:fillRef>
-          <a:effectRef idx="0">
-            <a:schemeClr val="accent1"/>
-          </a:effectRef>
-          <a:fontRef idx="minor">
-            <a:schemeClr val="lt1"/>
-          </a:fontRef>
-        </p:style>
-        <p:txBody>
-          <a:bodyPr rtlCol="0" anchor="ctr"/>
-          <a:lstStyle/>
-          <a:p>
-            <a:pPr algn="ctr"/>
-            <a:endParaRPr lang="en-US"/>
-          </a:p>
-        </p:txBody>
-      </p:sp>
       <p:cxnSp>
         <p:nvCxnSpPr>
-          <p:cNvPr id="5" name="Straight Arrow Connector 4">
-            <a:extLst>
-              <a:ext uri="{FF2B5EF4-FFF2-40B4-BE49-F238E27FC236}">
-                <a16:creationId xmlns:a16="http://schemas.microsoft.com/office/drawing/2014/main" id="{36B114B1-7055-6D49-A860-651013C72B58}"/>
-              </a:ext>
-            </a:extLst>
-          </p:cNvPr>
-          <p:cNvCxnSpPr/>
+          <p:cNvPr id="4" name="Straight Arrow Connector 3">
+            <a:extLst>
+              <a:ext uri="{FF2B5EF4-FFF2-40B4-BE49-F238E27FC236}">
+                <a16:creationId xmlns:a16="http://schemas.microsoft.com/office/drawing/2014/main" id="{2B08E86E-D0FC-434C-8EC0-8B5C8569D34D}"/>
+              </a:ext>
+            </a:extLst>
+          </p:cNvPr>
+          <p:cNvCxnSpPr>
+            <a:cxnSpLocks/>
+          </p:cNvCxnSpPr>
           <p:nvPr/>
         </p:nvCxnSpPr>
         <p:spPr>
-          <a:xfrm flipV="1">
-            <a:off x="2115239" y="892366"/>
-            <a:ext cx="0" cy="264405"/>
+          <a:xfrm>
+            <a:off x="1563478" y="471890"/>
+            <a:ext cx="275422" cy="98018"/>
           </a:xfrm>
           <a:prstGeom prst="straightConnector1">
             <a:avLst/>
@@ -10241,10 +10359,54 @@
           </a:fontRef>
         </p:style>
       </p:cxnSp>
+      <p:cxnSp>
+        <p:nvCxnSpPr>
+          <p:cNvPr id="5" name="Straight Arrow Connector 4">
+            <a:extLst>
+              <a:ext uri="{FF2B5EF4-FFF2-40B4-BE49-F238E27FC236}">
+                <a16:creationId xmlns:a16="http://schemas.microsoft.com/office/drawing/2014/main" id="{A4D7A23F-5717-4141-A73A-0D83E08C3C9F}"/>
+              </a:ext>
+            </a:extLst>
+          </p:cNvPr>
+          <p:cNvCxnSpPr>
+            <a:cxnSpLocks/>
+          </p:cNvCxnSpPr>
+          <p:nvPr/>
+        </p:nvCxnSpPr>
+        <p:spPr>
+          <a:xfrm flipV="1">
+            <a:off x="2456761" y="925418"/>
+            <a:ext cx="187287" cy="176269"/>
+          </a:xfrm>
+          <a:prstGeom prst="straightConnector1">
+            <a:avLst/>
+          </a:prstGeom>
+          <a:ln w="38100">
+            <a:solidFill>
+              <a:srgbClr val="FF0000"/>
+            </a:solidFill>
+            <a:tailEnd type="triangle"/>
+          </a:ln>
+        </p:spPr>
+        <p:style>
+          <a:lnRef idx="1">
+            <a:schemeClr val="accent1"/>
+          </a:lnRef>
+          <a:fillRef idx="0">
+            <a:schemeClr val="accent1"/>
+          </a:fillRef>
+          <a:effectRef idx="0">
+            <a:schemeClr val="accent1"/>
+          </a:effectRef>
+          <a:fontRef idx="minor">
+            <a:schemeClr val="tx1"/>
+          </a:fontRef>
+        </p:style>
+      </p:cxnSp>
     </p:spTree>
     <p:extLst>
       <p:ext uri="{BB962C8B-B14F-4D97-AF65-F5344CB8AC3E}">
-        <p14:creationId xmlns:p14="http://schemas.microsoft.com/office/powerpoint/2010/main" val="4259920113"/>
+        <p14:creationId xmlns:p14="http://schemas.microsoft.com/office/powerpoint/2010/main" val="2591234008"/>
       </p:ext>
     </p:extLst>
   </p:cSld>
@@ -10276,7 +10438,7 @@
           <p:cNvPr id="3" name="Picture 2">
             <a:extLst>
               <a:ext uri="{FF2B5EF4-FFF2-40B4-BE49-F238E27FC236}">
-                <a16:creationId xmlns:a16="http://schemas.microsoft.com/office/drawing/2014/main" id="{B902FB21-6C40-B24A-90CD-57454C3D5F62}"/>
+                <a16:creationId xmlns:a16="http://schemas.microsoft.com/office/drawing/2014/main" id="{89FC43FD-29C1-B54C-A944-7FF3EFC926C2}"/>
               </a:ext>
             </a:extLst>
           </p:cNvPr>
@@ -10303,10 +10465,10 @@
       </p:pic>
       <p:sp>
         <p:nvSpPr>
-          <p:cNvPr id="4" name="Rounded Rectangle 3">
-            <a:extLst>
-              <a:ext uri="{FF2B5EF4-FFF2-40B4-BE49-F238E27FC236}">
-                <a16:creationId xmlns:a16="http://schemas.microsoft.com/office/drawing/2014/main" id="{E0E1EE7D-32BA-E345-A206-DB8686FA68A5}"/>
+          <p:cNvPr id="2" name="Rounded Rectangle 1">
+            <a:extLst>
+              <a:ext uri="{FF2B5EF4-FFF2-40B4-BE49-F238E27FC236}">
+                <a16:creationId xmlns:a16="http://schemas.microsoft.com/office/drawing/2014/main" id="{C9D0B04E-B7AF-9A4F-98B7-AB15C1AA519B}"/>
               </a:ext>
             </a:extLst>
           </p:cNvPr>
@@ -10315,8 +10477,8 @@
         </p:nvSpPr>
         <p:spPr>
           <a:xfrm>
-            <a:off x="2374136" y="429657"/>
-            <a:ext cx="738130" cy="517793"/>
+            <a:off x="2379643" y="407624"/>
+            <a:ext cx="738130" cy="330506"/>
           </a:xfrm>
           <a:prstGeom prst="roundRect">
             <a:avLst/>
@@ -10353,10 +10515,52 @@
           </a:p>
         </p:txBody>
       </p:sp>
+      <p:cxnSp>
+        <p:nvCxnSpPr>
+          <p:cNvPr id="5" name="Straight Arrow Connector 4">
+            <a:extLst>
+              <a:ext uri="{FF2B5EF4-FFF2-40B4-BE49-F238E27FC236}">
+                <a16:creationId xmlns:a16="http://schemas.microsoft.com/office/drawing/2014/main" id="{36B114B1-7055-6D49-A860-651013C72B58}"/>
+              </a:ext>
+            </a:extLst>
+          </p:cNvPr>
+          <p:cNvCxnSpPr/>
+          <p:nvPr/>
+        </p:nvCxnSpPr>
+        <p:spPr>
+          <a:xfrm flipV="1">
+            <a:off x="2115239" y="892366"/>
+            <a:ext cx="0" cy="264405"/>
+          </a:xfrm>
+          <a:prstGeom prst="straightConnector1">
+            <a:avLst/>
+          </a:prstGeom>
+          <a:ln w="38100">
+            <a:solidFill>
+              <a:srgbClr val="FF0000"/>
+            </a:solidFill>
+            <a:tailEnd type="triangle"/>
+          </a:ln>
+        </p:spPr>
+        <p:style>
+          <a:lnRef idx="1">
+            <a:schemeClr val="accent1"/>
+          </a:lnRef>
+          <a:fillRef idx="0">
+            <a:schemeClr val="accent1"/>
+          </a:fillRef>
+          <a:effectRef idx="0">
+            <a:schemeClr val="accent1"/>
+          </a:effectRef>
+          <a:fontRef idx="minor">
+            <a:schemeClr val="tx1"/>
+          </a:fontRef>
+        </p:style>
+      </p:cxnSp>
     </p:spTree>
     <p:extLst>
       <p:ext uri="{BB962C8B-B14F-4D97-AF65-F5344CB8AC3E}">
-        <p14:creationId xmlns:p14="http://schemas.microsoft.com/office/powerpoint/2010/main" val="2058630772"/>
+        <p14:creationId xmlns:p14="http://schemas.microsoft.com/office/powerpoint/2010/main" val="4259920113"/>
       </p:ext>
     </p:extLst>
   </p:cSld>
@@ -10388,7 +10592,7 @@
           <p:cNvPr id="3" name="Picture 2">
             <a:extLst>
               <a:ext uri="{FF2B5EF4-FFF2-40B4-BE49-F238E27FC236}">
-                <a16:creationId xmlns:a16="http://schemas.microsoft.com/office/drawing/2014/main" id="{BF727B74-89AC-F143-BA8F-5E3FF79F1FDA}"/>
+                <a16:creationId xmlns:a16="http://schemas.microsoft.com/office/drawing/2014/main" id="{B902FB21-6C40-B24A-90CD-57454C3D5F62}"/>
               </a:ext>
             </a:extLst>
           </p:cNvPr>
@@ -10415,10 +10619,10 @@
       </p:pic>
       <p:sp>
         <p:nvSpPr>
-          <p:cNvPr id="2" name="Rounded Rectangle 1">
-            <a:extLst>
-              <a:ext uri="{FF2B5EF4-FFF2-40B4-BE49-F238E27FC236}">
-                <a16:creationId xmlns:a16="http://schemas.microsoft.com/office/drawing/2014/main" id="{E066E5B5-1693-B647-89EA-D2AF7320F204}"/>
+          <p:cNvPr id="4" name="Rounded Rectangle 3">
+            <a:extLst>
+              <a:ext uri="{FF2B5EF4-FFF2-40B4-BE49-F238E27FC236}">
+                <a16:creationId xmlns:a16="http://schemas.microsoft.com/office/drawing/2014/main" id="{E0E1EE7D-32BA-E345-A206-DB8686FA68A5}"/>
               </a:ext>
             </a:extLst>
           </p:cNvPr>
@@ -10427,8 +10631,8 @@
         </p:nvSpPr>
         <p:spPr>
           <a:xfrm>
-            <a:off x="2985571" y="418641"/>
-            <a:ext cx="661012" cy="330506"/>
+            <a:off x="2374136" y="429657"/>
+            <a:ext cx="738130" cy="517793"/>
           </a:xfrm>
           <a:prstGeom prst="roundRect">
             <a:avLst/>
@@ -10465,52 +10669,10 @@
           </a:p>
         </p:txBody>
       </p:sp>
-      <p:cxnSp>
-        <p:nvCxnSpPr>
-          <p:cNvPr id="4" name="Straight Arrow Connector 3">
-            <a:extLst>
-              <a:ext uri="{FF2B5EF4-FFF2-40B4-BE49-F238E27FC236}">
-                <a16:creationId xmlns:a16="http://schemas.microsoft.com/office/drawing/2014/main" id="{DEAF607D-C287-F943-A8CC-316F865CC100}"/>
-              </a:ext>
-            </a:extLst>
-          </p:cNvPr>
-          <p:cNvCxnSpPr/>
-          <p:nvPr/>
-        </p:nvCxnSpPr>
-        <p:spPr>
-          <a:xfrm flipV="1">
-            <a:off x="2115239" y="892366"/>
-            <a:ext cx="0" cy="264405"/>
-          </a:xfrm>
-          <a:prstGeom prst="straightConnector1">
-            <a:avLst/>
-          </a:prstGeom>
-          <a:ln w="38100">
-            <a:solidFill>
-              <a:srgbClr val="FF0000"/>
-            </a:solidFill>
-            <a:tailEnd type="triangle"/>
-          </a:ln>
-        </p:spPr>
-        <p:style>
-          <a:lnRef idx="1">
-            <a:schemeClr val="accent1"/>
-          </a:lnRef>
-          <a:fillRef idx="0">
-            <a:schemeClr val="accent1"/>
-          </a:fillRef>
-          <a:effectRef idx="0">
-            <a:schemeClr val="accent1"/>
-          </a:effectRef>
-          <a:fontRef idx="minor">
-            <a:schemeClr val="tx1"/>
-          </a:fontRef>
-        </p:style>
-      </p:cxnSp>
     </p:spTree>
     <p:extLst>
       <p:ext uri="{BB962C8B-B14F-4D97-AF65-F5344CB8AC3E}">
-        <p14:creationId xmlns:p14="http://schemas.microsoft.com/office/powerpoint/2010/main" val="3245366941"/>
+        <p14:creationId xmlns:p14="http://schemas.microsoft.com/office/powerpoint/2010/main" val="2058630772"/>
       </p:ext>
     </p:extLst>
   </p:cSld>
@@ -10542,7 +10704,7 @@
           <p:cNvPr id="3" name="Picture 2">
             <a:extLst>
               <a:ext uri="{FF2B5EF4-FFF2-40B4-BE49-F238E27FC236}">
-                <a16:creationId xmlns:a16="http://schemas.microsoft.com/office/drawing/2014/main" id="{56374E6D-EEAD-294A-8533-BB855B6EAA27}"/>
+                <a16:creationId xmlns:a16="http://schemas.microsoft.com/office/drawing/2014/main" id="{BF727B74-89AC-F143-BA8F-5E3FF79F1FDA}"/>
               </a:ext>
             </a:extLst>
           </p:cNvPr>
@@ -10569,10 +10731,10 @@
       </p:pic>
       <p:sp>
         <p:nvSpPr>
-          <p:cNvPr id="4" name="Rounded Rectangle 3">
-            <a:extLst>
-              <a:ext uri="{FF2B5EF4-FFF2-40B4-BE49-F238E27FC236}">
-                <a16:creationId xmlns:a16="http://schemas.microsoft.com/office/drawing/2014/main" id="{F13C9EB9-95FA-504D-944B-630801491E5C}"/>
+          <p:cNvPr id="2" name="Rounded Rectangle 1">
+            <a:extLst>
+              <a:ext uri="{FF2B5EF4-FFF2-40B4-BE49-F238E27FC236}">
+                <a16:creationId xmlns:a16="http://schemas.microsoft.com/office/drawing/2014/main" id="{E066E5B5-1693-B647-89EA-D2AF7320F204}"/>
               </a:ext>
             </a:extLst>
           </p:cNvPr>
@@ -10621,10 +10783,10 @@
       </p:sp>
       <p:cxnSp>
         <p:nvCxnSpPr>
-          <p:cNvPr id="5" name="Straight Arrow Connector 4">
-            <a:extLst>
-              <a:ext uri="{FF2B5EF4-FFF2-40B4-BE49-F238E27FC236}">
-                <a16:creationId xmlns:a16="http://schemas.microsoft.com/office/drawing/2014/main" id="{D2441F50-9F03-784A-B3B5-C87ED17ECDD4}"/>
+          <p:cNvPr id="4" name="Straight Arrow Connector 3">
+            <a:extLst>
+              <a:ext uri="{FF2B5EF4-FFF2-40B4-BE49-F238E27FC236}">
+                <a16:creationId xmlns:a16="http://schemas.microsoft.com/office/drawing/2014/main" id="{DEAF607D-C287-F943-A8CC-316F865CC100}"/>
               </a:ext>
             </a:extLst>
           </p:cNvPr>
@@ -10633,7 +10795,7 @@
         </p:nvCxnSpPr>
         <p:spPr>
           <a:xfrm flipV="1">
-            <a:off x="2721167" y="859315"/>
+            <a:off x="2115239" y="892366"/>
             <a:ext cx="0" cy="264405"/>
           </a:xfrm>
           <a:prstGeom prst="straightConnector1">
@@ -10664,7 +10826,7 @@
     </p:spTree>
     <p:extLst>
       <p:ext uri="{BB962C8B-B14F-4D97-AF65-F5344CB8AC3E}">
-        <p14:creationId xmlns:p14="http://schemas.microsoft.com/office/powerpoint/2010/main" val="1535443565"/>
+        <p14:creationId xmlns:p14="http://schemas.microsoft.com/office/powerpoint/2010/main" val="3245366941"/>
       </p:ext>
     </p:extLst>
   </p:cSld>
@@ -10696,7 +10858,7 @@
           <p:cNvPr id="3" name="Picture 2">
             <a:extLst>
               <a:ext uri="{FF2B5EF4-FFF2-40B4-BE49-F238E27FC236}">
-                <a16:creationId xmlns:a16="http://schemas.microsoft.com/office/drawing/2014/main" id="{7E7D8F8A-8404-A546-A61C-29F3ADE19ED5}"/>
+                <a16:creationId xmlns:a16="http://schemas.microsoft.com/office/drawing/2014/main" id="{56374E6D-EEAD-294A-8533-BB855B6EAA27}"/>
               </a:ext>
             </a:extLst>
           </p:cNvPr>
@@ -10723,10 +10885,10 @@
       </p:pic>
       <p:sp>
         <p:nvSpPr>
-          <p:cNvPr id="2" name="Rounded Rectangle 1">
-            <a:extLst>
-              <a:ext uri="{FF2B5EF4-FFF2-40B4-BE49-F238E27FC236}">
-                <a16:creationId xmlns:a16="http://schemas.microsoft.com/office/drawing/2014/main" id="{26C87331-03BA-7A45-AFEB-07ACA25CAF08}"/>
+          <p:cNvPr id="4" name="Rounded Rectangle 3">
+            <a:extLst>
+              <a:ext uri="{FF2B5EF4-FFF2-40B4-BE49-F238E27FC236}">
+                <a16:creationId xmlns:a16="http://schemas.microsoft.com/office/drawing/2014/main" id="{F13C9EB9-95FA-504D-944B-630801491E5C}"/>
               </a:ext>
             </a:extLst>
           </p:cNvPr>
@@ -10735,8 +10897,8 @@
         </p:nvSpPr>
         <p:spPr>
           <a:xfrm>
-            <a:off x="3558448" y="462708"/>
-            <a:ext cx="638979" cy="264405"/>
+            <a:off x="2985571" y="418641"/>
+            <a:ext cx="661012" cy="330506"/>
           </a:xfrm>
           <a:prstGeom prst="roundRect">
             <a:avLst/>
@@ -10778,7 +10940,7 @@
           <p:cNvPr id="5" name="Straight Arrow Connector 4">
             <a:extLst>
               <a:ext uri="{FF2B5EF4-FFF2-40B4-BE49-F238E27FC236}">
-                <a16:creationId xmlns:a16="http://schemas.microsoft.com/office/drawing/2014/main" id="{C6F47484-A0CA-0243-A745-986618201FAC}"/>
+                <a16:creationId xmlns:a16="http://schemas.microsoft.com/office/drawing/2014/main" id="{D2441F50-9F03-784A-B3B5-C87ED17ECDD4}"/>
               </a:ext>
             </a:extLst>
           </p:cNvPr>
@@ -10787,8 +10949,8 @@
         </p:nvCxnSpPr>
         <p:spPr>
           <a:xfrm flipV="1">
-            <a:off x="2027104" y="903383"/>
-            <a:ext cx="187286" cy="231354"/>
+            <a:off x="2721167" y="859315"/>
+            <a:ext cx="0" cy="264405"/>
           </a:xfrm>
           <a:prstGeom prst="straightConnector1">
             <a:avLst/>
@@ -10818,7 +10980,7 @@
     </p:spTree>
     <p:extLst>
       <p:ext uri="{BB962C8B-B14F-4D97-AF65-F5344CB8AC3E}">
-        <p14:creationId xmlns:p14="http://schemas.microsoft.com/office/powerpoint/2010/main" val="3750741736"/>
+        <p14:creationId xmlns:p14="http://schemas.microsoft.com/office/powerpoint/2010/main" val="1535443565"/>
       </p:ext>
     </p:extLst>
   </p:cSld>
@@ -10850,7 +11012,7 @@
           <p:cNvPr id="3" name="Picture 2">
             <a:extLst>
               <a:ext uri="{FF2B5EF4-FFF2-40B4-BE49-F238E27FC236}">
-                <a16:creationId xmlns:a16="http://schemas.microsoft.com/office/drawing/2014/main" id="{0D1901B9-3524-2941-BF9D-B6D2EFC559AE}"/>
+                <a16:creationId xmlns:a16="http://schemas.microsoft.com/office/drawing/2014/main" id="{7E7D8F8A-8404-A546-A61C-29F3ADE19ED5}"/>
               </a:ext>
             </a:extLst>
           </p:cNvPr>
@@ -10877,10 +11039,10 @@
       </p:pic>
       <p:sp>
         <p:nvSpPr>
-          <p:cNvPr id="4" name="Rounded Rectangle 3">
-            <a:extLst>
-              <a:ext uri="{FF2B5EF4-FFF2-40B4-BE49-F238E27FC236}">
-                <a16:creationId xmlns:a16="http://schemas.microsoft.com/office/drawing/2014/main" id="{9BD1603E-EA0E-744C-8BA8-3F8FC9F04F14}"/>
+          <p:cNvPr id="2" name="Rounded Rectangle 1">
+            <a:extLst>
+              <a:ext uri="{FF2B5EF4-FFF2-40B4-BE49-F238E27FC236}">
+                <a16:creationId xmlns:a16="http://schemas.microsoft.com/office/drawing/2014/main" id="{26C87331-03BA-7A45-AFEB-07ACA25CAF08}"/>
               </a:ext>
             </a:extLst>
           </p:cNvPr>
@@ -10932,7 +11094,7 @@
           <p:cNvPr id="5" name="Straight Arrow Connector 4">
             <a:extLst>
               <a:ext uri="{FF2B5EF4-FFF2-40B4-BE49-F238E27FC236}">
-                <a16:creationId xmlns:a16="http://schemas.microsoft.com/office/drawing/2014/main" id="{3BB4AD55-AFBB-004B-AAA8-90A92620D9A0}"/>
+                <a16:creationId xmlns:a16="http://schemas.microsoft.com/office/drawing/2014/main" id="{C6F47484-A0CA-0243-A745-986618201FAC}"/>
               </a:ext>
             </a:extLst>
           </p:cNvPr>
@@ -10941,7 +11103,7 @@
         </p:nvCxnSpPr>
         <p:spPr>
           <a:xfrm flipV="1">
-            <a:off x="2566931" y="892366"/>
+            <a:off x="2027104" y="903383"/>
             <a:ext cx="187286" cy="231354"/>
           </a:xfrm>
           <a:prstGeom prst="straightConnector1">
@@ -10972,7 +11134,7 @@
     </p:spTree>
     <p:extLst>
       <p:ext uri="{BB962C8B-B14F-4D97-AF65-F5344CB8AC3E}">
-        <p14:creationId xmlns:p14="http://schemas.microsoft.com/office/powerpoint/2010/main" val="183390886"/>
+        <p14:creationId xmlns:p14="http://schemas.microsoft.com/office/powerpoint/2010/main" val="3750741736"/>
       </p:ext>
     </p:extLst>
   </p:cSld>
@@ -11004,7 +11166,7 @@
           <p:cNvPr id="3" name="Picture 2">
             <a:extLst>
               <a:ext uri="{FF2B5EF4-FFF2-40B4-BE49-F238E27FC236}">
-                <a16:creationId xmlns:a16="http://schemas.microsoft.com/office/drawing/2014/main" id="{11D8D76F-C308-DB4B-8B47-A2FF693666E8}"/>
+                <a16:creationId xmlns:a16="http://schemas.microsoft.com/office/drawing/2014/main" id="{0D1901B9-3524-2941-BF9D-B6D2EFC559AE}"/>
               </a:ext>
             </a:extLst>
           </p:cNvPr>
@@ -11034,7 +11196,7 @@
           <p:cNvPr id="4" name="Rounded Rectangle 3">
             <a:extLst>
               <a:ext uri="{FF2B5EF4-FFF2-40B4-BE49-F238E27FC236}">
-                <a16:creationId xmlns:a16="http://schemas.microsoft.com/office/drawing/2014/main" id="{8AC4D48D-BD22-544E-AFA3-51ABEFCE126C}"/>
+                <a16:creationId xmlns:a16="http://schemas.microsoft.com/office/drawing/2014/main" id="{9BD1603E-EA0E-744C-8BA8-3F8FC9F04F14}"/>
               </a:ext>
             </a:extLst>
           </p:cNvPr>
@@ -11043,7 +11205,7 @@
         </p:nvSpPr>
         <p:spPr>
           <a:xfrm>
-            <a:off x="4109291" y="462708"/>
+            <a:off x="3558448" y="462708"/>
             <a:ext cx="638979" cy="264405"/>
           </a:xfrm>
           <a:prstGeom prst="roundRect">
@@ -11086,7 +11248,7 @@
           <p:cNvPr id="5" name="Straight Arrow Connector 4">
             <a:extLst>
               <a:ext uri="{FF2B5EF4-FFF2-40B4-BE49-F238E27FC236}">
-                <a16:creationId xmlns:a16="http://schemas.microsoft.com/office/drawing/2014/main" id="{0BCE927D-A1B4-8948-9903-E91EBAC3743E}"/>
+                <a16:creationId xmlns:a16="http://schemas.microsoft.com/office/drawing/2014/main" id="{3BB4AD55-AFBB-004B-AAA8-90A92620D9A0}"/>
               </a:ext>
             </a:extLst>
           </p:cNvPr>
@@ -11095,7 +11257,7 @@
         </p:nvCxnSpPr>
         <p:spPr>
           <a:xfrm flipV="1">
-            <a:off x="2071169" y="892366"/>
+            <a:off x="2566931" y="892366"/>
             <a:ext cx="187286" cy="231354"/>
           </a:xfrm>
           <a:prstGeom prst="straightConnector1">
@@ -11126,7 +11288,7 @@
     </p:spTree>
     <p:extLst>
       <p:ext uri="{BB962C8B-B14F-4D97-AF65-F5344CB8AC3E}">
-        <p14:creationId xmlns:p14="http://schemas.microsoft.com/office/powerpoint/2010/main" val="3578666846"/>
+        <p14:creationId xmlns:p14="http://schemas.microsoft.com/office/powerpoint/2010/main" val="183390886"/>
       </p:ext>
     </p:extLst>
   </p:cSld>
@@ -11158,7 +11320,7 @@
           <p:cNvPr id="3" name="Picture 2">
             <a:extLst>
               <a:ext uri="{FF2B5EF4-FFF2-40B4-BE49-F238E27FC236}">
-                <a16:creationId xmlns:a16="http://schemas.microsoft.com/office/drawing/2014/main" id="{B253F7C3-982A-B943-9248-496E082D1CD4}"/>
+                <a16:creationId xmlns:a16="http://schemas.microsoft.com/office/drawing/2014/main" id="{11D8D76F-C308-DB4B-8B47-A2FF693666E8}"/>
               </a:ext>
             </a:extLst>
           </p:cNvPr>
@@ -11188,7 +11350,7 @@
           <p:cNvPr id="4" name="Rounded Rectangle 3">
             <a:extLst>
               <a:ext uri="{FF2B5EF4-FFF2-40B4-BE49-F238E27FC236}">
-                <a16:creationId xmlns:a16="http://schemas.microsoft.com/office/drawing/2014/main" id="{9E086FDE-DBD3-2040-BD9D-25910470164B}"/>
+                <a16:creationId xmlns:a16="http://schemas.microsoft.com/office/drawing/2014/main" id="{8AC4D48D-BD22-544E-AFA3-51ABEFCE126C}"/>
               </a:ext>
             </a:extLst>
           </p:cNvPr>
@@ -11197,7 +11359,7 @@
         </p:nvSpPr>
         <p:spPr>
           <a:xfrm>
-            <a:off x="4065225" y="462708"/>
+            <a:off x="4109291" y="462708"/>
             <a:ext cx="638979" cy="264405"/>
           </a:xfrm>
           <a:prstGeom prst="roundRect">
@@ -11240,7 +11402,7 @@
           <p:cNvPr id="5" name="Straight Arrow Connector 4">
             <a:extLst>
               <a:ext uri="{FF2B5EF4-FFF2-40B4-BE49-F238E27FC236}">
-                <a16:creationId xmlns:a16="http://schemas.microsoft.com/office/drawing/2014/main" id="{322F9A85-365F-1046-B2A6-E1B01F9FF57D}"/>
+                <a16:creationId xmlns:a16="http://schemas.microsoft.com/office/drawing/2014/main" id="{0BCE927D-A1B4-8948-9903-E91EBAC3743E}"/>
               </a:ext>
             </a:extLst>
           </p:cNvPr>
@@ -11249,7 +11411,7 @@
         </p:nvCxnSpPr>
         <p:spPr>
           <a:xfrm flipV="1">
-            <a:off x="2566931" y="892366"/>
+            <a:off x="2071169" y="892366"/>
             <a:ext cx="187286" cy="231354"/>
           </a:xfrm>
           <a:prstGeom prst="straightConnector1">
@@ -11280,7 +11442,7 @@
     </p:spTree>
     <p:extLst>
       <p:ext uri="{BB962C8B-B14F-4D97-AF65-F5344CB8AC3E}">
-        <p14:creationId xmlns:p14="http://schemas.microsoft.com/office/powerpoint/2010/main" val="790165709"/>
+        <p14:creationId xmlns:p14="http://schemas.microsoft.com/office/powerpoint/2010/main" val="3578666846"/>
       </p:ext>
     </p:extLst>
   </p:cSld>
@@ -11312,7 +11474,7 @@
           <p:cNvPr id="3" name="Picture 2">
             <a:extLst>
               <a:ext uri="{FF2B5EF4-FFF2-40B4-BE49-F238E27FC236}">
-                <a16:creationId xmlns:a16="http://schemas.microsoft.com/office/drawing/2014/main" id="{8370D1A9-0395-7E40-B99A-5FABACA727DE}"/>
+                <a16:creationId xmlns:a16="http://schemas.microsoft.com/office/drawing/2014/main" id="{B253F7C3-982A-B943-9248-496E082D1CD4}"/>
               </a:ext>
             </a:extLst>
           </p:cNvPr>
@@ -11342,7 +11504,7 @@
           <p:cNvPr id="4" name="Rounded Rectangle 3">
             <a:extLst>
               <a:ext uri="{FF2B5EF4-FFF2-40B4-BE49-F238E27FC236}">
-                <a16:creationId xmlns:a16="http://schemas.microsoft.com/office/drawing/2014/main" id="{C0120A9E-EAB6-F343-A54E-58F0508A34FD}"/>
+                <a16:creationId xmlns:a16="http://schemas.microsoft.com/office/drawing/2014/main" id="{9E086FDE-DBD3-2040-BD9D-25910470164B}"/>
               </a:ext>
             </a:extLst>
           </p:cNvPr>
@@ -11351,7 +11513,7 @@
         </p:nvSpPr>
         <p:spPr>
           <a:xfrm>
-            <a:off x="4660133" y="462708"/>
+            <a:off x="4065225" y="462708"/>
             <a:ext cx="638979" cy="264405"/>
           </a:xfrm>
           <a:prstGeom prst="roundRect">
@@ -11394,7 +11556,7 @@
           <p:cNvPr id="5" name="Straight Arrow Connector 4">
             <a:extLst>
               <a:ext uri="{FF2B5EF4-FFF2-40B4-BE49-F238E27FC236}">
-                <a16:creationId xmlns:a16="http://schemas.microsoft.com/office/drawing/2014/main" id="{5F949B47-0B8E-FB40-B73C-E3ED20E453D9}"/>
+                <a16:creationId xmlns:a16="http://schemas.microsoft.com/office/drawing/2014/main" id="{322F9A85-365F-1046-B2A6-E1B01F9FF57D}"/>
               </a:ext>
             </a:extLst>
           </p:cNvPr>
@@ -11403,7 +11565,7 @@
         </p:nvCxnSpPr>
         <p:spPr>
           <a:xfrm flipV="1">
-            <a:off x="2071167" y="914400"/>
+            <a:off x="2566931" y="892366"/>
             <a:ext cx="187286" cy="231354"/>
           </a:xfrm>
           <a:prstGeom prst="straightConnector1">
@@ -11434,7 +11596,7 @@
     </p:spTree>
     <p:extLst>
       <p:ext uri="{BB962C8B-B14F-4D97-AF65-F5344CB8AC3E}">
-        <p14:creationId xmlns:p14="http://schemas.microsoft.com/office/powerpoint/2010/main" val="713204883"/>
+        <p14:creationId xmlns:p14="http://schemas.microsoft.com/office/powerpoint/2010/main" val="790165709"/>
       </p:ext>
     </p:extLst>
   </p:cSld>
@@ -11466,7 +11628,7 @@
           <p:cNvPr id="3" name="Picture 2">
             <a:extLst>
               <a:ext uri="{FF2B5EF4-FFF2-40B4-BE49-F238E27FC236}">
-                <a16:creationId xmlns:a16="http://schemas.microsoft.com/office/drawing/2014/main" id="{D531CE16-1589-3B4C-83BB-9210A0221396}"/>
+                <a16:creationId xmlns:a16="http://schemas.microsoft.com/office/drawing/2014/main" id="{8370D1A9-0395-7E40-B99A-5FABACA727DE}"/>
               </a:ext>
             </a:extLst>
           </p:cNvPr>
@@ -11496,7 +11658,7 @@
           <p:cNvPr id="4" name="Rounded Rectangle 3">
             <a:extLst>
               <a:ext uri="{FF2B5EF4-FFF2-40B4-BE49-F238E27FC236}">
-                <a16:creationId xmlns:a16="http://schemas.microsoft.com/office/drawing/2014/main" id="{663685E6-C5D1-FC44-8D25-B8546753CEAE}"/>
+                <a16:creationId xmlns:a16="http://schemas.microsoft.com/office/drawing/2014/main" id="{C0120A9E-EAB6-F343-A54E-58F0508A34FD}"/>
               </a:ext>
             </a:extLst>
           </p:cNvPr>
@@ -11548,7 +11710,7 @@
           <p:cNvPr id="5" name="Straight Arrow Connector 4">
             <a:extLst>
               <a:ext uri="{FF2B5EF4-FFF2-40B4-BE49-F238E27FC236}">
-                <a16:creationId xmlns:a16="http://schemas.microsoft.com/office/drawing/2014/main" id="{ADB3ECB0-34B0-8B4F-AA02-742F1A15C610}"/>
+                <a16:creationId xmlns:a16="http://schemas.microsoft.com/office/drawing/2014/main" id="{5F949B47-0B8E-FB40-B73C-E3ED20E453D9}"/>
               </a:ext>
             </a:extLst>
           </p:cNvPr>
@@ -11557,7 +11719,7 @@
         </p:nvCxnSpPr>
         <p:spPr>
           <a:xfrm flipV="1">
-            <a:off x="2566931" y="892366"/>
+            <a:off x="2071167" y="914400"/>
             <a:ext cx="187286" cy="231354"/>
           </a:xfrm>
           <a:prstGeom prst="straightConnector1">
@@ -11588,7 +11750,7 @@
     </p:spTree>
     <p:extLst>
       <p:ext uri="{BB962C8B-B14F-4D97-AF65-F5344CB8AC3E}">
-        <p14:creationId xmlns:p14="http://schemas.microsoft.com/office/powerpoint/2010/main" val="2389064546"/>
+        <p14:creationId xmlns:p14="http://schemas.microsoft.com/office/powerpoint/2010/main" val="713204883"/>
       </p:ext>
     </p:extLst>
   </p:cSld>
@@ -11859,10 +12021,10 @@
       </p:grpSpPr>
       <p:pic>
         <p:nvPicPr>
-          <p:cNvPr id="5" name="Picture 4">
-            <a:extLst>
-              <a:ext uri="{FF2B5EF4-FFF2-40B4-BE49-F238E27FC236}">
-                <a16:creationId xmlns:a16="http://schemas.microsoft.com/office/drawing/2014/main" id="{43689827-5EDA-5F4E-879D-DFF305A71696}"/>
+          <p:cNvPr id="3" name="Picture 2">
+            <a:extLst>
+              <a:ext uri="{FF2B5EF4-FFF2-40B4-BE49-F238E27FC236}">
+                <a16:creationId xmlns:a16="http://schemas.microsoft.com/office/drawing/2014/main" id="{D531CE16-1589-3B4C-83BB-9210A0221396}"/>
               </a:ext>
             </a:extLst>
           </p:cNvPr>
@@ -11889,10 +12051,10 @@
       </p:pic>
       <p:sp>
         <p:nvSpPr>
-          <p:cNvPr id="2" name="Rounded Rectangle 1">
-            <a:extLst>
-              <a:ext uri="{FF2B5EF4-FFF2-40B4-BE49-F238E27FC236}">
-                <a16:creationId xmlns:a16="http://schemas.microsoft.com/office/drawing/2014/main" id="{BDD21A01-C951-FC47-B3EB-5848677FC0D9}"/>
+          <p:cNvPr id="4" name="Rounded Rectangle 3">
+            <a:extLst>
+              <a:ext uri="{FF2B5EF4-FFF2-40B4-BE49-F238E27FC236}">
+                <a16:creationId xmlns:a16="http://schemas.microsoft.com/office/drawing/2014/main" id="{663685E6-C5D1-FC44-8D25-B8546753CEAE}"/>
               </a:ext>
             </a:extLst>
           </p:cNvPr>
@@ -11901,8 +12063,8 @@
         </p:nvSpPr>
         <p:spPr>
           <a:xfrm>
-            <a:off x="5187820" y="457200"/>
-            <a:ext cx="1520890" cy="270588"/>
+            <a:off x="4660133" y="462708"/>
+            <a:ext cx="638979" cy="264405"/>
           </a:xfrm>
           <a:prstGeom prst="roundRect">
             <a:avLst/>
@@ -11941,10 +12103,10 @@
       </p:sp>
       <p:cxnSp>
         <p:nvCxnSpPr>
-          <p:cNvPr id="4" name="Straight Arrow Connector 3">
-            <a:extLst>
-              <a:ext uri="{FF2B5EF4-FFF2-40B4-BE49-F238E27FC236}">
-                <a16:creationId xmlns:a16="http://schemas.microsoft.com/office/drawing/2014/main" id="{40040DA5-5A6B-1A49-B4C8-16D389F877ED}"/>
+          <p:cNvPr id="5" name="Straight Arrow Connector 4">
+            <a:extLst>
+              <a:ext uri="{FF2B5EF4-FFF2-40B4-BE49-F238E27FC236}">
+                <a16:creationId xmlns:a16="http://schemas.microsoft.com/office/drawing/2014/main" id="{ADB3ECB0-34B0-8B4F-AA02-742F1A15C610}"/>
               </a:ext>
             </a:extLst>
           </p:cNvPr>
@@ -11953,8 +12115,8 @@
         </p:nvCxnSpPr>
         <p:spPr>
           <a:xfrm flipV="1">
-            <a:off x="2006082" y="886408"/>
-            <a:ext cx="205273" cy="261257"/>
+            <a:off x="2566931" y="892366"/>
+            <a:ext cx="187286" cy="231354"/>
           </a:xfrm>
           <a:prstGeom prst="straightConnector1">
             <a:avLst/>
@@ -11981,104 +12143,10 @@
           </a:fontRef>
         </p:style>
       </p:cxnSp>
-      <p:cxnSp>
-        <p:nvCxnSpPr>
-          <p:cNvPr id="6" name="Straight Arrow Connector 5">
-            <a:extLst>
-              <a:ext uri="{FF2B5EF4-FFF2-40B4-BE49-F238E27FC236}">
-                <a16:creationId xmlns:a16="http://schemas.microsoft.com/office/drawing/2014/main" id="{2264E75B-9354-3F40-BC11-E33A7AD6BDE1}"/>
-              </a:ext>
-            </a:extLst>
-          </p:cNvPr>
-          <p:cNvCxnSpPr/>
-          <p:nvPr/>
-        </p:nvCxnSpPr>
-        <p:spPr>
-          <a:xfrm flipV="1">
-            <a:off x="5256245" y="793103"/>
-            <a:ext cx="205273" cy="261257"/>
-          </a:xfrm>
-          <a:prstGeom prst="straightConnector1">
-            <a:avLst/>
-          </a:prstGeom>
-          <a:ln w="38100">
-            <a:solidFill>
-              <a:srgbClr val="FF0000"/>
-            </a:solidFill>
-            <a:tailEnd type="triangle"/>
-          </a:ln>
-        </p:spPr>
-        <p:style>
-          <a:lnRef idx="1">
-            <a:schemeClr val="accent1"/>
-          </a:lnRef>
-          <a:fillRef idx="0">
-            <a:schemeClr val="accent1"/>
-          </a:fillRef>
-          <a:effectRef idx="0">
-            <a:schemeClr val="accent1"/>
-          </a:effectRef>
-          <a:fontRef idx="minor">
-            <a:schemeClr val="tx1"/>
-          </a:fontRef>
-        </p:style>
-      </p:cxnSp>
-      <p:sp>
-        <p:nvSpPr>
-          <p:cNvPr id="7" name="Oval 6">
-            <a:extLst>
-              <a:ext uri="{FF2B5EF4-FFF2-40B4-BE49-F238E27FC236}">
-                <a16:creationId xmlns:a16="http://schemas.microsoft.com/office/drawing/2014/main" id="{085C1049-308F-364C-B325-9AAB7BC195BB}"/>
-              </a:ext>
-            </a:extLst>
-          </p:cNvPr>
-          <p:cNvSpPr/>
-          <p:nvPr/>
-        </p:nvSpPr>
-        <p:spPr>
-          <a:xfrm>
-            <a:off x="4590661" y="5038531"/>
-            <a:ext cx="870857" cy="335902"/>
-          </a:xfrm>
-          <a:prstGeom prst="ellipse">
-            <a:avLst/>
-          </a:prstGeom>
-          <a:noFill/>
-          <a:ln w="38100">
-            <a:solidFill>
-              <a:srgbClr val="FF0000"/>
-            </a:solidFill>
-          </a:ln>
-        </p:spPr>
-        <p:style>
-          <a:lnRef idx="2">
-            <a:schemeClr val="accent1">
-              <a:shade val="50000"/>
-            </a:schemeClr>
-          </a:lnRef>
-          <a:fillRef idx="1">
-            <a:schemeClr val="accent1"/>
-          </a:fillRef>
-          <a:effectRef idx="0">
-            <a:schemeClr val="accent1"/>
-          </a:effectRef>
-          <a:fontRef idx="minor">
-            <a:schemeClr val="lt1"/>
-          </a:fontRef>
-        </p:style>
-        <p:txBody>
-          <a:bodyPr rtlCol="0" anchor="ctr"/>
-          <a:lstStyle/>
-          <a:p>
-            <a:pPr algn="ctr"/>
-            <a:endParaRPr lang="en-US"/>
-          </a:p>
-        </p:txBody>
-      </p:sp>
     </p:spTree>
     <p:extLst>
       <p:ext uri="{BB962C8B-B14F-4D97-AF65-F5344CB8AC3E}">
-        <p14:creationId xmlns:p14="http://schemas.microsoft.com/office/powerpoint/2010/main" val="47291726"/>
+        <p14:creationId xmlns:p14="http://schemas.microsoft.com/office/powerpoint/2010/main" val="2389064546"/>
       </p:ext>
     </p:extLst>
   </p:cSld>
@@ -12107,10 +12175,10 @@
       </p:grpSpPr>
       <p:pic>
         <p:nvPicPr>
-          <p:cNvPr id="3" name="Picture 2">
-            <a:extLst>
-              <a:ext uri="{FF2B5EF4-FFF2-40B4-BE49-F238E27FC236}">
-                <a16:creationId xmlns:a16="http://schemas.microsoft.com/office/drawing/2014/main" id="{35BDA311-F800-0D4B-A3F3-EA89859835DE}"/>
+          <p:cNvPr id="5" name="Picture 4">
+            <a:extLst>
+              <a:ext uri="{FF2B5EF4-FFF2-40B4-BE49-F238E27FC236}">
+                <a16:creationId xmlns:a16="http://schemas.microsoft.com/office/drawing/2014/main" id="{43689827-5EDA-5F4E-879D-DFF305A71696}"/>
               </a:ext>
             </a:extLst>
           </p:cNvPr>
@@ -12140,7 +12208,7 @@
           <p:cNvPr id="2" name="Rounded Rectangle 1">
             <a:extLst>
               <a:ext uri="{FF2B5EF4-FFF2-40B4-BE49-F238E27FC236}">
-                <a16:creationId xmlns:a16="http://schemas.microsoft.com/office/drawing/2014/main" id="{C024554C-33EE-9647-8C8E-46CE47F820C3}"/>
+                <a16:creationId xmlns:a16="http://schemas.microsoft.com/office/drawing/2014/main" id="{BDD21A01-C951-FC47-B3EB-5848677FC0D9}"/>
               </a:ext>
             </a:extLst>
           </p:cNvPr>
@@ -12149,8 +12217,8 @@
         </p:nvSpPr>
         <p:spPr>
           <a:xfrm>
-            <a:off x="5141167" y="438539"/>
-            <a:ext cx="662474" cy="317241"/>
+            <a:off x="5187820" y="457200"/>
+            <a:ext cx="1520890" cy="270588"/>
           </a:xfrm>
           <a:prstGeom prst="roundRect">
             <a:avLst/>
@@ -12187,12 +12255,96 @@
           </a:p>
         </p:txBody>
       </p:sp>
-      <p:sp>
-        <p:nvSpPr>
-          <p:cNvPr id="4" name="Rounded Rectangle 3">
-            <a:extLst>
-              <a:ext uri="{FF2B5EF4-FFF2-40B4-BE49-F238E27FC236}">
-                <a16:creationId xmlns:a16="http://schemas.microsoft.com/office/drawing/2014/main" id="{65B0CE9D-D440-0445-8C37-FE6A933887DC}"/>
+      <p:cxnSp>
+        <p:nvCxnSpPr>
+          <p:cNvPr id="4" name="Straight Arrow Connector 3">
+            <a:extLst>
+              <a:ext uri="{FF2B5EF4-FFF2-40B4-BE49-F238E27FC236}">
+                <a16:creationId xmlns:a16="http://schemas.microsoft.com/office/drawing/2014/main" id="{40040DA5-5A6B-1A49-B4C8-16D389F877ED}"/>
+              </a:ext>
+            </a:extLst>
+          </p:cNvPr>
+          <p:cNvCxnSpPr/>
+          <p:nvPr/>
+        </p:nvCxnSpPr>
+        <p:spPr>
+          <a:xfrm flipV="1">
+            <a:off x="2006082" y="886408"/>
+            <a:ext cx="205273" cy="261257"/>
+          </a:xfrm>
+          <a:prstGeom prst="straightConnector1">
+            <a:avLst/>
+          </a:prstGeom>
+          <a:ln w="38100">
+            <a:solidFill>
+              <a:srgbClr val="FF0000"/>
+            </a:solidFill>
+            <a:tailEnd type="triangle"/>
+          </a:ln>
+        </p:spPr>
+        <p:style>
+          <a:lnRef idx="1">
+            <a:schemeClr val="accent1"/>
+          </a:lnRef>
+          <a:fillRef idx="0">
+            <a:schemeClr val="accent1"/>
+          </a:fillRef>
+          <a:effectRef idx="0">
+            <a:schemeClr val="accent1"/>
+          </a:effectRef>
+          <a:fontRef idx="minor">
+            <a:schemeClr val="tx1"/>
+          </a:fontRef>
+        </p:style>
+      </p:cxnSp>
+      <p:cxnSp>
+        <p:nvCxnSpPr>
+          <p:cNvPr id="6" name="Straight Arrow Connector 5">
+            <a:extLst>
+              <a:ext uri="{FF2B5EF4-FFF2-40B4-BE49-F238E27FC236}">
+                <a16:creationId xmlns:a16="http://schemas.microsoft.com/office/drawing/2014/main" id="{2264E75B-9354-3F40-BC11-E33A7AD6BDE1}"/>
+              </a:ext>
+            </a:extLst>
+          </p:cNvPr>
+          <p:cNvCxnSpPr/>
+          <p:nvPr/>
+        </p:nvCxnSpPr>
+        <p:spPr>
+          <a:xfrm flipV="1">
+            <a:off x="5256245" y="793103"/>
+            <a:ext cx="205273" cy="261257"/>
+          </a:xfrm>
+          <a:prstGeom prst="straightConnector1">
+            <a:avLst/>
+          </a:prstGeom>
+          <a:ln w="38100">
+            <a:solidFill>
+              <a:srgbClr val="FF0000"/>
+            </a:solidFill>
+            <a:tailEnd type="triangle"/>
+          </a:ln>
+        </p:spPr>
+        <p:style>
+          <a:lnRef idx="1">
+            <a:schemeClr val="accent1"/>
+          </a:lnRef>
+          <a:fillRef idx="0">
+            <a:schemeClr val="accent1"/>
+          </a:fillRef>
+          <a:effectRef idx="0">
+            <a:schemeClr val="accent1"/>
+          </a:effectRef>
+          <a:fontRef idx="minor">
+            <a:schemeClr val="tx1"/>
+          </a:fontRef>
+        </p:style>
+      </p:cxnSp>
+      <p:sp>
+        <p:nvSpPr>
+          <p:cNvPr id="7" name="Oval 6">
+            <a:extLst>
+              <a:ext uri="{FF2B5EF4-FFF2-40B4-BE49-F238E27FC236}">
+                <a16:creationId xmlns:a16="http://schemas.microsoft.com/office/drawing/2014/main" id="{085C1049-308F-364C-B325-9AAB7BC195BB}"/>
               </a:ext>
             </a:extLst>
           </p:cNvPr>
@@ -12201,10 +12353,10 @@
         </p:nvSpPr>
         <p:spPr>
           <a:xfrm>
-            <a:off x="2419739" y="665584"/>
-            <a:ext cx="662474" cy="317241"/>
-          </a:xfrm>
-          <a:prstGeom prst="roundRect">
+            <a:off x="4590661" y="5038531"/>
+            <a:ext cx="870857" cy="335902"/>
+          </a:xfrm>
+          <a:prstGeom prst="ellipse">
             <a:avLst/>
           </a:prstGeom>
           <a:noFill/>
@@ -12239,94 +12391,10 @@
           </a:p>
         </p:txBody>
       </p:sp>
-      <p:cxnSp>
-        <p:nvCxnSpPr>
-          <p:cNvPr id="6" name="Straight Arrow Connector 5">
-            <a:extLst>
-              <a:ext uri="{FF2B5EF4-FFF2-40B4-BE49-F238E27FC236}">
-                <a16:creationId xmlns:a16="http://schemas.microsoft.com/office/drawing/2014/main" id="{1EF9B5A4-E4C8-6544-8BDD-16EB6AAC90BF}"/>
-              </a:ext>
-            </a:extLst>
-          </p:cNvPr>
-          <p:cNvCxnSpPr/>
-          <p:nvPr/>
-        </p:nvCxnSpPr>
-        <p:spPr>
-          <a:xfrm>
-            <a:off x="5374433" y="4404049"/>
-            <a:ext cx="429208" cy="0"/>
-          </a:xfrm>
-          <a:prstGeom prst="straightConnector1">
-            <a:avLst/>
-          </a:prstGeom>
-          <a:ln w="57150">
-            <a:solidFill>
-              <a:srgbClr val="FF0000"/>
-            </a:solidFill>
-            <a:headEnd type="triangle"/>
-            <a:tailEnd type="triangle"/>
-          </a:ln>
-        </p:spPr>
-        <p:style>
-          <a:lnRef idx="1">
-            <a:schemeClr val="accent1"/>
-          </a:lnRef>
-          <a:fillRef idx="0">
-            <a:schemeClr val="accent1"/>
-          </a:fillRef>
-          <a:effectRef idx="0">
-            <a:schemeClr val="accent1"/>
-          </a:effectRef>
-          <a:fontRef idx="minor">
-            <a:schemeClr val="tx1"/>
-          </a:fontRef>
-        </p:style>
-      </p:cxnSp>
-      <p:sp>
-        <p:nvSpPr>
-          <p:cNvPr id="7" name="TextBox 6">
-            <a:extLst>
-              <a:ext uri="{FF2B5EF4-FFF2-40B4-BE49-F238E27FC236}">
-                <a16:creationId xmlns:a16="http://schemas.microsoft.com/office/drawing/2014/main" id="{D5C8CC2E-7FF9-D542-AEE5-90A2DD757235}"/>
-              </a:ext>
-            </a:extLst>
-          </p:cNvPr>
-          <p:cNvSpPr txBox="1"/>
-          <p:nvPr/>
-        </p:nvSpPr>
-        <p:spPr>
-          <a:xfrm>
-            <a:off x="3750907" y="5029200"/>
-            <a:ext cx="887807" cy="369332"/>
-          </a:xfrm>
-          <a:prstGeom prst="rect">
-            <a:avLst/>
-          </a:prstGeom>
-          <a:solidFill>
-            <a:schemeClr val="bg1"/>
-          </a:solidFill>
-        </p:spPr>
-        <p:txBody>
-          <a:bodyPr wrap="none" rtlCol="0">
-            <a:spAutoFit/>
-          </a:bodyPr>
-          <a:lstStyle/>
-          <a:p>
-            <a:r>
-              <a:rPr lang="en-US" b="1" dirty="0">
-                <a:solidFill>
-                  <a:srgbClr val="FF0000"/>
-                </a:solidFill>
-              </a:rPr>
-              <a:t>Default</a:t>
-            </a:r>
-          </a:p>
-        </p:txBody>
-      </p:sp>
     </p:spTree>
     <p:extLst>
       <p:ext uri="{BB962C8B-B14F-4D97-AF65-F5344CB8AC3E}">
-        <p14:creationId xmlns:p14="http://schemas.microsoft.com/office/powerpoint/2010/main" val="3153473839"/>
+        <p14:creationId xmlns:p14="http://schemas.microsoft.com/office/powerpoint/2010/main" val="47291726"/>
       </p:ext>
     </p:extLst>
   </p:cSld>
@@ -12358,7 +12426,7 @@
           <p:cNvPr id="3" name="Picture 2">
             <a:extLst>
               <a:ext uri="{FF2B5EF4-FFF2-40B4-BE49-F238E27FC236}">
-                <a16:creationId xmlns:a16="http://schemas.microsoft.com/office/drawing/2014/main" id="{2C4FB43D-571E-104F-8C85-EB5D09D2E2F6}"/>
+                <a16:creationId xmlns:a16="http://schemas.microsoft.com/office/drawing/2014/main" id="{35BDA311-F800-0D4B-A3F3-EA89859835DE}"/>
               </a:ext>
             </a:extLst>
           </p:cNvPr>
@@ -12385,10 +12453,10 @@
       </p:pic>
       <p:sp>
         <p:nvSpPr>
-          <p:cNvPr id="2" name="Oval 1">
-            <a:extLst>
-              <a:ext uri="{FF2B5EF4-FFF2-40B4-BE49-F238E27FC236}">
-                <a16:creationId xmlns:a16="http://schemas.microsoft.com/office/drawing/2014/main" id="{759A225B-5E2C-2945-80A1-CFBDECE3B045}"/>
+          <p:cNvPr id="2" name="Rounded Rectangle 1">
+            <a:extLst>
+              <a:ext uri="{FF2B5EF4-FFF2-40B4-BE49-F238E27FC236}">
+                <a16:creationId xmlns:a16="http://schemas.microsoft.com/office/drawing/2014/main" id="{C024554C-33EE-9647-8C8E-46CE47F820C3}"/>
               </a:ext>
             </a:extLst>
           </p:cNvPr>
@@ -12397,10 +12465,10 @@
         </p:nvSpPr>
         <p:spPr>
           <a:xfrm>
-            <a:off x="8565502" y="1054359"/>
-            <a:ext cx="662474" cy="2034074"/>
-          </a:xfrm>
-          <a:prstGeom prst="ellipse">
+            <a:off x="5141167" y="438539"/>
+            <a:ext cx="662474" cy="317241"/>
+          </a:xfrm>
+          <a:prstGeom prst="roundRect">
             <a:avLst/>
           </a:prstGeom>
           <a:noFill/>
@@ -12435,10 +12503,146 @@
           </a:p>
         </p:txBody>
       </p:sp>
+      <p:sp>
+        <p:nvSpPr>
+          <p:cNvPr id="4" name="Rounded Rectangle 3">
+            <a:extLst>
+              <a:ext uri="{FF2B5EF4-FFF2-40B4-BE49-F238E27FC236}">
+                <a16:creationId xmlns:a16="http://schemas.microsoft.com/office/drawing/2014/main" id="{65B0CE9D-D440-0445-8C37-FE6A933887DC}"/>
+              </a:ext>
+            </a:extLst>
+          </p:cNvPr>
+          <p:cNvSpPr/>
+          <p:nvPr/>
+        </p:nvSpPr>
+        <p:spPr>
+          <a:xfrm>
+            <a:off x="2419739" y="665584"/>
+            <a:ext cx="662474" cy="317241"/>
+          </a:xfrm>
+          <a:prstGeom prst="roundRect">
+            <a:avLst/>
+          </a:prstGeom>
+          <a:noFill/>
+          <a:ln w="38100">
+            <a:solidFill>
+              <a:srgbClr val="FF0000"/>
+            </a:solidFill>
+          </a:ln>
+        </p:spPr>
+        <p:style>
+          <a:lnRef idx="2">
+            <a:schemeClr val="accent1">
+              <a:shade val="50000"/>
+            </a:schemeClr>
+          </a:lnRef>
+          <a:fillRef idx="1">
+            <a:schemeClr val="accent1"/>
+          </a:fillRef>
+          <a:effectRef idx="0">
+            <a:schemeClr val="accent1"/>
+          </a:effectRef>
+          <a:fontRef idx="minor">
+            <a:schemeClr val="lt1"/>
+          </a:fontRef>
+        </p:style>
+        <p:txBody>
+          <a:bodyPr rtlCol="0" anchor="ctr"/>
+          <a:lstStyle/>
+          <a:p>
+            <a:pPr algn="ctr"/>
+            <a:endParaRPr lang="en-US"/>
+          </a:p>
+        </p:txBody>
+      </p:sp>
+      <p:cxnSp>
+        <p:nvCxnSpPr>
+          <p:cNvPr id="6" name="Straight Arrow Connector 5">
+            <a:extLst>
+              <a:ext uri="{FF2B5EF4-FFF2-40B4-BE49-F238E27FC236}">
+                <a16:creationId xmlns:a16="http://schemas.microsoft.com/office/drawing/2014/main" id="{1EF9B5A4-E4C8-6544-8BDD-16EB6AAC90BF}"/>
+              </a:ext>
+            </a:extLst>
+          </p:cNvPr>
+          <p:cNvCxnSpPr/>
+          <p:nvPr/>
+        </p:nvCxnSpPr>
+        <p:spPr>
+          <a:xfrm>
+            <a:off x="5374433" y="4404049"/>
+            <a:ext cx="429208" cy="0"/>
+          </a:xfrm>
+          <a:prstGeom prst="straightConnector1">
+            <a:avLst/>
+          </a:prstGeom>
+          <a:ln w="57150">
+            <a:solidFill>
+              <a:srgbClr val="FF0000"/>
+            </a:solidFill>
+            <a:headEnd type="triangle"/>
+            <a:tailEnd type="triangle"/>
+          </a:ln>
+        </p:spPr>
+        <p:style>
+          <a:lnRef idx="1">
+            <a:schemeClr val="accent1"/>
+          </a:lnRef>
+          <a:fillRef idx="0">
+            <a:schemeClr val="accent1"/>
+          </a:fillRef>
+          <a:effectRef idx="0">
+            <a:schemeClr val="accent1"/>
+          </a:effectRef>
+          <a:fontRef idx="minor">
+            <a:schemeClr val="tx1"/>
+          </a:fontRef>
+        </p:style>
+      </p:cxnSp>
+      <p:sp>
+        <p:nvSpPr>
+          <p:cNvPr id="7" name="TextBox 6">
+            <a:extLst>
+              <a:ext uri="{FF2B5EF4-FFF2-40B4-BE49-F238E27FC236}">
+                <a16:creationId xmlns:a16="http://schemas.microsoft.com/office/drawing/2014/main" id="{D5C8CC2E-7FF9-D542-AEE5-90A2DD757235}"/>
+              </a:ext>
+            </a:extLst>
+          </p:cNvPr>
+          <p:cNvSpPr txBox="1"/>
+          <p:nvPr/>
+        </p:nvSpPr>
+        <p:spPr>
+          <a:xfrm>
+            <a:off x="3750907" y="5029200"/>
+            <a:ext cx="887807" cy="369332"/>
+          </a:xfrm>
+          <a:prstGeom prst="rect">
+            <a:avLst/>
+          </a:prstGeom>
+          <a:solidFill>
+            <a:schemeClr val="bg1"/>
+          </a:solidFill>
+        </p:spPr>
+        <p:txBody>
+          <a:bodyPr wrap="none" rtlCol="0">
+            <a:spAutoFit/>
+          </a:bodyPr>
+          <a:lstStyle/>
+          <a:p>
+            <a:r>
+              <a:rPr lang="en-US" b="1" dirty="0">
+                <a:solidFill>
+                  <a:srgbClr val="FF0000"/>
+                </a:solidFill>
+              </a:rPr>
+              <a:t>Default</a:t>
+            </a:r>
+          </a:p>
+        </p:txBody>
+      </p:sp>
     </p:spTree>
     <p:extLst>
       <p:ext uri="{BB962C8B-B14F-4D97-AF65-F5344CB8AC3E}">
-        <p14:creationId xmlns:p14="http://schemas.microsoft.com/office/powerpoint/2010/main" val="1718495775"/>
+        <p14:creationId xmlns:p14="http://schemas.microsoft.com/office/powerpoint/2010/main" val="3153473839"/>
       </p:ext>
     </p:extLst>
   </p:cSld>
@@ -12470,7 +12674,7 @@
           <p:cNvPr id="3" name="Picture 2">
             <a:extLst>
               <a:ext uri="{FF2B5EF4-FFF2-40B4-BE49-F238E27FC236}">
-                <a16:creationId xmlns:a16="http://schemas.microsoft.com/office/drawing/2014/main" id="{B0ABFACF-D60C-FB47-9D0C-95C3B6410129}"/>
+                <a16:creationId xmlns:a16="http://schemas.microsoft.com/office/drawing/2014/main" id="{2C4FB43D-571E-104F-8C85-EB5D09D2E2F6}"/>
               </a:ext>
             </a:extLst>
           </p:cNvPr>
@@ -12495,10 +12699,62 @@
           </a:prstGeom>
         </p:spPr>
       </p:pic>
+      <p:sp>
+        <p:nvSpPr>
+          <p:cNvPr id="2" name="Oval 1">
+            <a:extLst>
+              <a:ext uri="{FF2B5EF4-FFF2-40B4-BE49-F238E27FC236}">
+                <a16:creationId xmlns:a16="http://schemas.microsoft.com/office/drawing/2014/main" id="{759A225B-5E2C-2945-80A1-CFBDECE3B045}"/>
+              </a:ext>
+            </a:extLst>
+          </p:cNvPr>
+          <p:cNvSpPr/>
+          <p:nvPr/>
+        </p:nvSpPr>
+        <p:spPr>
+          <a:xfrm>
+            <a:off x="8565502" y="1054359"/>
+            <a:ext cx="662474" cy="2034074"/>
+          </a:xfrm>
+          <a:prstGeom prst="ellipse">
+            <a:avLst/>
+          </a:prstGeom>
+          <a:noFill/>
+          <a:ln w="38100">
+            <a:solidFill>
+              <a:srgbClr val="FF0000"/>
+            </a:solidFill>
+          </a:ln>
+        </p:spPr>
+        <p:style>
+          <a:lnRef idx="2">
+            <a:schemeClr val="accent1">
+              <a:shade val="50000"/>
+            </a:schemeClr>
+          </a:lnRef>
+          <a:fillRef idx="1">
+            <a:schemeClr val="accent1"/>
+          </a:fillRef>
+          <a:effectRef idx="0">
+            <a:schemeClr val="accent1"/>
+          </a:effectRef>
+          <a:fontRef idx="minor">
+            <a:schemeClr val="lt1"/>
+          </a:fontRef>
+        </p:style>
+        <p:txBody>
+          <a:bodyPr rtlCol="0" anchor="ctr"/>
+          <a:lstStyle/>
+          <a:p>
+            <a:pPr algn="ctr"/>
+            <a:endParaRPr lang="en-US"/>
+          </a:p>
+        </p:txBody>
+      </p:sp>
     </p:spTree>
     <p:extLst>
       <p:ext uri="{BB962C8B-B14F-4D97-AF65-F5344CB8AC3E}">
-        <p14:creationId xmlns:p14="http://schemas.microsoft.com/office/powerpoint/2010/main" val="1552476609"/>
+        <p14:creationId xmlns:p14="http://schemas.microsoft.com/office/powerpoint/2010/main" val="1718495775"/>
       </p:ext>
     </p:extLst>
   </p:cSld>
@@ -12530,7 +12786,7 @@
           <p:cNvPr id="3" name="Picture 2">
             <a:extLst>
               <a:ext uri="{FF2B5EF4-FFF2-40B4-BE49-F238E27FC236}">
-                <a16:creationId xmlns:a16="http://schemas.microsoft.com/office/drawing/2014/main" id="{BEDCEEDF-CC30-E94C-BFE8-CA815EF17F43}"/>
+                <a16:creationId xmlns:a16="http://schemas.microsoft.com/office/drawing/2014/main" id="{B0ABFACF-D60C-FB47-9D0C-95C3B6410129}"/>
               </a:ext>
             </a:extLst>
           </p:cNvPr>
@@ -12555,114 +12811,10 @@
           </a:prstGeom>
         </p:spPr>
       </p:pic>
-      <p:sp>
-        <p:nvSpPr>
-          <p:cNvPr id="2" name="Rounded Rectangle 1">
-            <a:extLst>
-              <a:ext uri="{FF2B5EF4-FFF2-40B4-BE49-F238E27FC236}">
-                <a16:creationId xmlns:a16="http://schemas.microsoft.com/office/drawing/2014/main" id="{BD82F952-2278-794C-8B14-8CF951789428}"/>
-              </a:ext>
-            </a:extLst>
-          </p:cNvPr>
-          <p:cNvSpPr/>
-          <p:nvPr/>
-        </p:nvSpPr>
-        <p:spPr>
-          <a:xfrm>
-            <a:off x="5635690" y="466531"/>
-            <a:ext cx="625151" cy="270587"/>
-          </a:xfrm>
-          <a:prstGeom prst="roundRect">
-            <a:avLst/>
-          </a:prstGeom>
-          <a:noFill/>
-          <a:ln w="38100">
-            <a:solidFill>
-              <a:srgbClr val="FF0000"/>
-            </a:solidFill>
-          </a:ln>
-        </p:spPr>
-        <p:style>
-          <a:lnRef idx="2">
-            <a:schemeClr val="accent1">
-              <a:shade val="50000"/>
-            </a:schemeClr>
-          </a:lnRef>
-          <a:fillRef idx="1">
-            <a:schemeClr val="accent1"/>
-          </a:fillRef>
-          <a:effectRef idx="0">
-            <a:schemeClr val="accent1"/>
-          </a:effectRef>
-          <a:fontRef idx="minor">
-            <a:schemeClr val="lt1"/>
-          </a:fontRef>
-        </p:style>
-        <p:txBody>
-          <a:bodyPr rtlCol="0" anchor="ctr"/>
-          <a:lstStyle/>
-          <a:p>
-            <a:pPr algn="ctr"/>
-            <a:endParaRPr lang="en-US"/>
-          </a:p>
-        </p:txBody>
-      </p:sp>
-      <p:sp>
-        <p:nvSpPr>
-          <p:cNvPr id="4" name="Rounded Rectangle 3">
-            <a:extLst>
-              <a:ext uri="{FF2B5EF4-FFF2-40B4-BE49-F238E27FC236}">
-                <a16:creationId xmlns:a16="http://schemas.microsoft.com/office/drawing/2014/main" id="{B7EE96E3-186A-F246-A2D2-81D08B4FC01D}"/>
-              </a:ext>
-            </a:extLst>
-          </p:cNvPr>
-          <p:cNvSpPr/>
-          <p:nvPr/>
-        </p:nvSpPr>
-        <p:spPr>
-          <a:xfrm>
-            <a:off x="1893925" y="653139"/>
-            <a:ext cx="625151" cy="270587"/>
-          </a:xfrm>
-          <a:prstGeom prst="roundRect">
-            <a:avLst/>
-          </a:prstGeom>
-          <a:noFill/>
-          <a:ln w="38100">
-            <a:solidFill>
-              <a:srgbClr val="FF0000"/>
-            </a:solidFill>
-          </a:ln>
-        </p:spPr>
-        <p:style>
-          <a:lnRef idx="2">
-            <a:schemeClr val="accent1">
-              <a:shade val="50000"/>
-            </a:schemeClr>
-          </a:lnRef>
-          <a:fillRef idx="1">
-            <a:schemeClr val="accent1"/>
-          </a:fillRef>
-          <a:effectRef idx="0">
-            <a:schemeClr val="accent1"/>
-          </a:effectRef>
-          <a:fontRef idx="minor">
-            <a:schemeClr val="lt1"/>
-          </a:fontRef>
-        </p:style>
-        <p:txBody>
-          <a:bodyPr rtlCol="0" anchor="ctr"/>
-          <a:lstStyle/>
-          <a:p>
-            <a:pPr algn="ctr"/>
-            <a:endParaRPr lang="en-US"/>
-          </a:p>
-        </p:txBody>
-      </p:sp>
     </p:spTree>
     <p:extLst>
       <p:ext uri="{BB962C8B-B14F-4D97-AF65-F5344CB8AC3E}">
-        <p14:creationId xmlns:p14="http://schemas.microsoft.com/office/powerpoint/2010/main" val="550595469"/>
+        <p14:creationId xmlns:p14="http://schemas.microsoft.com/office/powerpoint/2010/main" val="1552476609"/>
       </p:ext>
     </p:extLst>
   </p:cSld>
@@ -12694,7 +12846,7 @@
           <p:cNvPr id="3" name="Picture 2">
             <a:extLst>
               <a:ext uri="{FF2B5EF4-FFF2-40B4-BE49-F238E27FC236}">
-                <a16:creationId xmlns:a16="http://schemas.microsoft.com/office/drawing/2014/main" id="{A3193CCB-1E83-504E-BD9E-7B894F06D465}"/>
+                <a16:creationId xmlns:a16="http://schemas.microsoft.com/office/drawing/2014/main" id="{BEDCEEDF-CC30-E94C-BFE8-CA815EF17F43}"/>
               </a:ext>
             </a:extLst>
           </p:cNvPr>
@@ -12721,10 +12873,10 @@
       </p:pic>
       <p:sp>
         <p:nvSpPr>
-          <p:cNvPr id="4" name="Rounded Rectangle 3">
-            <a:extLst>
-              <a:ext uri="{FF2B5EF4-FFF2-40B4-BE49-F238E27FC236}">
-                <a16:creationId xmlns:a16="http://schemas.microsoft.com/office/drawing/2014/main" id="{B2093235-7F60-E540-808E-204405A23EE7}"/>
+          <p:cNvPr id="2" name="Rounded Rectangle 1">
+            <a:extLst>
+              <a:ext uri="{FF2B5EF4-FFF2-40B4-BE49-F238E27FC236}">
+                <a16:creationId xmlns:a16="http://schemas.microsoft.com/office/drawing/2014/main" id="{BD82F952-2278-794C-8B14-8CF951789428}"/>
               </a:ext>
             </a:extLst>
           </p:cNvPr>
@@ -12773,10 +12925,10 @@
       </p:sp>
       <p:sp>
         <p:nvSpPr>
-          <p:cNvPr id="5" name="Rounded Rectangle 4">
-            <a:extLst>
-              <a:ext uri="{FF2B5EF4-FFF2-40B4-BE49-F238E27FC236}">
-                <a16:creationId xmlns:a16="http://schemas.microsoft.com/office/drawing/2014/main" id="{EB0384ED-9812-934B-9AEB-BE1DFF339FC9}"/>
+          <p:cNvPr id="4" name="Rounded Rectangle 3">
+            <a:extLst>
+              <a:ext uri="{FF2B5EF4-FFF2-40B4-BE49-F238E27FC236}">
+                <a16:creationId xmlns:a16="http://schemas.microsoft.com/office/drawing/2014/main" id="{B7EE96E3-186A-F246-A2D2-81D08B4FC01D}"/>
               </a:ext>
             </a:extLst>
           </p:cNvPr>
@@ -12785,7 +12937,7 @@
         </p:nvSpPr>
         <p:spPr>
           <a:xfrm>
-            <a:off x="2463083" y="653139"/>
+            <a:off x="1893925" y="653139"/>
             <a:ext cx="625151" cy="270587"/>
           </a:xfrm>
           <a:prstGeom prst="roundRect">
@@ -12826,7 +12978,7 @@
     </p:spTree>
     <p:extLst>
       <p:ext uri="{BB962C8B-B14F-4D97-AF65-F5344CB8AC3E}">
-        <p14:creationId xmlns:p14="http://schemas.microsoft.com/office/powerpoint/2010/main" val="2737710365"/>
+        <p14:creationId xmlns:p14="http://schemas.microsoft.com/office/powerpoint/2010/main" val="550595469"/>
       </p:ext>
     </p:extLst>
   </p:cSld>
@@ -12858,7 +13010,7 @@
           <p:cNvPr id="3" name="Picture 2">
             <a:extLst>
               <a:ext uri="{FF2B5EF4-FFF2-40B4-BE49-F238E27FC236}">
-                <a16:creationId xmlns:a16="http://schemas.microsoft.com/office/drawing/2014/main" id="{3152EFF2-9A4E-C841-AF87-69DEFF699C48}"/>
+                <a16:creationId xmlns:a16="http://schemas.microsoft.com/office/drawing/2014/main" id="{A3193CCB-1E83-504E-BD9E-7B894F06D465}"/>
               </a:ext>
             </a:extLst>
           </p:cNvPr>
@@ -12888,7 +13040,7 @@
           <p:cNvPr id="4" name="Rounded Rectangle 3">
             <a:extLst>
               <a:ext uri="{FF2B5EF4-FFF2-40B4-BE49-F238E27FC236}">
-                <a16:creationId xmlns:a16="http://schemas.microsoft.com/office/drawing/2014/main" id="{FAC89C86-AA4F-8F43-B574-604D31225FF8}"/>
+                <a16:creationId xmlns:a16="http://schemas.microsoft.com/office/drawing/2014/main" id="{B2093235-7F60-E540-808E-204405A23EE7}"/>
               </a:ext>
             </a:extLst>
           </p:cNvPr>
@@ -12897,7 +13049,7 @@
         </p:nvSpPr>
         <p:spPr>
           <a:xfrm>
-            <a:off x="6083558" y="466531"/>
+            <a:off x="5635690" y="466531"/>
             <a:ext cx="625151" cy="270587"/>
           </a:xfrm>
           <a:prstGeom prst="roundRect">
@@ -12940,7 +13092,7 @@
           <p:cNvPr id="5" name="Rounded Rectangle 4">
             <a:extLst>
               <a:ext uri="{FF2B5EF4-FFF2-40B4-BE49-F238E27FC236}">
-                <a16:creationId xmlns:a16="http://schemas.microsoft.com/office/drawing/2014/main" id="{FFFAFD97-EAC5-6549-AF78-308BB5ACF986}"/>
+                <a16:creationId xmlns:a16="http://schemas.microsoft.com/office/drawing/2014/main" id="{EB0384ED-9812-934B-9AEB-BE1DFF339FC9}"/>
               </a:ext>
             </a:extLst>
           </p:cNvPr>
@@ -12949,7 +13101,7 @@
         </p:nvSpPr>
         <p:spPr>
           <a:xfrm>
-            <a:off x="1893925" y="653139"/>
+            <a:off x="2463083" y="653139"/>
             <a:ext cx="625151" cy="270587"/>
           </a:xfrm>
           <a:prstGeom prst="roundRect">
@@ -12990,7 +13142,7 @@
     </p:spTree>
     <p:extLst>
       <p:ext uri="{BB962C8B-B14F-4D97-AF65-F5344CB8AC3E}">
-        <p14:creationId xmlns:p14="http://schemas.microsoft.com/office/powerpoint/2010/main" val="4178138993"/>
+        <p14:creationId xmlns:p14="http://schemas.microsoft.com/office/powerpoint/2010/main" val="2737710365"/>
       </p:ext>
     </p:extLst>
   </p:cSld>
@@ -13022,7 +13174,7 @@
           <p:cNvPr id="3" name="Picture 2">
             <a:extLst>
               <a:ext uri="{FF2B5EF4-FFF2-40B4-BE49-F238E27FC236}">
-                <a16:creationId xmlns:a16="http://schemas.microsoft.com/office/drawing/2014/main" id="{A3DBF924-8571-4C48-8B5E-77E0045609A9}"/>
+                <a16:creationId xmlns:a16="http://schemas.microsoft.com/office/drawing/2014/main" id="{3152EFF2-9A4E-C841-AF87-69DEFF699C48}"/>
               </a:ext>
             </a:extLst>
           </p:cNvPr>
@@ -13052,7 +13204,7 @@
           <p:cNvPr id="4" name="Rounded Rectangle 3">
             <a:extLst>
               <a:ext uri="{FF2B5EF4-FFF2-40B4-BE49-F238E27FC236}">
-                <a16:creationId xmlns:a16="http://schemas.microsoft.com/office/drawing/2014/main" id="{2BC3B1F0-448B-084A-AC20-DF9FA35553E2}"/>
+                <a16:creationId xmlns:a16="http://schemas.microsoft.com/office/drawing/2014/main" id="{FAC89C86-AA4F-8F43-B574-604D31225FF8}"/>
               </a:ext>
             </a:extLst>
           </p:cNvPr>
@@ -13061,7 +13213,7 @@
         </p:nvSpPr>
         <p:spPr>
           <a:xfrm>
-            <a:off x="6092895" y="466531"/>
+            <a:off x="6083558" y="466531"/>
             <a:ext cx="625151" cy="270587"/>
           </a:xfrm>
           <a:prstGeom prst="roundRect">
@@ -13104,7 +13256,7 @@
           <p:cNvPr id="5" name="Rounded Rectangle 4">
             <a:extLst>
               <a:ext uri="{FF2B5EF4-FFF2-40B4-BE49-F238E27FC236}">
-                <a16:creationId xmlns:a16="http://schemas.microsoft.com/office/drawing/2014/main" id="{51119DD3-DDEE-F044-A9F5-DBED769D08E5}"/>
+                <a16:creationId xmlns:a16="http://schemas.microsoft.com/office/drawing/2014/main" id="{FFFAFD97-EAC5-6549-AF78-308BB5ACF986}"/>
               </a:ext>
             </a:extLst>
           </p:cNvPr>
@@ -13113,7 +13265,7 @@
         </p:nvSpPr>
         <p:spPr>
           <a:xfrm>
-            <a:off x="2463096" y="653139"/>
+            <a:off x="1893925" y="653139"/>
             <a:ext cx="625151" cy="270587"/>
           </a:xfrm>
           <a:prstGeom prst="roundRect">
@@ -13151,53 +13303,10 @@
           </a:p>
         </p:txBody>
       </p:sp>
-      <p:cxnSp>
-        <p:nvCxnSpPr>
-          <p:cNvPr id="6" name="Straight Arrow Connector 5">
-            <a:extLst>
-              <a:ext uri="{FF2B5EF4-FFF2-40B4-BE49-F238E27FC236}">
-                <a16:creationId xmlns:a16="http://schemas.microsoft.com/office/drawing/2014/main" id="{EB849BAE-6164-504F-86D6-E332B25167B9}"/>
-              </a:ext>
-            </a:extLst>
-          </p:cNvPr>
-          <p:cNvCxnSpPr/>
-          <p:nvPr/>
-        </p:nvCxnSpPr>
-        <p:spPr>
-          <a:xfrm>
-            <a:off x="5374433" y="4413380"/>
-            <a:ext cx="466530" cy="0"/>
-          </a:xfrm>
-          <a:prstGeom prst="straightConnector1">
-            <a:avLst/>
-          </a:prstGeom>
-          <a:ln w="38100">
-            <a:solidFill>
-              <a:srgbClr val="FF0000"/>
-            </a:solidFill>
-            <a:headEnd type="triangle"/>
-            <a:tailEnd type="triangle"/>
-          </a:ln>
-        </p:spPr>
-        <p:style>
-          <a:lnRef idx="1">
-            <a:schemeClr val="accent1"/>
-          </a:lnRef>
-          <a:fillRef idx="0">
-            <a:schemeClr val="accent1"/>
-          </a:fillRef>
-          <a:effectRef idx="0">
-            <a:schemeClr val="accent1"/>
-          </a:effectRef>
-          <a:fontRef idx="minor">
-            <a:schemeClr val="tx1"/>
-          </a:fontRef>
-        </p:style>
-      </p:cxnSp>
     </p:spTree>
     <p:extLst>
       <p:ext uri="{BB962C8B-B14F-4D97-AF65-F5344CB8AC3E}">
-        <p14:creationId xmlns:p14="http://schemas.microsoft.com/office/powerpoint/2010/main" val="2385817041"/>
+        <p14:creationId xmlns:p14="http://schemas.microsoft.com/office/powerpoint/2010/main" val="4178138993"/>
       </p:ext>
     </p:extLst>
   </p:cSld>
@@ -13229,7 +13338,7 @@
           <p:cNvPr id="3" name="Picture 2">
             <a:extLst>
               <a:ext uri="{FF2B5EF4-FFF2-40B4-BE49-F238E27FC236}">
-                <a16:creationId xmlns:a16="http://schemas.microsoft.com/office/drawing/2014/main" id="{741603A2-FC99-CD4A-822A-CCDA40AA8950}"/>
+                <a16:creationId xmlns:a16="http://schemas.microsoft.com/office/drawing/2014/main" id="{A3DBF924-8571-4C48-8B5E-77E0045609A9}"/>
               </a:ext>
             </a:extLst>
           </p:cNvPr>
@@ -13256,10 +13365,10 @@
       </p:pic>
       <p:sp>
         <p:nvSpPr>
-          <p:cNvPr id="6" name="Rounded Rectangle 5">
-            <a:extLst>
-              <a:ext uri="{FF2B5EF4-FFF2-40B4-BE49-F238E27FC236}">
-                <a16:creationId xmlns:a16="http://schemas.microsoft.com/office/drawing/2014/main" id="{08BB1EE2-F152-5B49-A503-00663E9E4B71}"/>
+          <p:cNvPr id="4" name="Rounded Rectangle 3">
+            <a:extLst>
+              <a:ext uri="{FF2B5EF4-FFF2-40B4-BE49-F238E27FC236}">
+                <a16:creationId xmlns:a16="http://schemas.microsoft.com/office/drawing/2014/main" id="{2BC3B1F0-448B-084A-AC20-DF9FA35553E2}"/>
               </a:ext>
             </a:extLst>
           </p:cNvPr>
@@ -13268,7 +13377,7 @@
         </p:nvSpPr>
         <p:spPr>
           <a:xfrm>
-            <a:off x="6083564" y="466531"/>
+            <a:off x="6092895" y="466531"/>
             <a:ext cx="625151" cy="270587"/>
           </a:xfrm>
           <a:prstGeom prst="roundRect">
@@ -13308,10 +13417,10 @@
       </p:sp>
       <p:sp>
         <p:nvSpPr>
-          <p:cNvPr id="7" name="Rounded Rectangle 6">
-            <a:extLst>
-              <a:ext uri="{FF2B5EF4-FFF2-40B4-BE49-F238E27FC236}">
-                <a16:creationId xmlns:a16="http://schemas.microsoft.com/office/drawing/2014/main" id="{D9B9DA59-CBF3-3D43-8D45-248920AB3A2F}"/>
+          <p:cNvPr id="5" name="Rounded Rectangle 4">
+            <a:extLst>
+              <a:ext uri="{FF2B5EF4-FFF2-40B4-BE49-F238E27FC236}">
+                <a16:creationId xmlns:a16="http://schemas.microsoft.com/office/drawing/2014/main" id="{51119DD3-DDEE-F044-A9F5-DBED769D08E5}"/>
               </a:ext>
             </a:extLst>
           </p:cNvPr>
@@ -13358,10 +13467,53 @@
           </a:p>
         </p:txBody>
       </p:sp>
+      <p:cxnSp>
+        <p:nvCxnSpPr>
+          <p:cNvPr id="6" name="Straight Arrow Connector 5">
+            <a:extLst>
+              <a:ext uri="{FF2B5EF4-FFF2-40B4-BE49-F238E27FC236}">
+                <a16:creationId xmlns:a16="http://schemas.microsoft.com/office/drawing/2014/main" id="{EB849BAE-6164-504F-86D6-E332B25167B9}"/>
+              </a:ext>
+            </a:extLst>
+          </p:cNvPr>
+          <p:cNvCxnSpPr/>
+          <p:nvPr/>
+        </p:nvCxnSpPr>
+        <p:spPr>
+          <a:xfrm>
+            <a:off x="5374433" y="4413380"/>
+            <a:ext cx="466530" cy="0"/>
+          </a:xfrm>
+          <a:prstGeom prst="straightConnector1">
+            <a:avLst/>
+          </a:prstGeom>
+          <a:ln w="38100">
+            <a:solidFill>
+              <a:srgbClr val="FF0000"/>
+            </a:solidFill>
+            <a:headEnd type="triangle"/>
+            <a:tailEnd type="triangle"/>
+          </a:ln>
+        </p:spPr>
+        <p:style>
+          <a:lnRef idx="1">
+            <a:schemeClr val="accent1"/>
+          </a:lnRef>
+          <a:fillRef idx="0">
+            <a:schemeClr val="accent1"/>
+          </a:fillRef>
+          <a:effectRef idx="0">
+            <a:schemeClr val="accent1"/>
+          </a:effectRef>
+          <a:fontRef idx="minor">
+            <a:schemeClr val="tx1"/>
+          </a:fontRef>
+        </p:style>
+      </p:cxnSp>
     </p:spTree>
     <p:extLst>
       <p:ext uri="{BB962C8B-B14F-4D97-AF65-F5344CB8AC3E}">
-        <p14:creationId xmlns:p14="http://schemas.microsoft.com/office/powerpoint/2010/main" val="1383878147"/>
+        <p14:creationId xmlns:p14="http://schemas.microsoft.com/office/powerpoint/2010/main" val="2385817041"/>
       </p:ext>
     </p:extLst>
   </p:cSld>
@@ -13420,10 +13572,10 @@
       </p:pic>
       <p:sp>
         <p:nvSpPr>
-          <p:cNvPr id="2" name="Oval 1">
-            <a:extLst>
-              <a:ext uri="{FF2B5EF4-FFF2-40B4-BE49-F238E27FC236}">
-                <a16:creationId xmlns:a16="http://schemas.microsoft.com/office/drawing/2014/main" id="{E69D94FF-348A-6E46-A2C3-AE8A00F73551}"/>
+          <p:cNvPr id="6" name="Rounded Rectangle 5">
+            <a:extLst>
+              <a:ext uri="{FF2B5EF4-FFF2-40B4-BE49-F238E27FC236}">
+                <a16:creationId xmlns:a16="http://schemas.microsoft.com/office/drawing/2014/main" id="{08BB1EE2-F152-5B49-A503-00663E9E4B71}"/>
               </a:ext>
             </a:extLst>
           </p:cNvPr>
@@ -13432,14 +13584,14 @@
         </p:nvSpPr>
         <p:spPr>
           <a:xfrm>
-            <a:off x="5346441" y="102637"/>
-            <a:ext cx="1026367" cy="522514"/>
-          </a:xfrm>
-          <a:prstGeom prst="ellipse">
+            <a:off x="6083564" y="466531"/>
+            <a:ext cx="625151" cy="270587"/>
+          </a:xfrm>
+          <a:prstGeom prst="roundRect">
             <a:avLst/>
           </a:prstGeom>
           <a:noFill/>
-          <a:ln w="57150">
+          <a:ln w="38100">
             <a:solidFill>
               <a:srgbClr val="FF0000"/>
             </a:solidFill>
@@ -13470,10 +13622,62 @@
           </a:p>
         </p:txBody>
       </p:sp>
+      <p:sp>
+        <p:nvSpPr>
+          <p:cNvPr id="7" name="Rounded Rectangle 6">
+            <a:extLst>
+              <a:ext uri="{FF2B5EF4-FFF2-40B4-BE49-F238E27FC236}">
+                <a16:creationId xmlns:a16="http://schemas.microsoft.com/office/drawing/2014/main" id="{D9B9DA59-CBF3-3D43-8D45-248920AB3A2F}"/>
+              </a:ext>
+            </a:extLst>
+          </p:cNvPr>
+          <p:cNvSpPr/>
+          <p:nvPr/>
+        </p:nvSpPr>
+        <p:spPr>
+          <a:xfrm>
+            <a:off x="2463096" y="653139"/>
+            <a:ext cx="625151" cy="270587"/>
+          </a:xfrm>
+          <a:prstGeom prst="roundRect">
+            <a:avLst/>
+          </a:prstGeom>
+          <a:noFill/>
+          <a:ln w="38100">
+            <a:solidFill>
+              <a:srgbClr val="FF0000"/>
+            </a:solidFill>
+          </a:ln>
+        </p:spPr>
+        <p:style>
+          <a:lnRef idx="2">
+            <a:schemeClr val="accent1">
+              <a:shade val="50000"/>
+            </a:schemeClr>
+          </a:lnRef>
+          <a:fillRef idx="1">
+            <a:schemeClr val="accent1"/>
+          </a:fillRef>
+          <a:effectRef idx="0">
+            <a:schemeClr val="accent1"/>
+          </a:effectRef>
+          <a:fontRef idx="minor">
+            <a:schemeClr val="lt1"/>
+          </a:fontRef>
+        </p:style>
+        <p:txBody>
+          <a:bodyPr rtlCol="0" anchor="ctr"/>
+          <a:lstStyle/>
+          <a:p>
+            <a:pPr algn="ctr"/>
+            <a:endParaRPr lang="en-US"/>
+          </a:p>
+        </p:txBody>
+      </p:sp>
     </p:spTree>
     <p:extLst>
       <p:ext uri="{BB962C8B-B14F-4D97-AF65-F5344CB8AC3E}">
-        <p14:creationId xmlns:p14="http://schemas.microsoft.com/office/powerpoint/2010/main" val="3307516545"/>
+        <p14:creationId xmlns:p14="http://schemas.microsoft.com/office/powerpoint/2010/main" val="1383878147"/>
       </p:ext>
     </p:extLst>
   </p:cSld>
@@ -13617,7 +13821,7 @@
           <p:cNvPr id="3" name="Picture 2">
             <a:extLst>
               <a:ext uri="{FF2B5EF4-FFF2-40B4-BE49-F238E27FC236}">
-                <a16:creationId xmlns:a16="http://schemas.microsoft.com/office/drawing/2014/main" id="{5E3C36DB-7125-1043-9B73-A3CCC56EB82B}"/>
+                <a16:creationId xmlns:a16="http://schemas.microsoft.com/office/drawing/2014/main" id="{741603A2-FC99-CD4A-822A-CCDA40AA8950}"/>
               </a:ext>
             </a:extLst>
           </p:cNvPr>
@@ -13634,8 +13838,8 @@
         </p:blipFill>
         <p:spPr>
           <a:xfrm>
-            <a:off x="2641600" y="31750"/>
-            <a:ext cx="6908800" cy="6794500"/>
+            <a:off x="1875263" y="0"/>
+            <a:ext cx="8441473" cy="6858000"/>
           </a:xfrm>
           <a:prstGeom prst="rect">
             <a:avLst/>
@@ -13647,7 +13851,7 @@
           <p:cNvPr id="2" name="Oval 1">
             <a:extLst>
               <a:ext uri="{FF2B5EF4-FFF2-40B4-BE49-F238E27FC236}">
-                <a16:creationId xmlns:a16="http://schemas.microsoft.com/office/drawing/2014/main" id="{28C3A149-AC24-2443-9026-33E68D88434A}"/>
+                <a16:creationId xmlns:a16="http://schemas.microsoft.com/office/drawing/2014/main" id="{E69D94FF-348A-6E46-A2C3-AE8A00F73551}"/>
               </a:ext>
             </a:extLst>
           </p:cNvPr>
@@ -13656,14 +13860,14 @@
         </p:nvSpPr>
         <p:spPr>
           <a:xfrm>
-            <a:off x="2181340" y="5001658"/>
-            <a:ext cx="4450814" cy="738130"/>
+            <a:off x="5346441" y="102637"/>
+            <a:ext cx="1026367" cy="522514"/>
           </a:xfrm>
           <a:prstGeom prst="ellipse">
             <a:avLst/>
           </a:prstGeom>
           <a:noFill/>
-          <a:ln w="38100">
+          <a:ln w="57150">
             <a:solidFill>
               <a:srgbClr val="FF0000"/>
             </a:solidFill>
@@ -13697,7 +13901,7 @@
     </p:spTree>
     <p:extLst>
       <p:ext uri="{BB962C8B-B14F-4D97-AF65-F5344CB8AC3E}">
-        <p14:creationId xmlns:p14="http://schemas.microsoft.com/office/powerpoint/2010/main" val="912682838"/>
+        <p14:creationId xmlns:p14="http://schemas.microsoft.com/office/powerpoint/2010/main" val="3307516545"/>
       </p:ext>
     </p:extLst>
   </p:cSld>
@@ -13729,7 +13933,7 @@
           <p:cNvPr id="3" name="Picture 2">
             <a:extLst>
               <a:ext uri="{FF2B5EF4-FFF2-40B4-BE49-F238E27FC236}">
-                <a16:creationId xmlns:a16="http://schemas.microsoft.com/office/drawing/2014/main" id="{E427B69A-0163-E740-ABA8-42A7BC9DBABA}"/>
+                <a16:creationId xmlns:a16="http://schemas.microsoft.com/office/drawing/2014/main" id="{5E3C36DB-7125-1043-9B73-A3CCC56EB82B}"/>
               </a:ext>
             </a:extLst>
           </p:cNvPr>
@@ -13759,7 +13963,7 @@
           <p:cNvPr id="2" name="Oval 1">
             <a:extLst>
               <a:ext uri="{FF2B5EF4-FFF2-40B4-BE49-F238E27FC236}">
-                <a16:creationId xmlns:a16="http://schemas.microsoft.com/office/drawing/2014/main" id="{E60EDE3C-0AB8-D54E-A0A1-FCC81538393A}"/>
+                <a16:creationId xmlns:a16="http://schemas.microsoft.com/office/drawing/2014/main" id="{28C3A149-AC24-2443-9026-33E68D88434A}"/>
               </a:ext>
             </a:extLst>
           </p:cNvPr>
@@ -13768,8 +13972,8 @@
         </p:nvSpPr>
         <p:spPr>
           <a:xfrm>
-            <a:off x="1916935" y="4836405"/>
-            <a:ext cx="5585552" cy="1134737"/>
+            <a:off x="2181340" y="5001658"/>
+            <a:ext cx="4450814" cy="738130"/>
           </a:xfrm>
           <a:prstGeom prst="ellipse">
             <a:avLst/>
@@ -13809,7 +14013,7 @@
     </p:spTree>
     <p:extLst>
       <p:ext uri="{BB962C8B-B14F-4D97-AF65-F5344CB8AC3E}">
-        <p14:creationId xmlns:p14="http://schemas.microsoft.com/office/powerpoint/2010/main" val="3171394144"/>
+        <p14:creationId xmlns:p14="http://schemas.microsoft.com/office/powerpoint/2010/main" val="912682838"/>
       </p:ext>
     </p:extLst>
   </p:cSld>
@@ -13841,7 +14045,7 @@
           <p:cNvPr id="3" name="Picture 2">
             <a:extLst>
               <a:ext uri="{FF2B5EF4-FFF2-40B4-BE49-F238E27FC236}">
-                <a16:creationId xmlns:a16="http://schemas.microsoft.com/office/drawing/2014/main" id="{E454EAAC-A99E-124E-B389-2BD31F72B1B4}"/>
+                <a16:creationId xmlns:a16="http://schemas.microsoft.com/office/drawing/2014/main" id="{E427B69A-0163-E740-ABA8-42A7BC9DBABA}"/>
               </a:ext>
             </a:extLst>
           </p:cNvPr>
@@ -13871,7 +14075,7 @@
           <p:cNvPr id="2" name="Oval 1">
             <a:extLst>
               <a:ext uri="{FF2B5EF4-FFF2-40B4-BE49-F238E27FC236}">
-                <a16:creationId xmlns:a16="http://schemas.microsoft.com/office/drawing/2014/main" id="{F4C58C83-BD5D-8E49-B670-3D4A4703FB77}"/>
+                <a16:creationId xmlns:a16="http://schemas.microsoft.com/office/drawing/2014/main" id="{E60EDE3C-0AB8-D54E-A0A1-FCC81538393A}"/>
               </a:ext>
             </a:extLst>
           </p:cNvPr>
@@ -13880,8 +14084,8 @@
         </p:nvSpPr>
         <p:spPr>
           <a:xfrm>
-            <a:off x="2148289" y="6015210"/>
-            <a:ext cx="3866921" cy="716096"/>
+            <a:off x="1916935" y="4836405"/>
+            <a:ext cx="5585552" cy="1134737"/>
           </a:xfrm>
           <a:prstGeom prst="ellipse">
             <a:avLst/>
@@ -13921,7 +14125,7 @@
     </p:spTree>
     <p:extLst>
       <p:ext uri="{BB962C8B-B14F-4D97-AF65-F5344CB8AC3E}">
-        <p14:creationId xmlns:p14="http://schemas.microsoft.com/office/powerpoint/2010/main" val="537129197"/>
+        <p14:creationId xmlns:p14="http://schemas.microsoft.com/office/powerpoint/2010/main" val="3171394144"/>
       </p:ext>
     </p:extLst>
   </p:cSld>
@@ -13953,6 +14157,118 @@
           <p:cNvPr id="3" name="Picture 2">
             <a:extLst>
               <a:ext uri="{FF2B5EF4-FFF2-40B4-BE49-F238E27FC236}">
+                <a16:creationId xmlns:a16="http://schemas.microsoft.com/office/drawing/2014/main" id="{E454EAAC-A99E-124E-B389-2BD31F72B1B4}"/>
+              </a:ext>
+            </a:extLst>
+          </p:cNvPr>
+          <p:cNvPicPr>
+            <a:picLocks noChangeAspect="1"/>
+          </p:cNvPicPr>
+          <p:nvPr/>
+        </p:nvPicPr>
+        <p:blipFill>
+          <a:blip r:embed="rId3"/>
+          <a:stretch>
+            <a:fillRect/>
+          </a:stretch>
+        </p:blipFill>
+        <p:spPr>
+          <a:xfrm>
+            <a:off x="2641600" y="31750"/>
+            <a:ext cx="6908800" cy="6794500"/>
+          </a:xfrm>
+          <a:prstGeom prst="rect">
+            <a:avLst/>
+          </a:prstGeom>
+        </p:spPr>
+      </p:pic>
+      <p:sp>
+        <p:nvSpPr>
+          <p:cNvPr id="2" name="Oval 1">
+            <a:extLst>
+              <a:ext uri="{FF2B5EF4-FFF2-40B4-BE49-F238E27FC236}">
+                <a16:creationId xmlns:a16="http://schemas.microsoft.com/office/drawing/2014/main" id="{F4C58C83-BD5D-8E49-B670-3D4A4703FB77}"/>
+              </a:ext>
+            </a:extLst>
+          </p:cNvPr>
+          <p:cNvSpPr/>
+          <p:nvPr/>
+        </p:nvSpPr>
+        <p:spPr>
+          <a:xfrm>
+            <a:off x="2148289" y="6015210"/>
+            <a:ext cx="3866921" cy="716096"/>
+          </a:xfrm>
+          <a:prstGeom prst="ellipse">
+            <a:avLst/>
+          </a:prstGeom>
+          <a:noFill/>
+          <a:ln w="38100">
+            <a:solidFill>
+              <a:srgbClr val="FF0000"/>
+            </a:solidFill>
+          </a:ln>
+        </p:spPr>
+        <p:style>
+          <a:lnRef idx="2">
+            <a:schemeClr val="accent1">
+              <a:shade val="50000"/>
+            </a:schemeClr>
+          </a:lnRef>
+          <a:fillRef idx="1">
+            <a:schemeClr val="accent1"/>
+          </a:fillRef>
+          <a:effectRef idx="0">
+            <a:schemeClr val="accent1"/>
+          </a:effectRef>
+          <a:fontRef idx="minor">
+            <a:schemeClr val="lt1"/>
+          </a:fontRef>
+        </p:style>
+        <p:txBody>
+          <a:bodyPr rtlCol="0" anchor="ctr"/>
+          <a:lstStyle/>
+          <a:p>
+            <a:pPr algn="ctr"/>
+            <a:endParaRPr lang="en-US"/>
+          </a:p>
+        </p:txBody>
+      </p:sp>
+    </p:spTree>
+    <p:extLst>
+      <p:ext uri="{BB962C8B-B14F-4D97-AF65-F5344CB8AC3E}">
+        <p14:creationId xmlns:p14="http://schemas.microsoft.com/office/powerpoint/2010/main" val="537129197"/>
+      </p:ext>
+    </p:extLst>
+  </p:cSld>
+  <p:clrMapOvr>
+    <a:masterClrMapping/>
+  </p:clrMapOvr>
+</p:sld>
+</file>
+
+<file path=ppt/slides/slide44.xml><?xml version="1.0" encoding="utf-8"?>
+<p:sld xmlns:a="http://schemas.openxmlformats.org/drawingml/2006/main" xmlns:r="http://schemas.openxmlformats.org/officeDocument/2006/relationships" xmlns:p="http://schemas.openxmlformats.org/presentationml/2006/main">
+  <p:cSld>
+    <p:spTree>
+      <p:nvGrpSpPr>
+        <p:cNvPr id="1" name=""/>
+        <p:cNvGrpSpPr/>
+        <p:nvPr/>
+      </p:nvGrpSpPr>
+      <p:grpSpPr>
+        <a:xfrm>
+          <a:off x="0" y="0"/>
+          <a:ext cx="0" cy="0"/>
+          <a:chOff x="0" y="0"/>
+          <a:chExt cx="0" cy="0"/>
+        </a:xfrm>
+      </p:grpSpPr>
+      <p:pic>
+        <p:nvPicPr>
+          <p:cNvPr id="3" name="Picture 2">
+            <a:extLst>
+              <a:ext uri="{FF2B5EF4-FFF2-40B4-BE49-F238E27FC236}">
                 <a16:creationId xmlns:a16="http://schemas.microsoft.com/office/drawing/2014/main" id="{2E0EDDAC-557A-1D4D-9DED-EAA18926511E}"/>
               </a:ext>
             </a:extLst>
@@ -14043,7 +14359,7 @@
 </p:sld>
 </file>
 
-<file path=ppt/slides/slide44.xml><?xml version="1.0" encoding="utf-8"?>
+<file path=ppt/slides/slide45.xml><?xml version="1.0" encoding="utf-8"?>
 <p:sld xmlns:a="http://schemas.openxmlformats.org/drawingml/2006/main" xmlns:r="http://schemas.openxmlformats.org/officeDocument/2006/relationships" xmlns:p="http://schemas.openxmlformats.org/presentationml/2006/main">
   <p:cSld>
     <p:spTree>

</xml_diff>